<commit_message>
nuevo diseño + traspas servidor (mi ppt)
</commit_message>
<xml_diff>
--- a/Defensa/presentaciónFinal.pptx
+++ b/Defensa/presentaciónFinal.pptx
@@ -40,14 +40,14 @@
   <p:notesSz cx="6858000" cy="9144000"/>
   <p:embeddedFontLst>
     <p:embeddedFont>
-      <p:font typeface="Lora" charset="0"/>
+      <p:font typeface="Lora" panose="020B0604020202020204" charset="0"/>
       <p:regular r:id="rId30"/>
       <p:bold r:id="rId31"/>
       <p:italic r:id="rId32"/>
       <p:boldItalic r:id="rId33"/>
     </p:embeddedFont>
     <p:embeddedFont>
-      <p:font typeface="Quattrocento Sans" charset="0"/>
+      <p:font typeface="Quattrocento Sans" panose="020B0604020202020204" charset="0"/>
       <p:regular r:id="rId34"/>
       <p:bold r:id="rId35"/>
       <p:italic r:id="rId36"/>
@@ -285,7 +285,7 @@
   </p:defaultTextStyle>
   <p:extLst>
     <p:ext uri="{EFAFB233-063F-42B5-8137-9DF3F51BA10A}">
-      <p15:sldGuideLst xmlns:p15="http://schemas.microsoft.com/office/powerpoint/2012/main" xmlns="">
+      <p15:sldGuideLst xmlns:p15="http://schemas.microsoft.com/office/powerpoint/2012/main">
         <p15:guide id="1" orient="horz" pos="1620">
           <p15:clr>
             <a:srgbClr val="A4A3A4"/>
@@ -5104,13 +5104,6 @@
         </dgm:presLayoutVars>
       </dgm:prSet>
       <dgm:spPr/>
-      <dgm:t>
-        <a:bodyPr/>
-        <a:lstStyle/>
-        <a:p>
-          <a:endParaRPr lang="es-ES"/>
-        </a:p>
-      </dgm:t>
     </dgm:pt>
     <dgm:pt modelId="{46548575-B147-4483-9D08-87E5E3627F13}" type="pres">
       <dgm:prSet presAssocID="{83E4B80B-23EF-4E0D-9337-B81B16054847}" presName="node" presStyleLbl="node1" presStyleIdx="0" presStyleCnt="3" custRadScaleRad="29221" custRadScaleInc="-286720">
@@ -5119,13 +5112,6 @@
         </dgm:presLayoutVars>
       </dgm:prSet>
       <dgm:spPr/>
-      <dgm:t>
-        <a:bodyPr/>
-        <a:lstStyle/>
-        <a:p>
-          <a:endParaRPr lang="es-ES"/>
-        </a:p>
-      </dgm:t>
     </dgm:pt>
     <dgm:pt modelId="{B062B9D6-77DB-4D33-90F4-C9AF7E9F0E15}" type="pres">
       <dgm:prSet presAssocID="{425D598D-178F-444B-A4C0-1730043742F6}" presName="sibTrans" presStyleLbl="sibTrans2D1" presStyleIdx="0" presStyleCnt="3"/>
@@ -5134,24 +5120,10 @@
           <a:avLst/>
         </a:prstGeom>
       </dgm:spPr>
-      <dgm:t>
-        <a:bodyPr/>
-        <a:lstStyle/>
-        <a:p>
-          <a:endParaRPr lang="es-ES"/>
-        </a:p>
-      </dgm:t>
     </dgm:pt>
     <dgm:pt modelId="{21DC4FFE-F344-4244-9E6A-DEF2E3B39008}" type="pres">
       <dgm:prSet presAssocID="{425D598D-178F-444B-A4C0-1730043742F6}" presName="connectorText" presStyleLbl="sibTrans2D1" presStyleIdx="0" presStyleCnt="3"/>
       <dgm:spPr/>
-      <dgm:t>
-        <a:bodyPr/>
-        <a:lstStyle/>
-        <a:p>
-          <a:endParaRPr lang="es-ES"/>
-        </a:p>
-      </dgm:t>
     </dgm:pt>
     <dgm:pt modelId="{212A5B31-3FE1-4DC5-9211-6FDB5FA6A4FB}" type="pres">
       <dgm:prSet presAssocID="{A741432F-3C06-49D4-B4A5-67F190C4826C}" presName="node" presStyleLbl="node1" presStyleIdx="1" presStyleCnt="3" custRadScaleRad="200620" custRadScaleInc="-98328">
@@ -5160,13 +5132,6 @@
         </dgm:presLayoutVars>
       </dgm:prSet>
       <dgm:spPr/>
-      <dgm:t>
-        <a:bodyPr/>
-        <a:lstStyle/>
-        <a:p>
-          <a:endParaRPr lang="es-ES"/>
-        </a:p>
-      </dgm:t>
     </dgm:pt>
     <dgm:pt modelId="{55877E58-FC51-46D5-B155-169AA4F3723B}" type="pres">
       <dgm:prSet presAssocID="{E81B54BA-3A97-4FAA-B155-6C228C0EE895}" presName="sibTrans" presStyleLbl="sibTrans2D1" presStyleIdx="1" presStyleCnt="3" custAng="21565535" custLinFactNeighborX="-6707" custLinFactNeighborY="-87549"/>
@@ -5175,24 +5140,10 @@
           <a:avLst/>
         </a:prstGeom>
       </dgm:spPr>
-      <dgm:t>
-        <a:bodyPr/>
-        <a:lstStyle/>
-        <a:p>
-          <a:endParaRPr lang="es-ES"/>
-        </a:p>
-      </dgm:t>
     </dgm:pt>
     <dgm:pt modelId="{244EFB65-762F-4137-BFD5-A34B8FB3D55E}" type="pres">
       <dgm:prSet presAssocID="{E81B54BA-3A97-4FAA-B155-6C228C0EE895}" presName="connectorText" presStyleLbl="sibTrans2D1" presStyleIdx="1" presStyleCnt="3"/>
       <dgm:spPr/>
-      <dgm:t>
-        <a:bodyPr/>
-        <a:lstStyle/>
-        <a:p>
-          <a:endParaRPr lang="es-ES"/>
-        </a:p>
-      </dgm:t>
     </dgm:pt>
     <dgm:pt modelId="{0EA6C051-DD76-4DAF-8943-BCCE1D1A0EEA}" type="pres">
       <dgm:prSet presAssocID="{5A88C638-89DD-4E23-B0AE-5F4590F674CE}" presName="node" presStyleLbl="node1" presStyleIdx="2" presStyleCnt="3" custRadScaleRad="192100" custRadScaleInc="102307">
@@ -5201,13 +5152,6 @@
         </dgm:presLayoutVars>
       </dgm:prSet>
       <dgm:spPr/>
-      <dgm:t>
-        <a:bodyPr/>
-        <a:lstStyle/>
-        <a:p>
-          <a:endParaRPr lang="es-ES"/>
-        </a:p>
-      </dgm:t>
     </dgm:pt>
     <dgm:pt modelId="{9E3C2575-948C-4489-AB9B-D336DC19D807}" type="pres">
       <dgm:prSet presAssocID="{015027F2-35D8-472A-9CFD-3D1CF9437633}" presName="sibTrans" presStyleLbl="sibTrans2D1" presStyleIdx="2" presStyleCnt="3"/>
@@ -5216,40 +5160,26 @@
           <a:avLst/>
         </a:prstGeom>
       </dgm:spPr>
-      <dgm:t>
-        <a:bodyPr/>
-        <a:lstStyle/>
-        <a:p>
-          <a:endParaRPr lang="es-ES"/>
-        </a:p>
-      </dgm:t>
     </dgm:pt>
     <dgm:pt modelId="{8C8B06FB-0502-4183-A107-E116249C3B4D}" type="pres">
       <dgm:prSet presAssocID="{015027F2-35D8-472A-9CFD-3D1CF9437633}" presName="connectorText" presStyleLbl="sibTrans2D1" presStyleIdx="2" presStyleCnt="3"/>
       <dgm:spPr/>
-      <dgm:t>
-        <a:bodyPr/>
-        <a:lstStyle/>
-        <a:p>
-          <a:endParaRPr lang="es-ES"/>
-        </a:p>
-      </dgm:t>
     </dgm:pt>
   </dgm:ptLst>
   <dgm:cxnLst>
+    <dgm:cxn modelId="{5DC78A07-CF38-4E2A-813A-993466D488D9}" type="presOf" srcId="{425D598D-178F-444B-A4C0-1730043742F6}" destId="{B062B9D6-77DB-4D33-90F4-C9AF7E9F0E15}" srcOrd="0" destOrd="0" presId="urn:microsoft.com/office/officeart/2005/8/layout/cycle7"/>
+    <dgm:cxn modelId="{9A6BD716-BCD8-4947-9533-FF0D5952C904}" type="presOf" srcId="{83E4B80B-23EF-4E0D-9337-B81B16054847}" destId="{46548575-B147-4483-9D08-87E5E3627F13}" srcOrd="0" destOrd="0" presId="urn:microsoft.com/office/officeart/2005/8/layout/cycle7"/>
+    <dgm:cxn modelId="{3D924028-F46D-4AB2-8E9C-5E0B797E1722}" type="presOf" srcId="{E81B54BA-3A97-4FAA-B155-6C228C0EE895}" destId="{244EFB65-762F-4137-BFD5-A34B8FB3D55E}" srcOrd="1" destOrd="0" presId="urn:microsoft.com/office/officeart/2005/8/layout/cycle7"/>
+    <dgm:cxn modelId="{E93BB84F-D78A-4A8A-9E9D-D2B77F8AB7AD}" srcId="{7FE0189D-D635-42D2-AF2D-4D7468A09CDF}" destId="{83E4B80B-23EF-4E0D-9337-B81B16054847}" srcOrd="0" destOrd="0" parTransId="{C6D664F3-32EF-4A28-88BE-990DD43AF6F1}" sibTransId="{425D598D-178F-444B-A4C0-1730043742F6}"/>
+    <dgm:cxn modelId="{86848689-7406-41B3-AFC6-5FF099A9DBDA}" type="presOf" srcId="{015027F2-35D8-472A-9CFD-3D1CF9437633}" destId="{8C8B06FB-0502-4183-A107-E116249C3B4D}" srcOrd="1" destOrd="0" presId="urn:microsoft.com/office/officeart/2005/8/layout/cycle7"/>
+    <dgm:cxn modelId="{942D418A-84C4-42D2-9412-1FEFB188DC9C}" srcId="{7FE0189D-D635-42D2-AF2D-4D7468A09CDF}" destId="{A741432F-3C06-49D4-B4A5-67F190C4826C}" srcOrd="1" destOrd="0" parTransId="{0F39ED45-A7F4-4B79-90BB-1E6F067B4E49}" sibTransId="{E81B54BA-3A97-4FAA-B155-6C228C0EE895}"/>
     <dgm:cxn modelId="{ED75028E-B6AD-4186-A313-7ACBB2E73673}" type="presOf" srcId="{7FE0189D-D635-42D2-AF2D-4D7468A09CDF}" destId="{35A825AF-94C8-4E7D-9246-A0C0ED4E21BA}" srcOrd="0" destOrd="0" presId="urn:microsoft.com/office/officeart/2005/8/layout/cycle7"/>
+    <dgm:cxn modelId="{EC80FF92-0FDE-47B4-9AAA-D9ACD41DB648}" type="presOf" srcId="{425D598D-178F-444B-A4C0-1730043742F6}" destId="{21DC4FFE-F344-4244-9E6A-DEF2E3B39008}" srcOrd="1" destOrd="0" presId="urn:microsoft.com/office/officeart/2005/8/layout/cycle7"/>
+    <dgm:cxn modelId="{6DE340D0-773F-40FB-9964-90ED585B06F8}" type="presOf" srcId="{5A88C638-89DD-4E23-B0AE-5F4590F674CE}" destId="{0EA6C051-DD76-4DAF-8943-BCCE1D1A0EEA}" srcOrd="0" destOrd="0" presId="urn:microsoft.com/office/officeart/2005/8/layout/cycle7"/>
+    <dgm:cxn modelId="{1EFDEED4-4F3F-4BBE-B8E6-C63C7C46E414}" type="presOf" srcId="{E81B54BA-3A97-4FAA-B155-6C228C0EE895}" destId="{55877E58-FC51-46D5-B155-169AA4F3723B}" srcOrd="0" destOrd="0" presId="urn:microsoft.com/office/officeart/2005/8/layout/cycle7"/>
+    <dgm:cxn modelId="{CE785DE2-1CC5-4BF7-B5B0-EFBD5A24FA4D}" srcId="{7FE0189D-D635-42D2-AF2D-4D7468A09CDF}" destId="{5A88C638-89DD-4E23-B0AE-5F4590F674CE}" srcOrd="2" destOrd="0" parTransId="{25160C39-658F-4A4D-979E-56080EE838E8}" sibTransId="{015027F2-35D8-472A-9CFD-3D1CF9437633}"/>
+    <dgm:cxn modelId="{F813F4E3-B1FF-477F-8C9F-DE2FF63BC0BE}" type="presOf" srcId="{015027F2-35D8-472A-9CFD-3D1CF9437633}" destId="{9E3C2575-948C-4489-AB9B-D336DC19D807}" srcOrd="0" destOrd="0" presId="urn:microsoft.com/office/officeart/2005/8/layout/cycle7"/>
     <dgm:cxn modelId="{EB440BFE-B0BD-452B-BC6B-0D2B13E7FDE5}" type="presOf" srcId="{A741432F-3C06-49D4-B4A5-67F190C4826C}" destId="{212A5B31-3FE1-4DC5-9211-6FDB5FA6A4FB}" srcOrd="0" destOrd="0" presId="urn:microsoft.com/office/officeart/2005/8/layout/cycle7"/>
-    <dgm:cxn modelId="{3D924028-F46D-4AB2-8E9C-5E0B797E1722}" type="presOf" srcId="{E81B54BA-3A97-4FAA-B155-6C228C0EE895}" destId="{244EFB65-762F-4137-BFD5-A34B8FB3D55E}" srcOrd="1" destOrd="0" presId="urn:microsoft.com/office/officeart/2005/8/layout/cycle7"/>
-    <dgm:cxn modelId="{86848689-7406-41B3-AFC6-5FF099A9DBDA}" type="presOf" srcId="{015027F2-35D8-472A-9CFD-3D1CF9437633}" destId="{8C8B06FB-0502-4183-A107-E116249C3B4D}" srcOrd="1" destOrd="0" presId="urn:microsoft.com/office/officeart/2005/8/layout/cycle7"/>
-    <dgm:cxn modelId="{E93BB84F-D78A-4A8A-9E9D-D2B77F8AB7AD}" srcId="{7FE0189D-D635-42D2-AF2D-4D7468A09CDF}" destId="{83E4B80B-23EF-4E0D-9337-B81B16054847}" srcOrd="0" destOrd="0" parTransId="{C6D664F3-32EF-4A28-88BE-990DD43AF6F1}" sibTransId="{425D598D-178F-444B-A4C0-1730043742F6}"/>
-    <dgm:cxn modelId="{EC80FF92-0FDE-47B4-9AAA-D9ACD41DB648}" type="presOf" srcId="{425D598D-178F-444B-A4C0-1730043742F6}" destId="{21DC4FFE-F344-4244-9E6A-DEF2E3B39008}" srcOrd="1" destOrd="0" presId="urn:microsoft.com/office/officeart/2005/8/layout/cycle7"/>
-    <dgm:cxn modelId="{F813F4E3-B1FF-477F-8C9F-DE2FF63BC0BE}" type="presOf" srcId="{015027F2-35D8-472A-9CFD-3D1CF9437633}" destId="{9E3C2575-948C-4489-AB9B-D336DC19D807}" srcOrd="0" destOrd="0" presId="urn:microsoft.com/office/officeart/2005/8/layout/cycle7"/>
-    <dgm:cxn modelId="{6DE340D0-773F-40FB-9964-90ED585B06F8}" type="presOf" srcId="{5A88C638-89DD-4E23-B0AE-5F4590F674CE}" destId="{0EA6C051-DD76-4DAF-8943-BCCE1D1A0EEA}" srcOrd="0" destOrd="0" presId="urn:microsoft.com/office/officeart/2005/8/layout/cycle7"/>
-    <dgm:cxn modelId="{CE785DE2-1CC5-4BF7-B5B0-EFBD5A24FA4D}" srcId="{7FE0189D-D635-42D2-AF2D-4D7468A09CDF}" destId="{5A88C638-89DD-4E23-B0AE-5F4590F674CE}" srcOrd="2" destOrd="0" parTransId="{25160C39-658F-4A4D-979E-56080EE838E8}" sibTransId="{015027F2-35D8-472A-9CFD-3D1CF9437633}"/>
-    <dgm:cxn modelId="{1EFDEED4-4F3F-4BBE-B8E6-C63C7C46E414}" type="presOf" srcId="{E81B54BA-3A97-4FAA-B155-6C228C0EE895}" destId="{55877E58-FC51-46D5-B155-169AA4F3723B}" srcOrd="0" destOrd="0" presId="urn:microsoft.com/office/officeart/2005/8/layout/cycle7"/>
-    <dgm:cxn modelId="{9A6BD716-BCD8-4947-9533-FF0D5952C904}" type="presOf" srcId="{83E4B80B-23EF-4E0D-9337-B81B16054847}" destId="{46548575-B147-4483-9D08-87E5E3627F13}" srcOrd="0" destOrd="0" presId="urn:microsoft.com/office/officeart/2005/8/layout/cycle7"/>
-    <dgm:cxn modelId="{942D418A-84C4-42D2-9412-1FEFB188DC9C}" srcId="{7FE0189D-D635-42D2-AF2D-4D7468A09CDF}" destId="{A741432F-3C06-49D4-B4A5-67F190C4826C}" srcOrd="1" destOrd="0" parTransId="{0F39ED45-A7F4-4B79-90BB-1E6F067B4E49}" sibTransId="{E81B54BA-3A97-4FAA-B155-6C228C0EE895}"/>
-    <dgm:cxn modelId="{5DC78A07-CF38-4E2A-813A-993466D488D9}" type="presOf" srcId="{425D598D-178F-444B-A4C0-1730043742F6}" destId="{B062B9D6-77DB-4D33-90F4-C9AF7E9F0E15}" srcOrd="0" destOrd="0" presId="urn:microsoft.com/office/officeart/2005/8/layout/cycle7"/>
     <dgm:cxn modelId="{20D9B2FD-CF34-44BC-8EE9-2A9C5FCD7F78}" type="presParOf" srcId="{35A825AF-94C8-4E7D-9246-A0C0ED4E21BA}" destId="{46548575-B147-4483-9D08-87E5E3627F13}" srcOrd="0" destOrd="0" presId="urn:microsoft.com/office/officeart/2005/8/layout/cycle7"/>
     <dgm:cxn modelId="{9DE44946-5522-47C4-9A4B-BEC648D0BE0C}" type="presParOf" srcId="{35A825AF-94C8-4E7D-9246-A0C0ED4E21BA}" destId="{B062B9D6-77DB-4D33-90F4-C9AF7E9F0E15}" srcOrd="1" destOrd="0" presId="urn:microsoft.com/office/officeart/2005/8/layout/cycle7"/>
     <dgm:cxn modelId="{C472A755-76D7-45CB-9B06-3A224BC5607D}" type="presParOf" srcId="{B062B9D6-77DB-4D33-90F4-C9AF7E9F0E15}" destId="{21DC4FFE-F344-4244-9E6A-DEF2E3B39008}" srcOrd="0" destOrd="0" presId="urn:microsoft.com/office/officeart/2005/8/layout/cycle7"/>
@@ -5509,13 +5439,6 @@
         </dgm:presLayoutVars>
       </dgm:prSet>
       <dgm:spPr/>
-      <dgm:t>
-        <a:bodyPr/>
-        <a:lstStyle/>
-        <a:p>
-          <a:endParaRPr lang="es-ES"/>
-        </a:p>
-      </dgm:t>
     </dgm:pt>
     <dgm:pt modelId="{B3180491-B3B8-4DFE-B57C-0A83BA8DC071}" type="pres">
       <dgm:prSet presAssocID="{271DD4EE-57F8-40F7-845C-22470035B818}" presName="Name1" presStyleCnt="0"/>
@@ -5532,13 +5455,6 @@
     <dgm:pt modelId="{F5B9BA87-6890-4129-AC2A-B114E0D9058F}" type="pres">
       <dgm:prSet presAssocID="{271DD4EE-57F8-40F7-845C-22470035B818}" presName="conn" presStyleLbl="parChTrans1D2" presStyleIdx="0" presStyleCnt="1"/>
       <dgm:spPr/>
-      <dgm:t>
-        <a:bodyPr/>
-        <a:lstStyle/>
-        <a:p>
-          <a:endParaRPr lang="es-ES"/>
-        </a:p>
-      </dgm:t>
     </dgm:pt>
     <dgm:pt modelId="{E7BE4809-2849-4172-A23B-5A11E2BF5734}" type="pres">
       <dgm:prSet presAssocID="{271DD4EE-57F8-40F7-845C-22470035B818}" presName="extraNode" presStyleLbl="node1" presStyleIdx="0" presStyleCnt="4"/>
@@ -5555,13 +5471,6 @@
         </dgm:presLayoutVars>
       </dgm:prSet>
       <dgm:spPr/>
-      <dgm:t>
-        <a:bodyPr/>
-        <a:lstStyle/>
-        <a:p>
-          <a:endParaRPr lang="es-ES"/>
-        </a:p>
-      </dgm:t>
     </dgm:pt>
     <dgm:pt modelId="{DB6AAA3A-8843-49AA-8098-D5B1382DAF8A}" type="pres">
       <dgm:prSet presAssocID="{25465040-D6E0-491F-BFEF-7AC6C4CCA63A}" presName="accent_1" presStyleCnt="0"/>
@@ -5578,13 +5487,6 @@
         </dgm:presLayoutVars>
       </dgm:prSet>
       <dgm:spPr/>
-      <dgm:t>
-        <a:bodyPr/>
-        <a:lstStyle/>
-        <a:p>
-          <a:endParaRPr lang="es-ES"/>
-        </a:p>
-      </dgm:t>
     </dgm:pt>
     <dgm:pt modelId="{8F51FBE2-BA10-4EC7-B19B-4153A04CCB2F}" type="pres">
       <dgm:prSet presAssocID="{218B3E38-4A00-4E9A-BB70-A1F2DE838927}" presName="accent_2" presStyleCnt="0"/>
@@ -5601,13 +5503,6 @@
         </dgm:presLayoutVars>
       </dgm:prSet>
       <dgm:spPr/>
-      <dgm:t>
-        <a:bodyPr/>
-        <a:lstStyle/>
-        <a:p>
-          <a:endParaRPr lang="es-ES"/>
-        </a:p>
-      </dgm:t>
     </dgm:pt>
     <dgm:pt modelId="{146643CC-4F0F-42DD-8805-EDC4264604EF}" type="pres">
       <dgm:prSet presAssocID="{7FDF271C-A7B8-4591-A64C-02DFF4691E8B}" presName="accent_3" presStyleCnt="0"/>
@@ -5624,13 +5519,6 @@
         </dgm:presLayoutVars>
       </dgm:prSet>
       <dgm:spPr/>
-      <dgm:t>
-        <a:bodyPr/>
-        <a:lstStyle/>
-        <a:p>
-          <a:endParaRPr lang="es-ES"/>
-        </a:p>
-      </dgm:t>
     </dgm:pt>
     <dgm:pt modelId="{1FC0053C-2E3D-4866-90B7-AD25598CCD46}" type="pres">
       <dgm:prSet presAssocID="{B6168D25-DF91-4C0F-A4D9-FD1DE8A4805C}" presName="accent_4" presStyleCnt="0"/>
@@ -5642,16 +5530,16 @@
     </dgm:pt>
   </dgm:ptLst>
   <dgm:cxnLst>
+    <dgm:cxn modelId="{25321D03-5B88-4AE2-99F6-2EF81454205E}" type="presOf" srcId="{271DD4EE-57F8-40F7-845C-22470035B818}" destId="{49D247A8-022D-4A81-8CFD-096B1E1D4A06}" srcOrd="0" destOrd="0" presId="urn:microsoft.com/office/officeart/2008/layout/VerticalCurvedList"/>
+    <dgm:cxn modelId="{CD7BF50D-61C5-4216-9A27-0B8F428564D6}" srcId="{271DD4EE-57F8-40F7-845C-22470035B818}" destId="{7FDF271C-A7B8-4591-A64C-02DFF4691E8B}" srcOrd="2" destOrd="0" parTransId="{97294BDC-6B36-457C-B678-7A4DDDF901FE}" sibTransId="{3592D8B4-A2D7-48E5-9697-B2B93175D739}"/>
+    <dgm:cxn modelId="{59C0A032-8562-4714-B832-4A6A41B4A4D6}" srcId="{271DD4EE-57F8-40F7-845C-22470035B818}" destId="{218B3E38-4A00-4E9A-BB70-A1F2DE838927}" srcOrd="1" destOrd="0" parTransId="{B3190613-65B9-4B35-A3C9-B1EE9CE92680}" sibTransId="{B91D1E2B-0197-41C8-A204-2B2A910CCBAD}"/>
+    <dgm:cxn modelId="{EFCA8C41-A30C-412C-822E-15A98B052AC4}" type="presOf" srcId="{B6168D25-DF91-4C0F-A4D9-FD1DE8A4805C}" destId="{9C36ED49-29E6-4B5B-A220-9C6E4EF5D35B}" srcOrd="0" destOrd="0" presId="urn:microsoft.com/office/officeart/2008/layout/VerticalCurvedList"/>
+    <dgm:cxn modelId="{8E638D87-C7DB-4C9E-90E3-B421887E4525}" type="presOf" srcId="{218B3E38-4A00-4E9A-BB70-A1F2DE838927}" destId="{370D4C93-FCF6-4157-920F-B63CCFD50B52}" srcOrd="0" destOrd="0" presId="urn:microsoft.com/office/officeart/2008/layout/VerticalCurvedList"/>
+    <dgm:cxn modelId="{17BDBC88-D1C8-48C1-99B8-EAE98FDFD552}" srcId="{271DD4EE-57F8-40F7-845C-22470035B818}" destId="{B6168D25-DF91-4C0F-A4D9-FD1DE8A4805C}" srcOrd="3" destOrd="0" parTransId="{E84122A5-0E57-40A3-8643-3D76A28F7568}" sibTransId="{50C5F863-F1ED-4139-AF47-63DBC27B1E48}"/>
     <dgm:cxn modelId="{85B4629C-8910-4A50-B815-AC345A4D5F20}" srcId="{271DD4EE-57F8-40F7-845C-22470035B818}" destId="{25465040-D6E0-491F-BFEF-7AC6C4CCA63A}" srcOrd="0" destOrd="0" parTransId="{D247150F-8E05-44B4-B153-B6236E19DAA9}" sibTransId="{AACE7D99-FD8A-4D3A-9B1F-F52509A4917A}"/>
-    <dgm:cxn modelId="{59C0A032-8562-4714-B832-4A6A41B4A4D6}" srcId="{271DD4EE-57F8-40F7-845C-22470035B818}" destId="{218B3E38-4A00-4E9A-BB70-A1F2DE838927}" srcOrd="1" destOrd="0" parTransId="{B3190613-65B9-4B35-A3C9-B1EE9CE92680}" sibTransId="{B91D1E2B-0197-41C8-A204-2B2A910CCBAD}"/>
     <dgm:cxn modelId="{7A0C7CCF-AA3A-4D0E-AE70-CE1FE6FD2DEE}" type="presOf" srcId="{AACE7D99-FD8A-4D3A-9B1F-F52509A4917A}" destId="{F5B9BA87-6890-4129-AC2A-B114E0D9058F}" srcOrd="0" destOrd="0" presId="urn:microsoft.com/office/officeart/2008/layout/VerticalCurvedList"/>
-    <dgm:cxn modelId="{17BDBC88-D1C8-48C1-99B8-EAE98FDFD552}" srcId="{271DD4EE-57F8-40F7-845C-22470035B818}" destId="{B6168D25-DF91-4C0F-A4D9-FD1DE8A4805C}" srcOrd="3" destOrd="0" parTransId="{E84122A5-0E57-40A3-8643-3D76A28F7568}" sibTransId="{50C5F863-F1ED-4139-AF47-63DBC27B1E48}"/>
+    <dgm:cxn modelId="{52FFB9EC-1E7C-4E41-B97E-F93427D0FACE}" type="presOf" srcId="{25465040-D6E0-491F-BFEF-7AC6C4CCA63A}" destId="{625EA2F2-BBBA-4E53-A6B7-D4BAB6607CD1}" srcOrd="0" destOrd="0" presId="urn:microsoft.com/office/officeart/2008/layout/VerticalCurvedList"/>
     <dgm:cxn modelId="{DFA096FD-089D-4574-8190-3078BEAD8AE6}" type="presOf" srcId="{7FDF271C-A7B8-4591-A64C-02DFF4691E8B}" destId="{A96A35DF-BF55-4785-A265-1A0A65CA1338}" srcOrd="0" destOrd="0" presId="urn:microsoft.com/office/officeart/2008/layout/VerticalCurvedList"/>
-    <dgm:cxn modelId="{25321D03-5B88-4AE2-99F6-2EF81454205E}" type="presOf" srcId="{271DD4EE-57F8-40F7-845C-22470035B818}" destId="{49D247A8-022D-4A81-8CFD-096B1E1D4A06}" srcOrd="0" destOrd="0" presId="urn:microsoft.com/office/officeart/2008/layout/VerticalCurvedList"/>
-    <dgm:cxn modelId="{8E638D87-C7DB-4C9E-90E3-B421887E4525}" type="presOf" srcId="{218B3E38-4A00-4E9A-BB70-A1F2DE838927}" destId="{370D4C93-FCF6-4157-920F-B63CCFD50B52}" srcOrd="0" destOrd="0" presId="urn:microsoft.com/office/officeart/2008/layout/VerticalCurvedList"/>
-    <dgm:cxn modelId="{EFCA8C41-A30C-412C-822E-15A98B052AC4}" type="presOf" srcId="{B6168D25-DF91-4C0F-A4D9-FD1DE8A4805C}" destId="{9C36ED49-29E6-4B5B-A220-9C6E4EF5D35B}" srcOrd="0" destOrd="0" presId="urn:microsoft.com/office/officeart/2008/layout/VerticalCurvedList"/>
-    <dgm:cxn modelId="{52FFB9EC-1E7C-4E41-B97E-F93427D0FACE}" type="presOf" srcId="{25465040-D6E0-491F-BFEF-7AC6C4CCA63A}" destId="{625EA2F2-BBBA-4E53-A6B7-D4BAB6607CD1}" srcOrd="0" destOrd="0" presId="urn:microsoft.com/office/officeart/2008/layout/VerticalCurvedList"/>
-    <dgm:cxn modelId="{CD7BF50D-61C5-4216-9A27-0B8F428564D6}" srcId="{271DD4EE-57F8-40F7-845C-22470035B818}" destId="{7FDF271C-A7B8-4591-A64C-02DFF4691E8B}" srcOrd="2" destOrd="0" parTransId="{97294BDC-6B36-457C-B678-7A4DDDF901FE}" sibTransId="{3592D8B4-A2D7-48E5-9697-B2B93175D739}"/>
     <dgm:cxn modelId="{478E3B7E-BC60-4B75-86B0-A8996CD9FFB1}" type="presParOf" srcId="{49D247A8-022D-4A81-8CFD-096B1E1D4A06}" destId="{B3180491-B3B8-4DFE-B57C-0A83BA8DC071}" srcOrd="0" destOrd="0" presId="urn:microsoft.com/office/officeart/2008/layout/VerticalCurvedList"/>
     <dgm:cxn modelId="{05BFC38F-0102-4359-A334-AB02990C83EB}" type="presParOf" srcId="{B3180491-B3B8-4DFE-B57C-0A83BA8DC071}" destId="{8E6D96AD-A584-4698-8677-A6A72B86985C}" srcOrd="0" destOrd="0" presId="urn:microsoft.com/office/officeart/2008/layout/VerticalCurvedList"/>
     <dgm:cxn modelId="{6BDAD1C7-934A-4CB6-B99C-DD082831D2DE}" type="presParOf" srcId="{8E6D96AD-A584-4698-8677-A6A72B86985C}" destId="{1B9A4281-8E44-40FC-87F8-4DC8EDD32AEE}" srcOrd="0" destOrd="0" presId="urn:microsoft.com/office/officeart/2008/layout/VerticalCurvedList"/>
@@ -5958,13 +5846,6 @@
         </dgm:presLayoutVars>
       </dgm:prSet>
       <dgm:spPr/>
-      <dgm:t>
-        <a:bodyPr/>
-        <a:lstStyle/>
-        <a:p>
-          <a:endParaRPr lang="es-ES"/>
-        </a:p>
-      </dgm:t>
     </dgm:pt>
     <dgm:pt modelId="{3B3D4009-2D07-4F1A-BDEF-C348B37A9CB6}" type="pres">
       <dgm:prSet presAssocID="{271DD4EE-57F8-40F7-845C-22470035B818}" presName="dummyMaxCanvas" presStyleCnt="0">
@@ -5979,13 +5860,6 @@
         </dgm:presLayoutVars>
       </dgm:prSet>
       <dgm:spPr/>
-      <dgm:t>
-        <a:bodyPr/>
-        <a:lstStyle/>
-        <a:p>
-          <a:endParaRPr lang="es-ES"/>
-        </a:p>
-      </dgm:t>
     </dgm:pt>
     <dgm:pt modelId="{CB5B90B0-EC9F-4B63-8D21-B17090BA3857}" type="pres">
       <dgm:prSet presAssocID="{271DD4EE-57F8-40F7-845C-22470035B818}" presName="FiveNodes_2" presStyleLbl="node1" presStyleIdx="1" presStyleCnt="5">
@@ -5994,13 +5868,6 @@
         </dgm:presLayoutVars>
       </dgm:prSet>
       <dgm:spPr/>
-      <dgm:t>
-        <a:bodyPr/>
-        <a:lstStyle/>
-        <a:p>
-          <a:endParaRPr lang="es-ES"/>
-        </a:p>
-      </dgm:t>
     </dgm:pt>
     <dgm:pt modelId="{52D48580-1518-41E4-BB8E-6E29D9715AC0}" type="pres">
       <dgm:prSet presAssocID="{271DD4EE-57F8-40F7-845C-22470035B818}" presName="FiveNodes_3" presStyleLbl="node1" presStyleIdx="2" presStyleCnt="5">
@@ -6009,13 +5876,6 @@
         </dgm:presLayoutVars>
       </dgm:prSet>
       <dgm:spPr/>
-      <dgm:t>
-        <a:bodyPr/>
-        <a:lstStyle/>
-        <a:p>
-          <a:endParaRPr lang="es-ES"/>
-        </a:p>
-      </dgm:t>
     </dgm:pt>
     <dgm:pt modelId="{0A594760-2D87-472F-A10D-A65F004336E6}" type="pres">
       <dgm:prSet presAssocID="{271DD4EE-57F8-40F7-845C-22470035B818}" presName="FiveNodes_4" presStyleLbl="node1" presStyleIdx="3" presStyleCnt="5">
@@ -6024,13 +5884,6 @@
         </dgm:presLayoutVars>
       </dgm:prSet>
       <dgm:spPr/>
-      <dgm:t>
-        <a:bodyPr/>
-        <a:lstStyle/>
-        <a:p>
-          <a:endParaRPr lang="es-ES"/>
-        </a:p>
-      </dgm:t>
     </dgm:pt>
     <dgm:pt modelId="{593AA8DC-4C5D-4210-B768-7F1DA7BC899B}" type="pres">
       <dgm:prSet presAssocID="{271DD4EE-57F8-40F7-845C-22470035B818}" presName="FiveNodes_5" presStyleLbl="node1" presStyleIdx="4" presStyleCnt="5">
@@ -6039,13 +5892,6 @@
         </dgm:presLayoutVars>
       </dgm:prSet>
       <dgm:spPr/>
-      <dgm:t>
-        <a:bodyPr/>
-        <a:lstStyle/>
-        <a:p>
-          <a:endParaRPr lang="es-ES"/>
-        </a:p>
-      </dgm:t>
     </dgm:pt>
     <dgm:pt modelId="{A655F6FF-C64E-432B-A89F-5BEEE4E78B94}" type="pres">
       <dgm:prSet presAssocID="{271DD4EE-57F8-40F7-845C-22470035B818}" presName="FiveConn_1-2" presStyleLbl="fgAccFollowNode1" presStyleIdx="0" presStyleCnt="4">
@@ -6054,13 +5900,6 @@
         </dgm:presLayoutVars>
       </dgm:prSet>
       <dgm:spPr/>
-      <dgm:t>
-        <a:bodyPr/>
-        <a:lstStyle/>
-        <a:p>
-          <a:endParaRPr lang="es-ES"/>
-        </a:p>
-      </dgm:t>
     </dgm:pt>
     <dgm:pt modelId="{5857C2BA-3C51-45C9-93DE-C1F54E2A1205}" type="pres">
       <dgm:prSet presAssocID="{271DD4EE-57F8-40F7-845C-22470035B818}" presName="FiveConn_2-3" presStyleLbl="fgAccFollowNode1" presStyleIdx="1" presStyleCnt="4">
@@ -6069,13 +5908,6 @@
         </dgm:presLayoutVars>
       </dgm:prSet>
       <dgm:spPr/>
-      <dgm:t>
-        <a:bodyPr/>
-        <a:lstStyle/>
-        <a:p>
-          <a:endParaRPr lang="es-ES"/>
-        </a:p>
-      </dgm:t>
     </dgm:pt>
     <dgm:pt modelId="{A97AF2A3-D5A1-4153-92D4-0401739D13ED}" type="pres">
       <dgm:prSet presAssocID="{271DD4EE-57F8-40F7-845C-22470035B818}" presName="FiveConn_3-4" presStyleLbl="fgAccFollowNode1" presStyleIdx="2" presStyleCnt="4">
@@ -6084,13 +5916,6 @@
         </dgm:presLayoutVars>
       </dgm:prSet>
       <dgm:spPr/>
-      <dgm:t>
-        <a:bodyPr/>
-        <a:lstStyle/>
-        <a:p>
-          <a:endParaRPr lang="es-ES"/>
-        </a:p>
-      </dgm:t>
     </dgm:pt>
     <dgm:pt modelId="{965DEC57-8D5F-40A3-8E09-5ED42BE4B685}" type="pres">
       <dgm:prSet presAssocID="{271DD4EE-57F8-40F7-845C-22470035B818}" presName="FiveConn_4-5" presStyleLbl="fgAccFollowNode1" presStyleIdx="3" presStyleCnt="4">
@@ -6099,13 +5924,6 @@
         </dgm:presLayoutVars>
       </dgm:prSet>
       <dgm:spPr/>
-      <dgm:t>
-        <a:bodyPr/>
-        <a:lstStyle/>
-        <a:p>
-          <a:endParaRPr lang="es-ES"/>
-        </a:p>
-      </dgm:t>
     </dgm:pt>
     <dgm:pt modelId="{142FCFD9-0A5F-4610-AAD4-6813F27702AF}" type="pres">
       <dgm:prSet presAssocID="{271DD4EE-57F8-40F7-845C-22470035B818}" presName="FiveNodes_1_text" presStyleLbl="node1" presStyleIdx="4" presStyleCnt="5">
@@ -6114,13 +5932,6 @@
         </dgm:presLayoutVars>
       </dgm:prSet>
       <dgm:spPr/>
-      <dgm:t>
-        <a:bodyPr/>
-        <a:lstStyle/>
-        <a:p>
-          <a:endParaRPr lang="es-ES"/>
-        </a:p>
-      </dgm:t>
     </dgm:pt>
     <dgm:pt modelId="{76B61CA4-4286-4B65-9CFA-9B996CBED5A6}" type="pres">
       <dgm:prSet presAssocID="{271DD4EE-57F8-40F7-845C-22470035B818}" presName="FiveNodes_2_text" presStyleLbl="node1" presStyleIdx="4" presStyleCnt="5">
@@ -6129,13 +5940,6 @@
         </dgm:presLayoutVars>
       </dgm:prSet>
       <dgm:spPr/>
-      <dgm:t>
-        <a:bodyPr/>
-        <a:lstStyle/>
-        <a:p>
-          <a:endParaRPr lang="es-ES"/>
-        </a:p>
-      </dgm:t>
     </dgm:pt>
     <dgm:pt modelId="{6AC27933-09AC-4592-B378-AA65F7851254}" type="pres">
       <dgm:prSet presAssocID="{271DD4EE-57F8-40F7-845C-22470035B818}" presName="FiveNodes_3_text" presStyleLbl="node1" presStyleIdx="4" presStyleCnt="5">
@@ -6144,13 +5948,6 @@
         </dgm:presLayoutVars>
       </dgm:prSet>
       <dgm:spPr/>
-      <dgm:t>
-        <a:bodyPr/>
-        <a:lstStyle/>
-        <a:p>
-          <a:endParaRPr lang="es-ES"/>
-        </a:p>
-      </dgm:t>
     </dgm:pt>
     <dgm:pt modelId="{488307EB-D907-48A6-9F69-577A71182CFB}" type="pres">
       <dgm:prSet presAssocID="{271DD4EE-57F8-40F7-845C-22470035B818}" presName="FiveNodes_4_text" presStyleLbl="node1" presStyleIdx="4" presStyleCnt="5">
@@ -6159,13 +5956,6 @@
         </dgm:presLayoutVars>
       </dgm:prSet>
       <dgm:spPr/>
-      <dgm:t>
-        <a:bodyPr/>
-        <a:lstStyle/>
-        <a:p>
-          <a:endParaRPr lang="es-ES"/>
-        </a:p>
-      </dgm:t>
     </dgm:pt>
     <dgm:pt modelId="{8B1FBEDF-11BD-4039-8E45-6106C5B2464E}" type="pres">
       <dgm:prSet presAssocID="{271DD4EE-57F8-40F7-845C-22470035B818}" presName="FiveNodes_5_text" presStyleLbl="node1" presStyleIdx="4" presStyleCnt="5">
@@ -6174,36 +5964,29 @@
         </dgm:presLayoutVars>
       </dgm:prSet>
       <dgm:spPr/>
-      <dgm:t>
-        <a:bodyPr/>
-        <a:lstStyle/>
-        <a:p>
-          <a:endParaRPr lang="es-ES"/>
-        </a:p>
-      </dgm:t>
     </dgm:pt>
   </dgm:ptLst>
   <dgm:cxnLst>
+    <dgm:cxn modelId="{7CC44602-3BDC-4E88-BC5D-17B53709B663}" type="presOf" srcId="{B6168D25-DF91-4C0F-A4D9-FD1DE8A4805C}" destId="{593AA8DC-4C5D-4210-B768-7F1DA7BC899B}" srcOrd="0" destOrd="0" presId="urn:microsoft.com/office/officeart/2005/8/layout/vProcess5"/>
+    <dgm:cxn modelId="{30B25B04-B17C-4426-9D0B-E590BD74E995}" type="presOf" srcId="{7FDF271C-A7B8-4591-A64C-02DFF4691E8B}" destId="{0A594760-2D87-472F-A10D-A65F004336E6}" srcOrd="0" destOrd="0" presId="urn:microsoft.com/office/officeart/2005/8/layout/vProcess5"/>
+    <dgm:cxn modelId="{CD7BF50D-61C5-4216-9A27-0B8F428564D6}" srcId="{271DD4EE-57F8-40F7-845C-22470035B818}" destId="{7FDF271C-A7B8-4591-A64C-02DFF4691E8B}" srcOrd="3" destOrd="0" parTransId="{97294BDC-6B36-457C-B678-7A4DDDF901FE}" sibTransId="{3592D8B4-A2D7-48E5-9697-B2B93175D739}"/>
+    <dgm:cxn modelId="{20097012-B6B4-4812-816E-E1EB06E38458}" type="presOf" srcId="{C880C0E0-BCEF-46A2-AA9D-D0E21C861779}" destId="{142FCFD9-0A5F-4610-AAD4-6813F27702AF}" srcOrd="1" destOrd="0" presId="urn:microsoft.com/office/officeart/2005/8/layout/vProcess5"/>
+    <dgm:cxn modelId="{1778C017-53CF-4790-B941-206295FD90E9}" type="presOf" srcId="{3592D8B4-A2D7-48E5-9697-B2B93175D739}" destId="{965DEC57-8D5F-40A3-8E09-5ED42BE4B685}" srcOrd="0" destOrd="0" presId="urn:microsoft.com/office/officeart/2005/8/layout/vProcess5"/>
+    <dgm:cxn modelId="{C903F12A-2924-4FA4-8A76-58C47342E98E}" type="presOf" srcId="{25465040-D6E0-491F-BFEF-7AC6C4CCA63A}" destId="{CB5B90B0-EC9F-4B63-8D21-B17090BA3857}" srcOrd="0" destOrd="0" presId="urn:microsoft.com/office/officeart/2005/8/layout/vProcess5"/>
+    <dgm:cxn modelId="{59C0A032-8562-4714-B832-4A6A41B4A4D6}" srcId="{271DD4EE-57F8-40F7-845C-22470035B818}" destId="{218B3E38-4A00-4E9A-BB70-A1F2DE838927}" srcOrd="2" destOrd="0" parTransId="{B3190613-65B9-4B35-A3C9-B1EE9CE92680}" sibTransId="{B91D1E2B-0197-41C8-A204-2B2A910CCBAD}"/>
+    <dgm:cxn modelId="{FA5D5B64-5DD2-4685-8B35-41CDFF477759}" type="presOf" srcId="{7FDF271C-A7B8-4591-A64C-02DFF4691E8B}" destId="{488307EB-D907-48A6-9F69-577A71182CFB}" srcOrd="1" destOrd="0" presId="urn:microsoft.com/office/officeart/2005/8/layout/vProcess5"/>
+    <dgm:cxn modelId="{C2282945-792F-4E2A-A0CE-1F8CA8136F42}" type="presOf" srcId="{C880C0E0-BCEF-46A2-AA9D-D0E21C861779}" destId="{A8121A04-B714-4533-9F72-D7EBB5EDC57D}" srcOrd="0" destOrd="0" presId="urn:microsoft.com/office/officeart/2005/8/layout/vProcess5"/>
+    <dgm:cxn modelId="{17BDBC88-D1C8-48C1-99B8-EAE98FDFD552}" srcId="{271DD4EE-57F8-40F7-845C-22470035B818}" destId="{B6168D25-DF91-4C0F-A4D9-FD1DE8A4805C}" srcOrd="4" destOrd="0" parTransId="{E84122A5-0E57-40A3-8643-3D76A28F7568}" sibTransId="{50C5F863-F1ED-4139-AF47-63DBC27B1E48}"/>
+    <dgm:cxn modelId="{F75EC590-8C71-485C-B965-4331391691C9}" type="presOf" srcId="{B6168D25-DF91-4C0F-A4D9-FD1DE8A4805C}" destId="{8B1FBEDF-11BD-4039-8E45-6106C5B2464E}" srcOrd="1" destOrd="0" presId="urn:microsoft.com/office/officeart/2005/8/layout/vProcess5"/>
+    <dgm:cxn modelId="{17BC6C91-3EBC-4643-9840-6938A827DE5C}" type="presOf" srcId="{218B3E38-4A00-4E9A-BB70-A1F2DE838927}" destId="{6AC27933-09AC-4592-B378-AA65F7851254}" srcOrd="1" destOrd="0" presId="urn:microsoft.com/office/officeart/2005/8/layout/vProcess5"/>
+    <dgm:cxn modelId="{85B4629C-8910-4A50-B815-AC345A4D5F20}" srcId="{271DD4EE-57F8-40F7-845C-22470035B818}" destId="{25465040-D6E0-491F-BFEF-7AC6C4CCA63A}" srcOrd="1" destOrd="0" parTransId="{D247150F-8E05-44B4-B153-B6236E19DAA9}" sibTransId="{AACE7D99-FD8A-4D3A-9B1F-F52509A4917A}"/>
+    <dgm:cxn modelId="{1C112DB7-EEAC-49EC-A683-2CDC57AE4024}" type="presOf" srcId="{CC95784C-DA6A-4D2E-B6B8-F27AA84E7558}" destId="{A655F6FF-C64E-432B-A89F-5BEEE4E78B94}" srcOrd="0" destOrd="0" presId="urn:microsoft.com/office/officeart/2005/8/layout/vProcess5"/>
+    <dgm:cxn modelId="{AB710DC0-513E-4FF4-8B4F-218B2AFFD007}" type="presOf" srcId="{AACE7D99-FD8A-4D3A-9B1F-F52509A4917A}" destId="{5857C2BA-3C51-45C9-93DE-C1F54E2A1205}" srcOrd="0" destOrd="0" presId="urn:microsoft.com/office/officeart/2005/8/layout/vProcess5"/>
     <dgm:cxn modelId="{0CB44BD6-88F8-4C2E-A008-A46737663FBF}" type="presOf" srcId="{271DD4EE-57F8-40F7-845C-22470035B818}" destId="{CDDA9C92-60D0-40B1-81C7-600474E2C4E7}" srcOrd="0" destOrd="0" presId="urn:microsoft.com/office/officeart/2005/8/layout/vProcess5"/>
-    <dgm:cxn modelId="{59C0A032-8562-4714-B832-4A6A41B4A4D6}" srcId="{271DD4EE-57F8-40F7-845C-22470035B818}" destId="{218B3E38-4A00-4E9A-BB70-A1F2DE838927}" srcOrd="2" destOrd="0" parTransId="{B3190613-65B9-4B35-A3C9-B1EE9CE92680}" sibTransId="{B91D1E2B-0197-41C8-A204-2B2A910CCBAD}"/>
     <dgm:cxn modelId="{E83556E2-E91B-4BA9-99D1-436A774A99FE}" type="presOf" srcId="{218B3E38-4A00-4E9A-BB70-A1F2DE838927}" destId="{52D48580-1518-41E4-BB8E-6E29D9715AC0}" srcOrd="0" destOrd="0" presId="urn:microsoft.com/office/officeart/2005/8/layout/vProcess5"/>
+    <dgm:cxn modelId="{BA871EF4-D07B-4B92-84C7-0E8C0313B4EA}" type="presOf" srcId="{B91D1E2B-0197-41C8-A204-2B2A910CCBAD}" destId="{A97AF2A3-D5A1-4153-92D4-0401739D13ED}" srcOrd="0" destOrd="0" presId="urn:microsoft.com/office/officeart/2005/8/layout/vProcess5"/>
     <dgm:cxn modelId="{7D4089F5-0F12-4F75-A641-14E46E5BA109}" srcId="{271DD4EE-57F8-40F7-845C-22470035B818}" destId="{C880C0E0-BCEF-46A2-AA9D-D0E21C861779}" srcOrd="0" destOrd="0" parTransId="{2F424606-04C5-48A9-BF1B-E91203DECF26}" sibTransId="{CC95784C-DA6A-4D2E-B6B8-F27AA84E7558}"/>
-    <dgm:cxn modelId="{85B4629C-8910-4A50-B815-AC345A4D5F20}" srcId="{271DD4EE-57F8-40F7-845C-22470035B818}" destId="{25465040-D6E0-491F-BFEF-7AC6C4CCA63A}" srcOrd="1" destOrd="0" parTransId="{D247150F-8E05-44B4-B153-B6236E19DAA9}" sibTransId="{AACE7D99-FD8A-4D3A-9B1F-F52509A4917A}"/>
-    <dgm:cxn modelId="{20097012-B6B4-4812-816E-E1EB06E38458}" type="presOf" srcId="{C880C0E0-BCEF-46A2-AA9D-D0E21C861779}" destId="{142FCFD9-0A5F-4610-AAD4-6813F27702AF}" srcOrd="1" destOrd="0" presId="urn:microsoft.com/office/officeart/2005/8/layout/vProcess5"/>
-    <dgm:cxn modelId="{CD7BF50D-61C5-4216-9A27-0B8F428564D6}" srcId="{271DD4EE-57F8-40F7-845C-22470035B818}" destId="{7FDF271C-A7B8-4591-A64C-02DFF4691E8B}" srcOrd="3" destOrd="0" parTransId="{97294BDC-6B36-457C-B678-7A4DDDF901FE}" sibTransId="{3592D8B4-A2D7-48E5-9697-B2B93175D739}"/>
-    <dgm:cxn modelId="{FA5D5B64-5DD2-4685-8B35-41CDFF477759}" type="presOf" srcId="{7FDF271C-A7B8-4591-A64C-02DFF4691E8B}" destId="{488307EB-D907-48A6-9F69-577A71182CFB}" srcOrd="1" destOrd="0" presId="urn:microsoft.com/office/officeart/2005/8/layout/vProcess5"/>
-    <dgm:cxn modelId="{BA871EF4-D07B-4B92-84C7-0E8C0313B4EA}" type="presOf" srcId="{B91D1E2B-0197-41C8-A204-2B2A910CCBAD}" destId="{A97AF2A3-D5A1-4153-92D4-0401739D13ED}" srcOrd="0" destOrd="0" presId="urn:microsoft.com/office/officeart/2005/8/layout/vProcess5"/>
-    <dgm:cxn modelId="{C2282945-792F-4E2A-A0CE-1F8CA8136F42}" type="presOf" srcId="{C880C0E0-BCEF-46A2-AA9D-D0E21C861779}" destId="{A8121A04-B714-4533-9F72-D7EBB5EDC57D}" srcOrd="0" destOrd="0" presId="urn:microsoft.com/office/officeart/2005/8/layout/vProcess5"/>
-    <dgm:cxn modelId="{30B25B04-B17C-4426-9D0B-E590BD74E995}" type="presOf" srcId="{7FDF271C-A7B8-4591-A64C-02DFF4691E8B}" destId="{0A594760-2D87-472F-A10D-A65F004336E6}" srcOrd="0" destOrd="0" presId="urn:microsoft.com/office/officeart/2005/8/layout/vProcess5"/>
-    <dgm:cxn modelId="{1778C017-53CF-4790-B941-206295FD90E9}" type="presOf" srcId="{3592D8B4-A2D7-48E5-9697-B2B93175D739}" destId="{965DEC57-8D5F-40A3-8E09-5ED42BE4B685}" srcOrd="0" destOrd="0" presId="urn:microsoft.com/office/officeart/2005/8/layout/vProcess5"/>
-    <dgm:cxn modelId="{1C112DB7-EEAC-49EC-A683-2CDC57AE4024}" type="presOf" srcId="{CC95784C-DA6A-4D2E-B6B8-F27AA84E7558}" destId="{A655F6FF-C64E-432B-A89F-5BEEE4E78B94}" srcOrd="0" destOrd="0" presId="urn:microsoft.com/office/officeart/2005/8/layout/vProcess5"/>
-    <dgm:cxn modelId="{17BC6C91-3EBC-4643-9840-6938A827DE5C}" type="presOf" srcId="{218B3E38-4A00-4E9A-BB70-A1F2DE838927}" destId="{6AC27933-09AC-4592-B378-AA65F7851254}" srcOrd="1" destOrd="0" presId="urn:microsoft.com/office/officeart/2005/8/layout/vProcess5"/>
-    <dgm:cxn modelId="{AB710DC0-513E-4FF4-8B4F-218B2AFFD007}" type="presOf" srcId="{AACE7D99-FD8A-4D3A-9B1F-F52509A4917A}" destId="{5857C2BA-3C51-45C9-93DE-C1F54E2A1205}" srcOrd="0" destOrd="0" presId="urn:microsoft.com/office/officeart/2005/8/layout/vProcess5"/>
-    <dgm:cxn modelId="{C903F12A-2924-4FA4-8A76-58C47342E98E}" type="presOf" srcId="{25465040-D6E0-491F-BFEF-7AC6C4CCA63A}" destId="{CB5B90B0-EC9F-4B63-8D21-B17090BA3857}" srcOrd="0" destOrd="0" presId="urn:microsoft.com/office/officeart/2005/8/layout/vProcess5"/>
-    <dgm:cxn modelId="{17BDBC88-D1C8-48C1-99B8-EAE98FDFD552}" srcId="{271DD4EE-57F8-40F7-845C-22470035B818}" destId="{B6168D25-DF91-4C0F-A4D9-FD1DE8A4805C}" srcOrd="4" destOrd="0" parTransId="{E84122A5-0E57-40A3-8643-3D76A28F7568}" sibTransId="{50C5F863-F1ED-4139-AF47-63DBC27B1E48}"/>
     <dgm:cxn modelId="{7B8A52F6-5F99-45AD-9609-AEE4E4F8B00C}" type="presOf" srcId="{25465040-D6E0-491F-BFEF-7AC6C4CCA63A}" destId="{76B61CA4-4286-4B65-9CFA-9B996CBED5A6}" srcOrd="1" destOrd="0" presId="urn:microsoft.com/office/officeart/2005/8/layout/vProcess5"/>
-    <dgm:cxn modelId="{7CC44602-3BDC-4E88-BC5D-17B53709B663}" type="presOf" srcId="{B6168D25-DF91-4C0F-A4D9-FD1DE8A4805C}" destId="{593AA8DC-4C5D-4210-B768-7F1DA7BC899B}" srcOrd="0" destOrd="0" presId="urn:microsoft.com/office/officeart/2005/8/layout/vProcess5"/>
-    <dgm:cxn modelId="{F75EC590-8C71-485C-B965-4331391691C9}" type="presOf" srcId="{B6168D25-DF91-4C0F-A4D9-FD1DE8A4805C}" destId="{8B1FBEDF-11BD-4039-8E45-6106C5B2464E}" srcOrd="1" destOrd="0" presId="urn:microsoft.com/office/officeart/2005/8/layout/vProcess5"/>
     <dgm:cxn modelId="{59904291-E3EC-4544-B679-312A4BD42EC5}" type="presParOf" srcId="{CDDA9C92-60D0-40B1-81C7-600474E2C4E7}" destId="{3B3D4009-2D07-4F1A-BDEF-C348B37A9CB6}" srcOrd="0" destOrd="0" presId="urn:microsoft.com/office/officeart/2005/8/layout/vProcess5"/>
     <dgm:cxn modelId="{6C1B8112-A4D5-41D8-B735-72598C54976F}" type="presParOf" srcId="{CDDA9C92-60D0-40B1-81C7-600474E2C4E7}" destId="{A8121A04-B714-4533-9F72-D7EBB5EDC57D}" srcOrd="1" destOrd="0" presId="urn:microsoft.com/office/officeart/2005/8/layout/vProcess5"/>
     <dgm:cxn modelId="{7553A56C-92C6-46F2-9160-EC6617D5A436}" type="presParOf" srcId="{CDDA9C92-60D0-40B1-81C7-600474E2C4E7}" destId="{CB5B90B0-EC9F-4B63-8D21-B17090BA3857}" srcOrd="2" destOrd="0" presId="urn:microsoft.com/office/officeart/2005/8/layout/vProcess5"/>
@@ -6437,13 +6220,6 @@
         </dgm:presLayoutVars>
       </dgm:prSet>
       <dgm:spPr/>
-      <dgm:t>
-        <a:bodyPr/>
-        <a:lstStyle/>
-        <a:p>
-          <a:endParaRPr lang="es-ES"/>
-        </a:p>
-      </dgm:t>
     </dgm:pt>
     <dgm:pt modelId="{06FEC478-3763-4C9F-96EB-0D855ECB2175}" type="pres">
       <dgm:prSet presAssocID="{FFB78F1D-7997-45FE-90D0-22AFBF48BA1B}" presName="arrow" presStyleLbl="bgShp" presStyleIdx="0" presStyleCnt="1"/>
@@ -6464,13 +6240,6 @@
         </dgm:presLayoutVars>
       </dgm:prSet>
       <dgm:spPr/>
-      <dgm:t>
-        <a:bodyPr/>
-        <a:lstStyle/>
-        <a:p>
-          <a:endParaRPr lang="es-ES"/>
-        </a:p>
-      </dgm:t>
     </dgm:pt>
     <dgm:pt modelId="{57A5E7D5-8EF2-4AAB-ADB9-97CD76290BB1}" type="pres">
       <dgm:prSet presAssocID="{925D3A10-FFE3-486C-9E5A-80B39F9BBE1F}" presName="circleA" presStyleLbl="node1" presStyleIdx="0" presStyleCnt="5"/>
@@ -6495,13 +6264,6 @@
         </dgm:presLayoutVars>
       </dgm:prSet>
       <dgm:spPr/>
-      <dgm:t>
-        <a:bodyPr/>
-        <a:lstStyle/>
-        <a:p>
-          <a:endParaRPr lang="es-ES"/>
-        </a:p>
-      </dgm:t>
     </dgm:pt>
     <dgm:pt modelId="{EF1CF030-0BD9-4A62-A450-33AC5755D388}" type="pres">
       <dgm:prSet presAssocID="{3A6F725F-4AD4-4091-A821-0B359E9F1F16}" presName="circleB" presStyleLbl="node1" presStyleIdx="1" presStyleCnt="5"/>
@@ -6526,13 +6288,6 @@
         </dgm:presLayoutVars>
       </dgm:prSet>
       <dgm:spPr/>
-      <dgm:t>
-        <a:bodyPr/>
-        <a:lstStyle/>
-        <a:p>
-          <a:endParaRPr lang="es-ES"/>
-        </a:p>
-      </dgm:t>
     </dgm:pt>
     <dgm:pt modelId="{50AE2BFB-BC30-40F4-A2C1-4CA1C683B9D2}" type="pres">
       <dgm:prSet presAssocID="{742647B7-2853-45A5-BC2D-E7EBFB1C9647}" presName="circleA" presStyleLbl="node1" presStyleIdx="2" presStyleCnt="5"/>
@@ -6557,13 +6312,6 @@
         </dgm:presLayoutVars>
       </dgm:prSet>
       <dgm:spPr/>
-      <dgm:t>
-        <a:bodyPr/>
-        <a:lstStyle/>
-        <a:p>
-          <a:endParaRPr lang="es-ES"/>
-        </a:p>
-      </dgm:t>
     </dgm:pt>
     <dgm:pt modelId="{46D2E244-4BEB-448C-A4B4-4E3DD4AF4769}" type="pres">
       <dgm:prSet presAssocID="{BC94A9CA-59AE-4237-87C3-9114DD6F446A}" presName="circleB" presStyleLbl="node1" presStyleIdx="3" presStyleCnt="5"/>
@@ -6588,13 +6336,6 @@
         </dgm:presLayoutVars>
       </dgm:prSet>
       <dgm:spPr/>
-      <dgm:t>
-        <a:bodyPr/>
-        <a:lstStyle/>
-        <a:p>
-          <a:endParaRPr lang="es-ES"/>
-        </a:p>
-      </dgm:t>
     </dgm:pt>
     <dgm:pt modelId="{408C14BE-95FC-4266-93B0-6958C9620755}" type="pres">
       <dgm:prSet presAssocID="{F33B6B21-EC65-46A8-8F89-18AB900B1D9F}" presName="circleA" presStyleLbl="node1" presStyleIdx="4" presStyleCnt="5"/>
@@ -6607,16 +6348,16 @@
   </dgm:ptLst>
   <dgm:cxnLst>
     <dgm:cxn modelId="{D55D1806-837E-4188-AF96-AAD92E68DEF4}" type="presOf" srcId="{742647B7-2853-45A5-BC2D-E7EBFB1C9647}" destId="{FE53D0EC-30C1-4A72-8CB8-606F2F15A87A}" srcOrd="0" destOrd="0" presId="urn:microsoft.com/office/officeart/2005/8/layout/hProcess11"/>
-    <dgm:cxn modelId="{70EA14DD-43A9-4CB5-B3B6-69911DF21451}" srcId="{FFB78F1D-7997-45FE-90D0-22AFBF48BA1B}" destId="{3A6F725F-4AD4-4091-A821-0B359E9F1F16}" srcOrd="1" destOrd="0" parTransId="{F4468C8C-9F57-496B-90DA-5142D35B8813}" sibTransId="{D734F0F8-EF51-4CB6-89E1-0B50A95A2F6B}"/>
+    <dgm:cxn modelId="{0797AB1B-893D-44E6-8026-8124D36B404C}" type="presOf" srcId="{925D3A10-FFE3-486C-9E5A-80B39F9BBE1F}" destId="{7170267B-56FA-4B0F-B86C-2CCE81C91A82}" srcOrd="0" destOrd="0" presId="urn:microsoft.com/office/officeart/2005/8/layout/hProcess11"/>
+    <dgm:cxn modelId="{3573B11B-E013-40C2-8E15-02D08606AE0E}" srcId="{FFB78F1D-7997-45FE-90D0-22AFBF48BA1B}" destId="{925D3A10-FFE3-486C-9E5A-80B39F9BBE1F}" srcOrd="0" destOrd="0" parTransId="{14C7FFBB-7902-405D-A84C-EDA6C0561116}" sibTransId="{F8245B3A-A3C9-4E9F-9E05-A02CC9DB55A8}"/>
     <dgm:cxn modelId="{A6C4F35C-5E1F-4972-A003-44F47F42C76C}" srcId="{FFB78F1D-7997-45FE-90D0-22AFBF48BA1B}" destId="{BC94A9CA-59AE-4237-87C3-9114DD6F446A}" srcOrd="3" destOrd="0" parTransId="{8A275AAB-4186-4621-9DA1-F4F2D071287B}" sibTransId="{80904D73-3347-4765-9CB8-9C4A42D120D3}"/>
-    <dgm:cxn modelId="{3573B11B-E013-40C2-8E15-02D08606AE0E}" srcId="{FFB78F1D-7997-45FE-90D0-22AFBF48BA1B}" destId="{925D3A10-FFE3-486C-9E5A-80B39F9BBE1F}" srcOrd="0" destOrd="0" parTransId="{14C7FFBB-7902-405D-A84C-EDA6C0561116}" sibTransId="{F8245B3A-A3C9-4E9F-9E05-A02CC9DB55A8}"/>
-    <dgm:cxn modelId="{0797AB1B-893D-44E6-8026-8124D36B404C}" type="presOf" srcId="{925D3A10-FFE3-486C-9E5A-80B39F9BBE1F}" destId="{7170267B-56FA-4B0F-B86C-2CCE81C91A82}" srcOrd="0" destOrd="0" presId="urn:microsoft.com/office/officeart/2005/8/layout/hProcess11"/>
-    <dgm:cxn modelId="{8C908388-E7E0-40CE-91FB-A7729A02F8DA}" type="presOf" srcId="{FFB78F1D-7997-45FE-90D0-22AFBF48BA1B}" destId="{A1C7DF7C-399B-4BE0-A991-1B3E8F23A39A}" srcOrd="0" destOrd="0" presId="urn:microsoft.com/office/officeart/2005/8/layout/hProcess11"/>
     <dgm:cxn modelId="{06FF305D-5AD6-4017-9CA5-B51316310B0D}" type="presOf" srcId="{F33B6B21-EC65-46A8-8F89-18AB900B1D9F}" destId="{6BA6D5D1-59BE-429F-A63B-5554EEFFFC69}" srcOrd="0" destOrd="0" presId="urn:microsoft.com/office/officeart/2005/8/layout/hProcess11"/>
     <dgm:cxn modelId="{B008F14C-175F-4DAE-A7A6-11451FA065E4}" srcId="{FFB78F1D-7997-45FE-90D0-22AFBF48BA1B}" destId="{742647B7-2853-45A5-BC2D-E7EBFB1C9647}" srcOrd="2" destOrd="0" parTransId="{833C21DA-A23C-4CC0-AEC1-B166653AF2AF}" sibTransId="{246570F2-0F59-44C7-BD9C-DB41579259CB}"/>
+    <dgm:cxn modelId="{9FB5C070-C1F0-4D4A-BF22-05E542BA10D7}" type="presOf" srcId="{3A6F725F-4AD4-4091-A821-0B359E9F1F16}" destId="{7E9EB6B0-13CB-4576-B8D2-BD502C63E18D}" srcOrd="0" destOrd="0" presId="urn:microsoft.com/office/officeart/2005/8/layout/hProcess11"/>
+    <dgm:cxn modelId="{8C908388-E7E0-40CE-91FB-A7729A02F8DA}" type="presOf" srcId="{FFB78F1D-7997-45FE-90D0-22AFBF48BA1B}" destId="{A1C7DF7C-399B-4BE0-A991-1B3E8F23A39A}" srcOrd="0" destOrd="0" presId="urn:microsoft.com/office/officeart/2005/8/layout/hProcess11"/>
     <dgm:cxn modelId="{5C0BA0BC-C3DA-4B77-AE21-668257A57AB5}" srcId="{FFB78F1D-7997-45FE-90D0-22AFBF48BA1B}" destId="{F33B6B21-EC65-46A8-8F89-18AB900B1D9F}" srcOrd="4" destOrd="0" parTransId="{AC08EA0A-11FF-45B0-87D8-9CAEF7212E03}" sibTransId="{64F3AF6F-DC76-41D6-9634-1D2222FC770B}"/>
+    <dgm:cxn modelId="{70EA14DD-43A9-4CB5-B3B6-69911DF21451}" srcId="{FFB78F1D-7997-45FE-90D0-22AFBF48BA1B}" destId="{3A6F725F-4AD4-4091-A821-0B359E9F1F16}" srcOrd="1" destOrd="0" parTransId="{F4468C8C-9F57-496B-90DA-5142D35B8813}" sibTransId="{D734F0F8-EF51-4CB6-89E1-0B50A95A2F6B}"/>
     <dgm:cxn modelId="{84E00EE2-BE97-4928-9C18-FA98F6B1C8F1}" type="presOf" srcId="{BC94A9CA-59AE-4237-87C3-9114DD6F446A}" destId="{937D5AD5-F981-497E-8B56-D44F1371293F}" srcOrd="0" destOrd="0" presId="urn:microsoft.com/office/officeart/2005/8/layout/hProcess11"/>
-    <dgm:cxn modelId="{9FB5C070-C1F0-4D4A-BF22-05E542BA10D7}" type="presOf" srcId="{3A6F725F-4AD4-4091-A821-0B359E9F1F16}" destId="{7E9EB6B0-13CB-4576-B8D2-BD502C63E18D}" srcOrd="0" destOrd="0" presId="urn:microsoft.com/office/officeart/2005/8/layout/hProcess11"/>
     <dgm:cxn modelId="{18480525-2B89-45AA-B0AF-6B71F648E31A}" type="presParOf" srcId="{A1C7DF7C-399B-4BE0-A991-1B3E8F23A39A}" destId="{06FEC478-3763-4C9F-96EB-0D855ECB2175}" srcOrd="0" destOrd="0" presId="urn:microsoft.com/office/officeart/2005/8/layout/hProcess11"/>
     <dgm:cxn modelId="{B0A371FD-01C4-421C-B3D6-A2D9D9188E61}" type="presParOf" srcId="{A1C7DF7C-399B-4BE0-A991-1B3E8F23A39A}" destId="{65B4F677-DBB3-4D19-B386-ACCD22FF3EB9}" srcOrd="1" destOrd="0" presId="urn:microsoft.com/office/officeart/2005/8/layout/hProcess11"/>
     <dgm:cxn modelId="{9A0928C3-C8D6-4433-AB3F-EF33B59B93F8}" type="presParOf" srcId="{65B4F677-DBB3-4D19-B386-ACCD22FF3EB9}" destId="{620B2A13-D65A-4684-8951-DBD720E1DE2A}" srcOrd="0" destOrd="0" presId="urn:microsoft.com/office/officeart/2005/8/layout/hProcess11"/>
@@ -6902,13 +6643,6 @@
         </dgm:presLayoutVars>
       </dgm:prSet>
       <dgm:spPr/>
-      <dgm:t>
-        <a:bodyPr/>
-        <a:lstStyle/>
-        <a:p>
-          <a:endParaRPr lang="es-ES"/>
-        </a:p>
-      </dgm:t>
     </dgm:pt>
     <dgm:pt modelId="{4F5A4815-2E29-479E-8863-7ABAC99F7CE4}" type="pres">
       <dgm:prSet presAssocID="{40F480B9-5185-4903-84F4-F28DE27221CC}" presName="thickLine" presStyleLbl="alignNode1" presStyleIdx="0" presStyleCnt="5"/>
@@ -6921,13 +6655,6 @@
     <dgm:pt modelId="{29C823AE-3170-4FA5-A755-C88A48738C1C}" type="pres">
       <dgm:prSet presAssocID="{40F480B9-5185-4903-84F4-F28DE27221CC}" presName="tx1" presStyleLbl="revTx" presStyleIdx="0" presStyleCnt="5"/>
       <dgm:spPr/>
-      <dgm:t>
-        <a:bodyPr/>
-        <a:lstStyle/>
-        <a:p>
-          <a:endParaRPr lang="es-ES"/>
-        </a:p>
-      </dgm:t>
     </dgm:pt>
     <dgm:pt modelId="{A4DBB364-FFFB-417D-852F-C0384278785F}" type="pres">
       <dgm:prSet presAssocID="{40F480B9-5185-4903-84F4-F28DE27221CC}" presName="vert1" presStyleCnt="0"/>
@@ -6944,13 +6671,6 @@
     <dgm:pt modelId="{6FAA08E1-B284-4112-823F-2EDB0376823E}" type="pres">
       <dgm:prSet presAssocID="{4FE625AE-B256-46B5-B961-8C1705F8C13B}" presName="tx1" presStyleLbl="revTx" presStyleIdx="1" presStyleCnt="5"/>
       <dgm:spPr/>
-      <dgm:t>
-        <a:bodyPr/>
-        <a:lstStyle/>
-        <a:p>
-          <a:endParaRPr lang="es-ES"/>
-        </a:p>
-      </dgm:t>
     </dgm:pt>
     <dgm:pt modelId="{79E39EA6-18B0-4DAC-B6D6-E488C4AE0A40}" type="pres">
       <dgm:prSet presAssocID="{4FE625AE-B256-46B5-B961-8C1705F8C13B}" presName="vert1" presStyleCnt="0"/>
@@ -6967,13 +6687,6 @@
     <dgm:pt modelId="{F61C7BB7-4804-4ABF-B4FC-152C120EF1C4}" type="pres">
       <dgm:prSet presAssocID="{1A270EF2-B54C-42C5-90A0-BEAEEE0EA7F7}" presName="tx1" presStyleLbl="revTx" presStyleIdx="2" presStyleCnt="5"/>
       <dgm:spPr/>
-      <dgm:t>
-        <a:bodyPr/>
-        <a:lstStyle/>
-        <a:p>
-          <a:endParaRPr lang="es-ES"/>
-        </a:p>
-      </dgm:t>
     </dgm:pt>
     <dgm:pt modelId="{B8B9F9BC-A5CB-458D-A999-AE33B4441EDE}" type="pres">
       <dgm:prSet presAssocID="{1A270EF2-B54C-42C5-90A0-BEAEEE0EA7F7}" presName="vert1" presStyleCnt="0"/>
@@ -6990,13 +6703,6 @@
     <dgm:pt modelId="{08EA734C-D6D0-4A8D-9073-BF51B3BEFD5F}" type="pres">
       <dgm:prSet presAssocID="{E329FE42-B82D-44DF-8112-D0F6536418DB}" presName="tx1" presStyleLbl="revTx" presStyleIdx="3" presStyleCnt="5"/>
       <dgm:spPr/>
-      <dgm:t>
-        <a:bodyPr/>
-        <a:lstStyle/>
-        <a:p>
-          <a:endParaRPr lang="es-ES"/>
-        </a:p>
-      </dgm:t>
     </dgm:pt>
     <dgm:pt modelId="{12D6E2FD-7BBF-4CCF-994D-FF40FD7B171E}" type="pres">
       <dgm:prSet presAssocID="{E329FE42-B82D-44DF-8112-D0F6536418DB}" presName="vert1" presStyleCnt="0"/>
@@ -7013,13 +6719,6 @@
     <dgm:pt modelId="{1DAE29DE-17CA-4955-B3A4-6E962056C8F6}" type="pres">
       <dgm:prSet presAssocID="{F840A262-8447-467E-8CD1-6C1102C35342}" presName="tx1" presStyleLbl="revTx" presStyleIdx="4" presStyleCnt="5"/>
       <dgm:spPr/>
-      <dgm:t>
-        <a:bodyPr/>
-        <a:lstStyle/>
-        <a:p>
-          <a:endParaRPr lang="es-ES"/>
-        </a:p>
-      </dgm:t>
     </dgm:pt>
     <dgm:pt modelId="{AFC44F6C-8EAF-4270-9A20-C00402FB6F95}" type="pres">
       <dgm:prSet presAssocID="{F840A262-8447-467E-8CD1-6C1102C35342}" presName="vert1" presStyleCnt="0"/>
@@ -7027,17 +6726,17 @@
     </dgm:pt>
   </dgm:ptLst>
   <dgm:cxnLst>
+    <dgm:cxn modelId="{98BEF907-C20E-4B20-B419-F4DA9A8DBBF1}" srcId="{507EC6F4-C02D-4AAE-BBFA-25B753F7A16E}" destId="{E329FE42-B82D-44DF-8112-D0F6536418DB}" srcOrd="3" destOrd="0" parTransId="{DF653A61-F163-4BC5-BDDB-504B43550AB7}" sibTransId="{94BBFB75-5E46-4B02-AD9E-BE71BCE94379}"/>
+    <dgm:cxn modelId="{3577E339-F313-421D-8FFC-49A160D76F52}" srcId="{507EC6F4-C02D-4AAE-BBFA-25B753F7A16E}" destId="{4FE625AE-B256-46B5-B961-8C1705F8C13B}" srcOrd="1" destOrd="0" parTransId="{7C8CAFD8-44CD-4116-8F7B-260CFB8E1920}" sibTransId="{910A2A32-B4B0-4E86-93A2-83E7DBEE7F47}"/>
+    <dgm:cxn modelId="{AF896A68-AC72-421F-A181-043632A9C52E}" type="presOf" srcId="{F840A262-8447-467E-8CD1-6C1102C35342}" destId="{1DAE29DE-17CA-4955-B3A4-6E962056C8F6}" srcOrd="0" destOrd="0" presId="urn:microsoft.com/office/officeart/2008/layout/LinedList"/>
     <dgm:cxn modelId="{AC0DA08D-1ADE-4F2E-9E21-115C0678B741}" type="presOf" srcId="{1A270EF2-B54C-42C5-90A0-BEAEEE0EA7F7}" destId="{F61C7BB7-4804-4ABF-B4FC-152C120EF1C4}" srcOrd="0" destOrd="0" presId="urn:microsoft.com/office/officeart/2008/layout/LinedList"/>
-    <dgm:cxn modelId="{5B33D8B8-0533-4B81-8CEF-3C9DED6C4F47}" type="presOf" srcId="{E329FE42-B82D-44DF-8112-D0F6536418DB}" destId="{08EA734C-D6D0-4A8D-9073-BF51B3BEFD5F}" srcOrd="0" destOrd="0" presId="urn:microsoft.com/office/officeart/2008/layout/LinedList"/>
-    <dgm:cxn modelId="{231381AF-FA21-45FD-AC17-4894CF6D0DF5}" srcId="{507EC6F4-C02D-4AAE-BBFA-25B753F7A16E}" destId="{F840A262-8447-467E-8CD1-6C1102C35342}" srcOrd="4" destOrd="0" parTransId="{60ECE8FA-58D3-4ADB-A5AB-AAA314D6ABED}" sibTransId="{B351DFCA-8311-4F35-B05C-EB575BB6B63B}"/>
-    <dgm:cxn modelId="{C38E8BFC-5A15-4239-9D1B-2560E41A2E9A}" type="presOf" srcId="{4FE625AE-B256-46B5-B961-8C1705F8C13B}" destId="{6FAA08E1-B284-4112-823F-2EDB0376823E}" srcOrd="0" destOrd="0" presId="urn:microsoft.com/office/officeart/2008/layout/LinedList"/>
     <dgm:cxn modelId="{863BA08D-2113-44EF-96C2-5CF1AA26BB5F}" type="presOf" srcId="{40F480B9-5185-4903-84F4-F28DE27221CC}" destId="{29C823AE-3170-4FA5-A755-C88A48738C1C}" srcOrd="0" destOrd="0" presId="urn:microsoft.com/office/officeart/2008/layout/LinedList"/>
     <dgm:cxn modelId="{F7D0C692-9D6A-4B2A-ACE5-853E7DD64A80}" srcId="{507EC6F4-C02D-4AAE-BBFA-25B753F7A16E}" destId="{1A270EF2-B54C-42C5-90A0-BEAEEE0EA7F7}" srcOrd="2" destOrd="0" parTransId="{FD42FB86-9E66-45EA-9587-C007FF3559D1}" sibTransId="{E73DDF7A-6799-4674-B561-61F594E7DF3B}"/>
-    <dgm:cxn modelId="{AF896A68-AC72-421F-A181-043632A9C52E}" type="presOf" srcId="{F840A262-8447-467E-8CD1-6C1102C35342}" destId="{1DAE29DE-17CA-4955-B3A4-6E962056C8F6}" srcOrd="0" destOrd="0" presId="urn:microsoft.com/office/officeart/2008/layout/LinedList"/>
+    <dgm:cxn modelId="{231381AF-FA21-45FD-AC17-4894CF6D0DF5}" srcId="{507EC6F4-C02D-4AAE-BBFA-25B753F7A16E}" destId="{F840A262-8447-467E-8CD1-6C1102C35342}" srcOrd="4" destOrd="0" parTransId="{60ECE8FA-58D3-4ADB-A5AB-AAA314D6ABED}" sibTransId="{B351DFCA-8311-4F35-B05C-EB575BB6B63B}"/>
+    <dgm:cxn modelId="{5B33D8B8-0533-4B81-8CEF-3C9DED6C4F47}" type="presOf" srcId="{E329FE42-B82D-44DF-8112-D0F6536418DB}" destId="{08EA734C-D6D0-4A8D-9073-BF51B3BEFD5F}" srcOrd="0" destOrd="0" presId="urn:microsoft.com/office/officeart/2008/layout/LinedList"/>
+    <dgm:cxn modelId="{ED9FA7D5-8ABF-46A2-8A51-F1FE7AAD51C1}" type="presOf" srcId="{507EC6F4-C02D-4AAE-BBFA-25B753F7A16E}" destId="{E58C3805-475E-4689-8BA4-18F76034A3D4}" srcOrd="0" destOrd="0" presId="urn:microsoft.com/office/officeart/2008/layout/LinedList"/>
     <dgm:cxn modelId="{F55E7FEB-6D9B-4070-A66E-C088FC4807D6}" srcId="{507EC6F4-C02D-4AAE-BBFA-25B753F7A16E}" destId="{40F480B9-5185-4903-84F4-F28DE27221CC}" srcOrd="0" destOrd="0" parTransId="{32721A24-0FEA-4D0A-91AC-5BEDBC3B1509}" sibTransId="{F8F22EF7-3119-4F2E-BEA7-84827630CD99}"/>
-    <dgm:cxn modelId="{ED9FA7D5-8ABF-46A2-8A51-F1FE7AAD51C1}" type="presOf" srcId="{507EC6F4-C02D-4AAE-BBFA-25B753F7A16E}" destId="{E58C3805-475E-4689-8BA4-18F76034A3D4}" srcOrd="0" destOrd="0" presId="urn:microsoft.com/office/officeart/2008/layout/LinedList"/>
-    <dgm:cxn modelId="{98BEF907-C20E-4B20-B419-F4DA9A8DBBF1}" srcId="{507EC6F4-C02D-4AAE-BBFA-25B753F7A16E}" destId="{E329FE42-B82D-44DF-8112-D0F6536418DB}" srcOrd="3" destOrd="0" parTransId="{DF653A61-F163-4BC5-BDDB-504B43550AB7}" sibTransId="{94BBFB75-5E46-4B02-AD9E-BE71BCE94379}"/>
-    <dgm:cxn modelId="{3577E339-F313-421D-8FFC-49A160D76F52}" srcId="{507EC6F4-C02D-4AAE-BBFA-25B753F7A16E}" destId="{4FE625AE-B256-46B5-B961-8C1705F8C13B}" srcOrd="1" destOrd="0" parTransId="{7C8CAFD8-44CD-4116-8F7B-260CFB8E1920}" sibTransId="{910A2A32-B4B0-4E86-93A2-83E7DBEE7F47}"/>
+    <dgm:cxn modelId="{C38E8BFC-5A15-4239-9D1B-2560E41A2E9A}" type="presOf" srcId="{4FE625AE-B256-46B5-B961-8C1705F8C13B}" destId="{6FAA08E1-B284-4112-823F-2EDB0376823E}" srcOrd="0" destOrd="0" presId="urn:microsoft.com/office/officeart/2008/layout/LinedList"/>
     <dgm:cxn modelId="{9B2BF208-937C-4FA8-8964-5DFEAF599BDA}" type="presParOf" srcId="{E58C3805-475E-4689-8BA4-18F76034A3D4}" destId="{4F5A4815-2E29-479E-8863-7ABAC99F7CE4}" srcOrd="0" destOrd="0" presId="urn:microsoft.com/office/officeart/2008/layout/LinedList"/>
     <dgm:cxn modelId="{CCA46072-7E17-4E35-B40A-273B27A1BFB8}" type="presParOf" srcId="{E58C3805-475E-4689-8BA4-18F76034A3D4}" destId="{D66CD0F7-A12D-47C9-ACC4-BB160D692280}" srcOrd="1" destOrd="0" presId="urn:microsoft.com/office/officeart/2008/layout/LinedList"/>
     <dgm:cxn modelId="{5B838ABE-7AA3-4AB3-A8D7-1F0565121F50}" type="presParOf" srcId="{D66CD0F7-A12D-47C9-ACC4-BB160D692280}" destId="{29C823AE-3170-4FA5-A755-C88A48738C1C}" srcOrd="0" destOrd="0" presId="urn:microsoft.com/office/officeart/2008/layout/LinedList"/>
@@ -7091,11 +6790,11 @@
         <a:lstStyle/>
         <a:p>
           <a:r>
-            <a:rPr lang="en-US" sz="1400" b="0" i="0" dirty="0" smtClean="0"/>
+            <a:rPr lang="en-US" sz="1400" b="0" i="0" dirty="0"/>
             <a:t>Early </a:t>
           </a:r>
           <a:r>
-            <a:rPr lang="en-GB" sz="1400" b="0" i="0" u="sng" dirty="0" smtClean="0">
+            <a:rPr lang="en-GB" sz="1400" b="0" i="0" u="sng" dirty="0">
               <a:highlight>
                 <a:srgbClr val="CC95ED"/>
               </a:highlight>
@@ -7103,11 +6802,11 @@
             <a:t>research</a:t>
           </a:r>
           <a:r>
-            <a:rPr lang="en-GB" sz="1400" b="0" i="0" dirty="0" smtClean="0"/>
+            <a:rPr lang="en-GB" sz="1400" b="0" i="0" dirty="0"/>
             <a:t> </a:t>
           </a:r>
           <a:r>
-            <a:rPr lang="en-US" sz="1400" b="0" i="0" dirty="0" smtClean="0"/>
+            <a:rPr lang="en-US" sz="1400" b="0" i="0" dirty="0"/>
             <a:t>on adaptability, Bluetooth technology and positioning.</a:t>
           </a:r>
           <a:endParaRPr lang="es-ES" sz="1400" dirty="0"/>
@@ -7144,7 +6843,7 @@
         <a:lstStyle/>
         <a:p>
           <a:r>
-            <a:rPr lang="en-GB" sz="1400" b="0" i="0" u="sng" dirty="0" smtClean="0">
+            <a:rPr lang="en-GB" sz="1400" b="0" i="0" u="sng" dirty="0">
               <a:highlight>
                 <a:srgbClr val="CC95ED"/>
               </a:highlight>
@@ -7152,31 +6851,31 @@
             <a:t>Mapping</a:t>
           </a:r>
           <a:r>
-            <a:rPr lang="en-GB" sz="1400" b="0" i="0" dirty="0" smtClean="0"/>
+            <a:rPr lang="en-GB" sz="1400" b="0" i="0" dirty="0"/>
             <a:t> </a:t>
           </a:r>
           <a:r>
-            <a:rPr lang="es-ES" sz="1400" dirty="0" smtClean="0"/>
+            <a:rPr lang="es-ES" sz="1400" dirty="0"/>
             <a:t>of </a:t>
           </a:r>
           <a:r>
-            <a:rPr lang="es-ES" sz="1400" dirty="0" err="1" smtClean="0"/>
+            <a:rPr lang="es-ES" sz="1400" dirty="0" err="1"/>
             <a:t>Belen’s</a:t>
           </a:r>
           <a:r>
-            <a:rPr lang="es-ES" sz="1400" dirty="0" smtClean="0"/>
+            <a:rPr lang="es-ES" sz="1400" dirty="0"/>
             <a:t> </a:t>
           </a:r>
           <a:r>
-            <a:rPr lang="es-ES" sz="1400" dirty="0" err="1" smtClean="0"/>
+            <a:rPr lang="es-ES" sz="1400" dirty="0" err="1"/>
             <a:t>house</a:t>
           </a:r>
           <a:r>
-            <a:rPr lang="es-ES" sz="1400" dirty="0" smtClean="0"/>
+            <a:rPr lang="es-ES" sz="1400" dirty="0"/>
             <a:t> </a:t>
           </a:r>
           <a:r>
-            <a:rPr lang="es-ES" sz="1400" dirty="0" smtClean="0">
+            <a:rPr lang="es-ES" sz="1400" dirty="0">
               <a:solidFill>
                 <a:schemeClr val="dk1"/>
               </a:solidFill>
@@ -7186,7 +6885,7 @@
             <a:t></a:t>
           </a:r>
           <a:r>
-            <a:rPr lang="es-ES" sz="1400" dirty="0" smtClean="0">
+            <a:rPr lang="es-ES" sz="1400" dirty="0">
               <a:solidFill>
                 <a:schemeClr val="dk1"/>
               </a:solidFill>
@@ -7196,7 +6895,7 @@
             <a:t> </a:t>
           </a:r>
           <a:r>
-            <a:rPr lang="es-ES" sz="1400" dirty="0" err="1" smtClean="0">
+            <a:rPr lang="es-ES" sz="1400" dirty="0" err="1">
               <a:solidFill>
                 <a:schemeClr val="dk1"/>
               </a:solidFill>
@@ -7206,10 +6905,9 @@
             <a:t>Evaluation</a:t>
           </a:r>
           <a:r>
-            <a:rPr lang="es-ES" sz="1400" dirty="0" smtClean="0"/>
+            <a:rPr lang="es-ES" sz="1400" dirty="0"/>
             <a:t> </a:t>
           </a:r>
-          <a:endParaRPr lang="es-ES" sz="1400" dirty="0"/>
         </a:p>
       </dgm:t>
     </dgm:pt>
@@ -7243,23 +6941,23 @@
         <a:lstStyle/>
         <a:p>
           <a:r>
-            <a:rPr lang="es-ES" sz="1400" dirty="0" err="1" smtClean="0"/>
+            <a:rPr lang="es-ES" sz="1400" dirty="0" err="1"/>
             <a:t>Much</a:t>
           </a:r>
           <a:r>
-            <a:rPr lang="es-ES" sz="1400" dirty="0" smtClean="0"/>
+            <a:rPr lang="es-ES" sz="1400" dirty="0"/>
             <a:t> of </a:t>
           </a:r>
           <a:r>
-            <a:rPr lang="es-ES" sz="1400" dirty="0" err="1" smtClean="0"/>
+            <a:rPr lang="es-ES" sz="1400" dirty="0" err="1"/>
             <a:t>the</a:t>
           </a:r>
           <a:r>
-            <a:rPr lang="es-ES" sz="1400" dirty="0" smtClean="0"/>
+            <a:rPr lang="es-ES" sz="1400" dirty="0"/>
             <a:t> </a:t>
           </a:r>
           <a:r>
-            <a:rPr lang="en-GB" sz="1400" b="0" i="0" u="sng" dirty="0" smtClean="0">
+            <a:rPr lang="en-GB" sz="1400" b="0" i="0" u="sng" dirty="0">
               <a:highlight>
                 <a:srgbClr val="CC95ED"/>
               </a:highlight>
@@ -7267,19 +6965,19 @@
             <a:t>client</a:t>
           </a:r>
           <a:r>
-            <a:rPr lang="en-GB" sz="1400" b="0" i="0" dirty="0" smtClean="0"/>
+            <a:rPr lang="en-GB" sz="1400" b="0" i="0" dirty="0"/>
             <a:t> </a:t>
           </a:r>
           <a:r>
-            <a:rPr lang="es-ES" sz="1400" dirty="0" err="1" smtClean="0"/>
+            <a:rPr lang="es-ES" sz="1400" dirty="0" err="1"/>
             <a:t>code</a:t>
           </a:r>
           <a:r>
-            <a:rPr lang="es-ES" sz="1400" dirty="0" smtClean="0"/>
+            <a:rPr lang="es-ES" sz="1400" dirty="0"/>
             <a:t> </a:t>
           </a:r>
           <a:r>
-            <a:rPr lang="es-ES" sz="1400" dirty="0" smtClean="0">
+            <a:rPr lang="es-ES" sz="1400" dirty="0">
               <a:solidFill>
                 <a:schemeClr val="dk1"/>
               </a:solidFill>
@@ -7289,7 +6987,7 @@
             <a:t></a:t>
           </a:r>
           <a:r>
-            <a:rPr lang="es-ES" sz="1400" dirty="0" smtClean="0">
+            <a:rPr lang="es-ES" sz="1400" dirty="0">
               <a:solidFill>
                 <a:schemeClr val="dk1"/>
               </a:solidFill>
@@ -7299,7 +6997,7 @@
             <a:t> </a:t>
           </a:r>
           <a:r>
-            <a:rPr lang="es-ES" sz="1400" dirty="0" err="1" smtClean="0">
+            <a:rPr lang="es-ES" sz="1400" dirty="0" err="1">
               <a:solidFill>
                 <a:schemeClr val="dk1"/>
               </a:solidFill>
@@ -7309,7 +7007,7 @@
             <a:t>Layaouts</a:t>
           </a:r>
           <a:r>
-            <a:rPr lang="es-ES" sz="1400" dirty="0" smtClean="0">
+            <a:rPr lang="es-ES" sz="1400" dirty="0">
               <a:solidFill>
                 <a:schemeClr val="dk1"/>
               </a:solidFill>
@@ -7319,7 +7017,7 @@
             <a:t>, </a:t>
           </a:r>
           <a:r>
-            <a:rPr lang="es-ES" sz="1400" dirty="0" err="1" smtClean="0">
+            <a:rPr lang="es-ES" sz="1400" dirty="0" err="1">
               <a:solidFill>
                 <a:schemeClr val="dk1"/>
               </a:solidFill>
@@ -7329,7 +7027,7 @@
             <a:t>button’s</a:t>
           </a:r>
           <a:r>
-            <a:rPr lang="es-ES" sz="1400" dirty="0" smtClean="0">
+            <a:rPr lang="es-ES" sz="1400" dirty="0">
               <a:solidFill>
                 <a:schemeClr val="dk1"/>
               </a:solidFill>
@@ -7339,7 +7037,7 @@
             <a:t> </a:t>
           </a:r>
           <a:r>
-            <a:rPr lang="es-ES" sz="1400" dirty="0" err="1" smtClean="0">
+            <a:rPr lang="es-ES" sz="1400" dirty="0" err="1">
               <a:solidFill>
                 <a:schemeClr val="dk1"/>
               </a:solidFill>
@@ -7349,7 +7047,7 @@
             <a:t>functionalities</a:t>
           </a:r>
           <a:r>
-            <a:rPr lang="es-ES" sz="1400" dirty="0" smtClean="0">
+            <a:rPr lang="es-ES" sz="1400" dirty="0">
               <a:solidFill>
                 <a:schemeClr val="dk1"/>
               </a:solidFill>
@@ -7359,7 +7057,7 @@
             <a:t>, </a:t>
           </a:r>
           <a:r>
-            <a:rPr lang="es-ES" sz="1400" dirty="0" err="1" smtClean="0">
+            <a:rPr lang="es-ES" sz="1400" dirty="0" err="1">
               <a:solidFill>
                 <a:schemeClr val="dk1"/>
               </a:solidFill>
@@ -7369,7 +7067,7 @@
             <a:t>generalization</a:t>
           </a:r>
           <a:r>
-            <a:rPr lang="es-ES" sz="1400" dirty="0" smtClean="0">
+            <a:rPr lang="es-ES" sz="1400" dirty="0">
               <a:solidFill>
                 <a:schemeClr val="dk1"/>
               </a:solidFill>
@@ -7379,7 +7077,7 @@
             <a:t> of </a:t>
           </a:r>
           <a:r>
-            <a:rPr lang="es-ES" sz="1400" dirty="0" err="1" smtClean="0">
+            <a:rPr lang="es-ES" sz="1400" dirty="0" err="1">
               <a:solidFill>
                 <a:schemeClr val="dk1"/>
               </a:solidFill>
@@ -7389,7 +7087,7 @@
             <a:t>the</a:t>
           </a:r>
           <a:r>
-            <a:rPr lang="es-ES" sz="1400" dirty="0" smtClean="0">
+            <a:rPr lang="es-ES" sz="1400" dirty="0">
               <a:solidFill>
                 <a:schemeClr val="dk1"/>
               </a:solidFill>
@@ -7399,7 +7097,7 @@
             <a:t> </a:t>
           </a:r>
           <a:r>
-            <a:rPr lang="es-ES" sz="1400" dirty="0" err="1" smtClean="0">
+            <a:rPr lang="es-ES" sz="1400" dirty="0" err="1">
               <a:solidFill>
                 <a:schemeClr val="dk1"/>
               </a:solidFill>
@@ -7409,7 +7107,7 @@
             <a:t>code</a:t>
           </a:r>
           <a:r>
-            <a:rPr lang="es-ES" sz="1400" dirty="0" smtClean="0">
+            <a:rPr lang="es-ES" sz="1400" dirty="0">
               <a:solidFill>
                 <a:schemeClr val="dk1"/>
               </a:solidFill>
@@ -7452,7 +7150,7 @@
         <a:lstStyle/>
         <a:p>
           <a:r>
-            <a:rPr lang="en-GB" sz="1400" b="0" i="0" u="sng" dirty="0" smtClean="0">
+            <a:rPr lang="en-GB" sz="1400" b="0" i="0" u="sng" dirty="0">
               <a:highlight>
                 <a:srgbClr val="CC95ED"/>
               </a:highlight>
@@ -7460,15 +7158,15 @@
             <a:t>Mapping</a:t>
           </a:r>
           <a:r>
-            <a:rPr lang="en-GB" sz="1400" b="0" i="0" dirty="0" smtClean="0"/>
+            <a:rPr lang="en-GB" sz="1400" b="0" i="0" dirty="0"/>
             <a:t> </a:t>
           </a:r>
           <a:r>
-            <a:rPr lang="en-US" sz="1400" dirty="0" smtClean="0"/>
+            <a:rPr lang="en-US" sz="1400" dirty="0"/>
             <a:t>of the Faculty of Computer Science</a:t>
           </a:r>
           <a:r>
-            <a:rPr lang="en-US" sz="1900" dirty="0" smtClean="0"/>
+            <a:rPr lang="en-US" sz="1900" dirty="0"/>
             <a:t>.</a:t>
           </a:r>
           <a:endParaRPr lang="es-ES" sz="1900" dirty="0"/>
@@ -7506,13 +7204,6 @@
         </dgm:presLayoutVars>
       </dgm:prSet>
       <dgm:spPr/>
-      <dgm:t>
-        <a:bodyPr/>
-        <a:lstStyle/>
-        <a:p>
-          <a:endParaRPr lang="es-ES"/>
-        </a:p>
-      </dgm:t>
     </dgm:pt>
     <dgm:pt modelId="{4F5A4815-2E29-479E-8863-7ABAC99F7CE4}" type="pres">
       <dgm:prSet presAssocID="{40F480B9-5185-4903-84F4-F28DE27221CC}" presName="thickLine" presStyleLbl="alignNode1" presStyleIdx="0" presStyleCnt="4"/>
@@ -7525,13 +7216,6 @@
     <dgm:pt modelId="{29C823AE-3170-4FA5-A755-C88A48738C1C}" type="pres">
       <dgm:prSet presAssocID="{40F480B9-5185-4903-84F4-F28DE27221CC}" presName="tx1" presStyleLbl="revTx" presStyleIdx="0" presStyleCnt="4"/>
       <dgm:spPr/>
-      <dgm:t>
-        <a:bodyPr/>
-        <a:lstStyle/>
-        <a:p>
-          <a:endParaRPr lang="es-ES"/>
-        </a:p>
-      </dgm:t>
     </dgm:pt>
     <dgm:pt modelId="{A4DBB364-FFFB-417D-852F-C0384278785F}" type="pres">
       <dgm:prSet presAssocID="{40F480B9-5185-4903-84F4-F28DE27221CC}" presName="vert1" presStyleCnt="0"/>
@@ -7548,13 +7232,6 @@
     <dgm:pt modelId="{6FAA08E1-B284-4112-823F-2EDB0376823E}" type="pres">
       <dgm:prSet presAssocID="{4FE625AE-B256-46B5-B961-8C1705F8C13B}" presName="tx1" presStyleLbl="revTx" presStyleIdx="1" presStyleCnt="4"/>
       <dgm:spPr/>
-      <dgm:t>
-        <a:bodyPr/>
-        <a:lstStyle/>
-        <a:p>
-          <a:endParaRPr lang="es-ES"/>
-        </a:p>
-      </dgm:t>
     </dgm:pt>
     <dgm:pt modelId="{79E39EA6-18B0-4DAC-B6D6-E488C4AE0A40}" type="pres">
       <dgm:prSet presAssocID="{4FE625AE-B256-46B5-B961-8C1705F8C13B}" presName="vert1" presStyleCnt="0"/>
@@ -7571,13 +7248,6 @@
     <dgm:pt modelId="{F61C7BB7-4804-4ABF-B4FC-152C120EF1C4}" type="pres">
       <dgm:prSet presAssocID="{1A270EF2-B54C-42C5-90A0-BEAEEE0EA7F7}" presName="tx1" presStyleLbl="revTx" presStyleIdx="2" presStyleCnt="4"/>
       <dgm:spPr/>
-      <dgm:t>
-        <a:bodyPr/>
-        <a:lstStyle/>
-        <a:p>
-          <a:endParaRPr lang="es-ES"/>
-        </a:p>
-      </dgm:t>
     </dgm:pt>
     <dgm:pt modelId="{B8B9F9BC-A5CB-458D-A999-AE33B4441EDE}" type="pres">
       <dgm:prSet presAssocID="{1A270EF2-B54C-42C5-90A0-BEAEEE0EA7F7}" presName="vert1" presStyleCnt="0"/>
@@ -7594,13 +7264,6 @@
     <dgm:pt modelId="{1DAE29DE-17CA-4955-B3A4-6E962056C8F6}" type="pres">
       <dgm:prSet presAssocID="{F840A262-8447-467E-8CD1-6C1102C35342}" presName="tx1" presStyleLbl="revTx" presStyleIdx="3" presStyleCnt="4"/>
       <dgm:spPr/>
-      <dgm:t>
-        <a:bodyPr/>
-        <a:lstStyle/>
-        <a:p>
-          <a:endParaRPr lang="es-ES"/>
-        </a:p>
-      </dgm:t>
     </dgm:pt>
     <dgm:pt modelId="{AFC44F6C-8EAF-4270-9A20-C00402FB6F95}" type="pres">
       <dgm:prSet presAssocID="{F840A262-8447-467E-8CD1-6C1102C35342}" presName="vert1" presStyleCnt="0"/>
@@ -7608,15 +7271,15 @@
     </dgm:pt>
   </dgm:ptLst>
   <dgm:cxnLst>
+    <dgm:cxn modelId="{3577E339-F313-421D-8FFC-49A160D76F52}" srcId="{507EC6F4-C02D-4AAE-BBFA-25B753F7A16E}" destId="{4FE625AE-B256-46B5-B961-8C1705F8C13B}" srcOrd="1" destOrd="0" parTransId="{7C8CAFD8-44CD-4116-8F7B-260CFB8E1920}" sibTransId="{910A2A32-B4B0-4E86-93A2-83E7DBEE7F47}"/>
+    <dgm:cxn modelId="{E424BB4E-C3C0-4E0E-B376-AA58030F127D}" type="presOf" srcId="{40F480B9-5185-4903-84F4-F28DE27221CC}" destId="{29C823AE-3170-4FA5-A755-C88A48738C1C}" srcOrd="0" destOrd="0" presId="urn:microsoft.com/office/officeart/2008/layout/LinedList"/>
+    <dgm:cxn modelId="{C7006883-4BF0-472B-9BCA-59E6D23AD832}" type="presOf" srcId="{F840A262-8447-467E-8CD1-6C1102C35342}" destId="{1DAE29DE-17CA-4955-B3A4-6E962056C8F6}" srcOrd="0" destOrd="0" presId="urn:microsoft.com/office/officeart/2008/layout/LinedList"/>
+    <dgm:cxn modelId="{27AAE783-DF65-493E-A558-5D9419C43B4F}" type="presOf" srcId="{1A270EF2-B54C-42C5-90A0-BEAEEE0EA7F7}" destId="{F61C7BB7-4804-4ABF-B4FC-152C120EF1C4}" srcOrd="0" destOrd="0" presId="urn:microsoft.com/office/officeart/2008/layout/LinedList"/>
+    <dgm:cxn modelId="{F7D0C692-9D6A-4B2A-ACE5-853E7DD64A80}" srcId="{507EC6F4-C02D-4AAE-BBFA-25B753F7A16E}" destId="{1A270EF2-B54C-42C5-90A0-BEAEEE0EA7F7}" srcOrd="2" destOrd="0" parTransId="{FD42FB86-9E66-45EA-9587-C007FF3559D1}" sibTransId="{E73DDF7A-6799-4674-B561-61F594E7DF3B}"/>
+    <dgm:cxn modelId="{A127259D-6C13-4D49-829A-116E5ADF2D0A}" type="presOf" srcId="{507EC6F4-C02D-4AAE-BBFA-25B753F7A16E}" destId="{E58C3805-475E-4689-8BA4-18F76034A3D4}" srcOrd="0" destOrd="0" presId="urn:microsoft.com/office/officeart/2008/layout/LinedList"/>
     <dgm:cxn modelId="{231381AF-FA21-45FD-AC17-4894CF6D0DF5}" srcId="{507EC6F4-C02D-4AAE-BBFA-25B753F7A16E}" destId="{F840A262-8447-467E-8CD1-6C1102C35342}" srcOrd="3" destOrd="0" parTransId="{60ECE8FA-58D3-4ADB-A5AB-AAA314D6ABED}" sibTransId="{B351DFCA-8311-4F35-B05C-EB575BB6B63B}"/>
     <dgm:cxn modelId="{FB691FB9-921C-40AB-850C-3CBB78035597}" type="presOf" srcId="{4FE625AE-B256-46B5-B961-8C1705F8C13B}" destId="{6FAA08E1-B284-4112-823F-2EDB0376823E}" srcOrd="0" destOrd="0" presId="urn:microsoft.com/office/officeart/2008/layout/LinedList"/>
-    <dgm:cxn modelId="{3577E339-F313-421D-8FFC-49A160D76F52}" srcId="{507EC6F4-C02D-4AAE-BBFA-25B753F7A16E}" destId="{4FE625AE-B256-46B5-B961-8C1705F8C13B}" srcOrd="1" destOrd="0" parTransId="{7C8CAFD8-44CD-4116-8F7B-260CFB8E1920}" sibTransId="{910A2A32-B4B0-4E86-93A2-83E7DBEE7F47}"/>
-    <dgm:cxn modelId="{F7D0C692-9D6A-4B2A-ACE5-853E7DD64A80}" srcId="{507EC6F4-C02D-4AAE-BBFA-25B753F7A16E}" destId="{1A270EF2-B54C-42C5-90A0-BEAEEE0EA7F7}" srcOrd="2" destOrd="0" parTransId="{FD42FB86-9E66-45EA-9587-C007FF3559D1}" sibTransId="{E73DDF7A-6799-4674-B561-61F594E7DF3B}"/>
-    <dgm:cxn modelId="{27AAE783-DF65-493E-A558-5D9419C43B4F}" type="presOf" srcId="{1A270EF2-B54C-42C5-90A0-BEAEEE0EA7F7}" destId="{F61C7BB7-4804-4ABF-B4FC-152C120EF1C4}" srcOrd="0" destOrd="0" presId="urn:microsoft.com/office/officeart/2008/layout/LinedList"/>
-    <dgm:cxn modelId="{C7006883-4BF0-472B-9BCA-59E6D23AD832}" type="presOf" srcId="{F840A262-8447-467E-8CD1-6C1102C35342}" destId="{1DAE29DE-17CA-4955-B3A4-6E962056C8F6}" srcOrd="0" destOrd="0" presId="urn:microsoft.com/office/officeart/2008/layout/LinedList"/>
     <dgm:cxn modelId="{F55E7FEB-6D9B-4070-A66E-C088FC4807D6}" srcId="{507EC6F4-C02D-4AAE-BBFA-25B753F7A16E}" destId="{40F480B9-5185-4903-84F4-F28DE27221CC}" srcOrd="0" destOrd="0" parTransId="{32721A24-0FEA-4D0A-91AC-5BEDBC3B1509}" sibTransId="{F8F22EF7-3119-4F2E-BEA7-84827630CD99}"/>
-    <dgm:cxn modelId="{E424BB4E-C3C0-4E0E-B376-AA58030F127D}" type="presOf" srcId="{40F480B9-5185-4903-84F4-F28DE27221CC}" destId="{29C823AE-3170-4FA5-A755-C88A48738C1C}" srcOrd="0" destOrd="0" presId="urn:microsoft.com/office/officeart/2008/layout/LinedList"/>
-    <dgm:cxn modelId="{A127259D-6C13-4D49-829A-116E5ADF2D0A}" type="presOf" srcId="{507EC6F4-C02D-4AAE-BBFA-25B753F7A16E}" destId="{E58C3805-475E-4689-8BA4-18F76034A3D4}" srcOrd="0" destOrd="0" presId="urn:microsoft.com/office/officeart/2008/layout/LinedList"/>
     <dgm:cxn modelId="{B646635C-980B-422E-AB64-D4C3D49940DF}" type="presParOf" srcId="{E58C3805-475E-4689-8BA4-18F76034A3D4}" destId="{4F5A4815-2E29-479E-8863-7ABAC99F7CE4}" srcOrd="0" destOrd="0" presId="urn:microsoft.com/office/officeart/2008/layout/LinedList"/>
     <dgm:cxn modelId="{3150F983-E7D3-42AA-9D2C-11AABAFBFE1A}" type="presParOf" srcId="{E58C3805-475E-4689-8BA4-18F76034A3D4}" destId="{D66CD0F7-A12D-47C9-ACC4-BB160D692280}" srcOrd="1" destOrd="0" presId="urn:microsoft.com/office/officeart/2008/layout/LinedList"/>
     <dgm:cxn modelId="{F4C90A4F-14D2-42A3-B428-F3F82907418B}" type="presParOf" srcId="{D66CD0F7-A12D-47C9-ACC4-BB160D692280}" destId="{29C823AE-3170-4FA5-A755-C88A48738C1C}" srcOrd="0" destOrd="0" presId="urn:microsoft.com/office/officeart/2008/layout/LinedList"/>
@@ -7708,7 +7371,7 @@
         </a:bodyPr>
         <a:lstStyle/>
         <a:p>
-          <a:pPr lvl="0" algn="ctr" defTabSz="977900">
+          <a:pPr marL="0" lvl="0" indent="0" algn="ctr" defTabSz="977900">
             <a:lnSpc>
               <a:spcPct val="90000"/>
             </a:lnSpc>
@@ -7718,6 +7381,7 @@
             <a:spcAft>
               <a:spcPct val="35000"/>
             </a:spcAft>
+            <a:buNone/>
           </a:pPr>
           <a:r>
             <a:rPr lang="es-ES" sz="2200" kern="1200" dirty="0"/>
@@ -7777,7 +7441,7 @@
         </a:bodyPr>
         <a:lstStyle/>
         <a:p>
-          <a:pPr lvl="0" algn="ctr" defTabSz="533400">
+          <a:pPr marL="0" lvl="0" indent="0" algn="ctr" defTabSz="533400">
             <a:lnSpc>
               <a:spcPct val="90000"/>
             </a:lnSpc>
@@ -7787,6 +7451,7 @@
             <a:spcAft>
               <a:spcPct val="35000"/>
             </a:spcAft>
+            <a:buNone/>
           </a:pPr>
           <a:endParaRPr lang="es-ES" sz="1200" kern="1200"/>
         </a:p>
@@ -7852,7 +7517,7 @@
         </a:bodyPr>
         <a:lstStyle/>
         <a:p>
-          <a:pPr lvl="0" algn="ctr" defTabSz="977900">
+          <a:pPr marL="0" lvl="0" indent="0" algn="ctr" defTabSz="977900">
             <a:lnSpc>
               <a:spcPct val="90000"/>
             </a:lnSpc>
@@ -7862,6 +7527,7 @@
             <a:spcAft>
               <a:spcPct val="35000"/>
             </a:spcAft>
+            <a:buNone/>
           </a:pPr>
           <a:r>
             <a:rPr lang="es-ES" sz="2200" kern="1200" dirty="0"/>
@@ -7921,7 +7587,7 @@
         </a:bodyPr>
         <a:lstStyle/>
         <a:p>
-          <a:pPr lvl="0" algn="ctr" defTabSz="533400">
+          <a:pPr marL="0" lvl="0" indent="0" algn="ctr" defTabSz="533400">
             <a:lnSpc>
               <a:spcPct val="90000"/>
             </a:lnSpc>
@@ -7931,6 +7597,7 @@
             <a:spcAft>
               <a:spcPct val="35000"/>
             </a:spcAft>
+            <a:buNone/>
           </a:pPr>
           <a:endParaRPr lang="es-ES" sz="1200" kern="1200"/>
         </a:p>
@@ -7996,7 +7663,7 @@
         </a:bodyPr>
         <a:lstStyle/>
         <a:p>
-          <a:pPr lvl="0" algn="ctr" defTabSz="977900">
+          <a:pPr marL="0" lvl="0" indent="0" algn="ctr" defTabSz="977900">
             <a:lnSpc>
               <a:spcPct val="90000"/>
             </a:lnSpc>
@@ -8006,6 +7673,7 @@
             <a:spcAft>
               <a:spcPct val="35000"/>
             </a:spcAft>
+            <a:buNone/>
           </a:pPr>
           <a:r>
             <a:rPr lang="es-ES" sz="2200" kern="1200" dirty="0"/>
@@ -8065,7 +7733,7 @@
         </a:bodyPr>
         <a:lstStyle/>
         <a:p>
-          <a:pPr lvl="0" algn="ctr" defTabSz="533400">
+          <a:pPr marL="0" lvl="0" indent="0" algn="ctr" defTabSz="533400">
             <a:lnSpc>
               <a:spcPct val="90000"/>
             </a:lnSpc>
@@ -8075,6 +7743,7 @@
             <a:spcAft>
               <a:spcPct val="35000"/>
             </a:spcAft>
+            <a:buNone/>
           </a:pPr>
           <a:endParaRPr lang="es-ES" sz="1200" kern="1200"/>
         </a:p>
@@ -8194,7 +7863,7 @@
         </a:bodyPr>
         <a:lstStyle/>
         <a:p>
-          <a:pPr lvl="0" algn="l" defTabSz="533400">
+          <a:pPr marL="0" lvl="0" indent="0" algn="l" defTabSz="533400">
             <a:lnSpc>
               <a:spcPct val="90000"/>
             </a:lnSpc>
@@ -8204,6 +7873,7 @@
             <a:spcAft>
               <a:spcPct val="35000"/>
             </a:spcAft>
+            <a:buNone/>
           </a:pPr>
           <a:r>
             <a:rPr lang="en-US" sz="1200" b="0" i="0" kern="1200" dirty="0"/>
@@ -8322,7 +7992,7 @@
         </a:bodyPr>
         <a:lstStyle/>
         <a:p>
-          <a:pPr lvl="0" algn="l" defTabSz="533400">
+          <a:pPr marL="0" lvl="0" indent="0" algn="l" defTabSz="533400">
             <a:lnSpc>
               <a:spcPct val="90000"/>
             </a:lnSpc>
@@ -8332,6 +8002,7 @@
             <a:spcAft>
               <a:spcPct val="35000"/>
             </a:spcAft>
+            <a:buNone/>
           </a:pPr>
           <a:r>
             <a:rPr lang="en-US" sz="1200" b="0" i="0" kern="1200" dirty="0" err="1"/>
@@ -8462,7 +8133,7 @@
         </a:bodyPr>
         <a:lstStyle/>
         <a:p>
-          <a:pPr lvl="0" algn="l" defTabSz="533400">
+          <a:pPr marL="0" lvl="0" indent="0" algn="l" defTabSz="533400">
             <a:lnSpc>
               <a:spcPct val="90000"/>
             </a:lnSpc>
@@ -8472,6 +8143,7 @@
             <a:spcAft>
               <a:spcPct val="35000"/>
             </a:spcAft>
+            <a:buNone/>
           </a:pPr>
           <a:r>
             <a:rPr lang="en-US" sz="1200" b="0" i="0" kern="1200" dirty="0" err="1"/>
@@ -8626,7 +8298,7 @@
         </a:bodyPr>
         <a:lstStyle/>
         <a:p>
-          <a:pPr lvl="0" algn="l" defTabSz="533400">
+          <a:pPr marL="0" lvl="0" indent="0" algn="l" defTabSz="533400">
             <a:lnSpc>
               <a:spcPct val="90000"/>
             </a:lnSpc>
@@ -8636,6 +8308,7 @@
             <a:spcAft>
               <a:spcPct val="35000"/>
             </a:spcAft>
+            <a:buNone/>
           </a:pPr>
           <a:r>
             <a:rPr lang="en-US" sz="1200" b="0" i="0" kern="1200" dirty="0" err="1"/>
@@ -8772,7 +8445,7 @@
         </a:bodyPr>
         <a:lstStyle/>
         <a:p>
-          <a:pPr lvl="0" algn="l" defTabSz="444500">
+          <a:pPr marL="0" lvl="0" indent="0" algn="l" defTabSz="444500">
             <a:lnSpc>
               <a:spcPct val="90000"/>
             </a:lnSpc>
@@ -8782,6 +8455,7 @@
             <a:spcAft>
               <a:spcPct val="35000"/>
             </a:spcAft>
+            <a:buNone/>
           </a:pPr>
           <a:r>
             <a:rPr lang="es-ES" sz="1000" b="0" kern="1200" dirty="0"/>
@@ -8866,7 +8540,7 @@
         </a:bodyPr>
         <a:lstStyle/>
         <a:p>
-          <a:pPr lvl="0" algn="l" defTabSz="444500">
+          <a:pPr marL="0" lvl="0" indent="0" algn="l" defTabSz="444500">
             <a:lnSpc>
               <a:spcPct val="90000"/>
             </a:lnSpc>
@@ -8876,6 +8550,7 @@
             <a:spcAft>
               <a:spcPct val="35000"/>
             </a:spcAft>
+            <a:buNone/>
           </a:pPr>
           <a:r>
             <a:rPr lang="en-US" sz="1000" b="0" i="0" kern="1200" dirty="0" err="1"/>
@@ -8969,7 +8644,7 @@
         </a:bodyPr>
         <a:lstStyle/>
         <a:p>
-          <a:pPr lvl="0" algn="l" defTabSz="444500">
+          <a:pPr marL="0" lvl="0" indent="0" algn="l" defTabSz="444500">
             <a:lnSpc>
               <a:spcPct val="90000"/>
             </a:lnSpc>
@@ -8979,6 +8654,7 @@
             <a:spcAft>
               <a:spcPct val="35000"/>
             </a:spcAft>
+            <a:buNone/>
           </a:pPr>
           <a:r>
             <a:rPr lang="es-ES" sz="1000" b="0" kern="1200" dirty="0"/>
@@ -9055,7 +8731,7 @@
         </a:bodyPr>
         <a:lstStyle/>
         <a:p>
-          <a:pPr lvl="0" algn="l" defTabSz="444500">
+          <a:pPr marL="0" lvl="0" indent="0" algn="l" defTabSz="444500">
             <a:lnSpc>
               <a:spcPct val="90000"/>
             </a:lnSpc>
@@ -9065,6 +8741,7 @@
             <a:spcAft>
               <a:spcPct val="35000"/>
             </a:spcAft>
+            <a:buNone/>
           </a:pPr>
           <a:r>
             <a:rPr lang="en-US" sz="1000" b="0" i="0" kern="1200" dirty="0" err="1"/>
@@ -9150,7 +8827,7 @@
         </a:bodyPr>
         <a:lstStyle/>
         <a:p>
-          <a:pPr lvl="0" algn="l" defTabSz="444500">
+          <a:pPr marL="0" lvl="0" indent="0" algn="l" defTabSz="444500">
             <a:lnSpc>
               <a:spcPct val="90000"/>
             </a:lnSpc>
@@ -9160,6 +8837,7 @@
             <a:spcAft>
               <a:spcPct val="35000"/>
             </a:spcAft>
+            <a:buNone/>
           </a:pPr>
           <a:r>
             <a:rPr lang="es-ES" sz="1000" b="0" kern="1200" dirty="0"/>
@@ -9239,7 +8917,7 @@
         </a:bodyPr>
         <a:lstStyle/>
         <a:p>
-          <a:pPr lvl="0" algn="ctr" defTabSz="444500">
+          <a:pPr marL="0" lvl="0" indent="0" algn="ctr" defTabSz="444500">
             <a:lnSpc>
               <a:spcPct val="90000"/>
             </a:lnSpc>
@@ -9249,6 +8927,7 @@
             <a:spcAft>
               <a:spcPct val="35000"/>
             </a:spcAft>
+            <a:buNone/>
           </a:pPr>
           <a:endParaRPr lang="es-ES" sz="1000" kern="1200"/>
         </a:p>
@@ -9317,7 +8996,7 @@
         </a:bodyPr>
         <a:lstStyle/>
         <a:p>
-          <a:pPr lvl="0" algn="ctr" defTabSz="444500">
+          <a:pPr marL="0" lvl="0" indent="0" algn="ctr" defTabSz="444500">
             <a:lnSpc>
               <a:spcPct val="90000"/>
             </a:lnSpc>
@@ -9327,6 +9006,7 @@
             <a:spcAft>
               <a:spcPct val="35000"/>
             </a:spcAft>
+            <a:buNone/>
           </a:pPr>
           <a:endParaRPr lang="es-ES" sz="1000" kern="1200"/>
         </a:p>
@@ -9395,7 +9075,7 @@
         </a:bodyPr>
         <a:lstStyle/>
         <a:p>
-          <a:pPr lvl="0" algn="ctr" defTabSz="444500">
+          <a:pPr marL="0" lvl="0" indent="0" algn="ctr" defTabSz="444500">
             <a:lnSpc>
               <a:spcPct val="90000"/>
             </a:lnSpc>
@@ -9405,6 +9085,7 @@
             <a:spcAft>
               <a:spcPct val="35000"/>
             </a:spcAft>
+            <a:buNone/>
           </a:pPr>
           <a:endParaRPr lang="es-ES" sz="1000" kern="1200"/>
         </a:p>
@@ -9473,7 +9154,7 @@
         </a:bodyPr>
         <a:lstStyle/>
         <a:p>
-          <a:pPr lvl="0" algn="ctr" defTabSz="444500">
+          <a:pPr marL="0" lvl="0" indent="0" algn="ctr" defTabSz="444500">
             <a:lnSpc>
               <a:spcPct val="90000"/>
             </a:lnSpc>
@@ -9483,6 +9164,7 @@
             <a:spcAft>
               <a:spcPct val="35000"/>
             </a:spcAft>
+            <a:buNone/>
           </a:pPr>
           <a:endParaRPr lang="es-ES" sz="1000" kern="1200"/>
         </a:p>
@@ -9581,7 +9263,7 @@
         </a:bodyPr>
         <a:lstStyle/>
         <a:p>
-          <a:pPr lvl="0" algn="ctr" defTabSz="533400">
+          <a:pPr marL="0" lvl="0" indent="0" algn="ctr" defTabSz="533400">
             <a:lnSpc>
               <a:spcPct val="90000"/>
             </a:lnSpc>
@@ -9591,6 +9273,7 @@
             <a:spcAft>
               <a:spcPct val="35000"/>
             </a:spcAft>
+            <a:buNone/>
           </a:pPr>
           <a:r>
             <a:rPr lang="es-ES" sz="1200" b="0" i="0" kern="1200" dirty="0"/>
@@ -9690,7 +9373,7 @@
         </a:bodyPr>
         <a:lstStyle/>
         <a:p>
-          <a:pPr lvl="0" algn="ctr" defTabSz="533400">
+          <a:pPr marL="0" lvl="0" indent="0" algn="ctr" defTabSz="533400">
             <a:lnSpc>
               <a:spcPct val="90000"/>
             </a:lnSpc>
@@ -9700,6 +9383,7 @@
             <a:spcAft>
               <a:spcPct val="35000"/>
             </a:spcAft>
+            <a:buNone/>
           </a:pPr>
           <a:r>
             <a:rPr lang="es-ES" sz="1200" b="0" i="0" kern="1200" dirty="0"/>
@@ -9799,7 +9483,7 @@
         </a:bodyPr>
         <a:lstStyle/>
         <a:p>
-          <a:pPr lvl="0" algn="ctr" defTabSz="533400">
+          <a:pPr marL="0" lvl="0" indent="0" algn="ctr" defTabSz="533400">
             <a:lnSpc>
               <a:spcPct val="90000"/>
             </a:lnSpc>
@@ -9809,6 +9493,7 @@
             <a:spcAft>
               <a:spcPct val="35000"/>
             </a:spcAft>
+            <a:buNone/>
           </a:pPr>
           <a:r>
             <a:rPr lang="es-ES" sz="1200" b="0" i="0" kern="1200" dirty="0"/>
@@ -9908,7 +9593,7 @@
         </a:bodyPr>
         <a:lstStyle/>
         <a:p>
-          <a:pPr lvl="0" algn="ctr" defTabSz="533400">
+          <a:pPr marL="0" lvl="0" indent="0" algn="ctr" defTabSz="533400">
             <a:lnSpc>
               <a:spcPct val="90000"/>
             </a:lnSpc>
@@ -9918,6 +9603,7 @@
             <a:spcAft>
               <a:spcPct val="35000"/>
             </a:spcAft>
+            <a:buNone/>
           </a:pPr>
           <a:r>
             <a:rPr lang="es-ES" sz="1200" b="0" i="0" kern="1200" dirty="0"/>
@@ -10017,7 +9703,7 @@
         </a:bodyPr>
         <a:lstStyle/>
         <a:p>
-          <a:pPr lvl="0" algn="ctr" defTabSz="533400">
+          <a:pPr marL="0" lvl="0" indent="0" algn="ctr" defTabSz="533400">
             <a:lnSpc>
               <a:spcPct val="90000"/>
             </a:lnSpc>
@@ -10027,6 +9713,7 @@
             <a:spcAft>
               <a:spcPct val="35000"/>
             </a:spcAft>
+            <a:buNone/>
           </a:pPr>
           <a:r>
             <a:rPr lang="es-ES" sz="1200" b="0" i="0" kern="1200" dirty="0"/>
@@ -10188,7 +9875,7 @@
         </a:bodyPr>
         <a:lstStyle/>
         <a:p>
-          <a:pPr lvl="0" algn="l" defTabSz="533400">
+          <a:pPr marL="0" lvl="0" indent="0" algn="l" defTabSz="533400">
             <a:lnSpc>
               <a:spcPct val="90000"/>
             </a:lnSpc>
@@ -10198,6 +9885,7 @@
             <a:spcAft>
               <a:spcPct val="35000"/>
             </a:spcAft>
+            <a:buNone/>
           </a:pPr>
           <a:r>
             <a:rPr lang="en-GB" sz="1200" b="0" i="0" kern="1200" dirty="0"/>
@@ -10298,7 +9986,7 @@
         </a:bodyPr>
         <a:lstStyle/>
         <a:p>
-          <a:pPr lvl="0" algn="l" defTabSz="533400">
+          <a:pPr marL="0" lvl="0" indent="0" algn="l" defTabSz="533400">
             <a:lnSpc>
               <a:spcPct val="90000"/>
             </a:lnSpc>
@@ -10308,6 +9996,7 @@
             <a:spcAft>
               <a:spcPct val="35000"/>
             </a:spcAft>
+            <a:buNone/>
           </a:pPr>
           <a:r>
             <a:rPr lang="en-GB" sz="1200" b="0" i="0" kern="1200" dirty="0"/>
@@ -10408,7 +10097,7 @@
         </a:bodyPr>
         <a:lstStyle/>
         <a:p>
-          <a:pPr lvl="0" algn="l" defTabSz="533400">
+          <a:pPr marL="0" lvl="0" indent="0" algn="l" defTabSz="533400">
             <a:lnSpc>
               <a:spcPct val="90000"/>
             </a:lnSpc>
@@ -10418,6 +10107,7 @@
             <a:spcAft>
               <a:spcPct val="35000"/>
             </a:spcAft>
+            <a:buNone/>
           </a:pPr>
           <a:r>
             <a:rPr lang="en-GB" sz="1200" b="0" i="0" kern="1200" dirty="0"/>
@@ -10538,7 +10228,7 @@
         </a:bodyPr>
         <a:lstStyle/>
         <a:p>
-          <a:pPr lvl="0" algn="l" defTabSz="533400">
+          <a:pPr marL="0" lvl="0" indent="0" algn="l" defTabSz="533400">
             <a:lnSpc>
               <a:spcPct val="90000"/>
             </a:lnSpc>
@@ -10548,6 +10238,7 @@
             <a:spcAft>
               <a:spcPct val="35000"/>
             </a:spcAft>
+            <a:buNone/>
           </a:pPr>
           <a:r>
             <a:rPr lang="en-GB" sz="1200" b="0" i="0" kern="1200" dirty="0"/>
@@ -10660,7 +10351,7 @@
         </a:bodyPr>
         <a:lstStyle/>
         <a:p>
-          <a:pPr lvl="0" algn="l" defTabSz="533400">
+          <a:pPr marL="0" lvl="0" indent="0" algn="l" defTabSz="533400">
             <a:lnSpc>
               <a:spcPct val="90000"/>
             </a:lnSpc>
@@ -10670,6 +10361,7 @@
             <a:spcAft>
               <a:spcPct val="35000"/>
             </a:spcAft>
+            <a:buNone/>
           </a:pPr>
           <a:r>
             <a:rPr lang="en-GB" sz="1200" b="0" i="0" u="sng" kern="1200" dirty="0">
@@ -10790,7 +10482,7 @@
         </a:bodyPr>
         <a:lstStyle/>
         <a:p>
-          <a:pPr lvl="0" algn="l" defTabSz="622300">
+          <a:pPr marL="0" lvl="0" indent="0" algn="l" defTabSz="622300">
             <a:lnSpc>
               <a:spcPct val="90000"/>
             </a:lnSpc>
@@ -10800,13 +10492,14 @@
             <a:spcAft>
               <a:spcPct val="35000"/>
             </a:spcAft>
+            <a:buNone/>
           </a:pPr>
           <a:r>
-            <a:rPr lang="en-US" sz="1400" b="0" i="0" kern="1200" dirty="0" smtClean="0"/>
+            <a:rPr lang="en-US" sz="1400" b="0" i="0" kern="1200" dirty="0"/>
             <a:t>Early </a:t>
           </a:r>
           <a:r>
-            <a:rPr lang="en-GB" sz="1400" b="0" i="0" u="sng" kern="1200" dirty="0" smtClean="0">
+            <a:rPr lang="en-GB" sz="1400" b="0" i="0" u="sng" kern="1200" dirty="0">
               <a:highlight>
                 <a:srgbClr val="CC95ED"/>
               </a:highlight>
@@ -10814,11 +10507,11 @@
             <a:t>research</a:t>
           </a:r>
           <a:r>
-            <a:rPr lang="en-GB" sz="1400" b="0" i="0" kern="1200" dirty="0" smtClean="0"/>
+            <a:rPr lang="en-GB" sz="1400" b="0" i="0" kern="1200" dirty="0"/>
             <a:t> </a:t>
           </a:r>
           <a:r>
-            <a:rPr lang="en-US" sz="1400" b="0" i="0" kern="1200" dirty="0" smtClean="0"/>
+            <a:rPr lang="en-US" sz="1400" b="0" i="0" kern="1200" dirty="0"/>
             <a:t>on adaptability, Bluetooth technology and positioning.</a:t>
           </a:r>
           <a:endParaRPr lang="es-ES" sz="1400" kern="1200" dirty="0"/>
@@ -10916,7 +10609,7 @@
         </a:bodyPr>
         <a:lstStyle/>
         <a:p>
-          <a:pPr lvl="0" algn="l" defTabSz="622300">
+          <a:pPr marL="0" lvl="0" indent="0" algn="l" defTabSz="622300">
             <a:lnSpc>
               <a:spcPct val="90000"/>
             </a:lnSpc>
@@ -10926,9 +10619,10 @@
             <a:spcAft>
               <a:spcPct val="35000"/>
             </a:spcAft>
+            <a:buNone/>
           </a:pPr>
           <a:r>
-            <a:rPr lang="en-GB" sz="1400" b="0" i="0" u="sng" kern="1200" dirty="0" smtClean="0">
+            <a:rPr lang="en-GB" sz="1400" b="0" i="0" u="sng" kern="1200" dirty="0">
               <a:highlight>
                 <a:srgbClr val="CC95ED"/>
               </a:highlight>
@@ -10936,15 +10630,15 @@
             <a:t>Mapping</a:t>
           </a:r>
           <a:r>
-            <a:rPr lang="en-GB" sz="1400" b="0" i="0" kern="1200" dirty="0" smtClean="0"/>
+            <a:rPr lang="en-GB" sz="1400" b="0" i="0" kern="1200" dirty="0"/>
             <a:t> </a:t>
           </a:r>
           <a:r>
-            <a:rPr lang="en-US" sz="1400" kern="1200" dirty="0" smtClean="0"/>
+            <a:rPr lang="en-US" sz="1400" kern="1200" dirty="0"/>
             <a:t>of the Faculty of Computer Science</a:t>
           </a:r>
           <a:r>
-            <a:rPr lang="en-US" sz="1900" kern="1200" dirty="0" smtClean="0"/>
+            <a:rPr lang="en-US" sz="1900" kern="1200" dirty="0"/>
             <a:t>.</a:t>
           </a:r>
           <a:endParaRPr lang="es-ES" sz="1900" kern="1200" dirty="0"/>
@@ -11042,7 +10736,7 @@
         </a:bodyPr>
         <a:lstStyle/>
         <a:p>
-          <a:pPr lvl="0" algn="l" defTabSz="622300">
+          <a:pPr marL="0" lvl="0" indent="0" algn="l" defTabSz="622300">
             <a:lnSpc>
               <a:spcPct val="90000"/>
             </a:lnSpc>
@@ -11052,25 +10746,26 @@
             <a:spcAft>
               <a:spcPct val="35000"/>
             </a:spcAft>
+            <a:buNone/>
           </a:pPr>
           <a:r>
-            <a:rPr lang="es-ES" sz="1400" kern="1200" dirty="0" err="1" smtClean="0"/>
+            <a:rPr lang="es-ES" sz="1400" kern="1200" dirty="0" err="1"/>
             <a:t>Much</a:t>
           </a:r>
           <a:r>
-            <a:rPr lang="es-ES" sz="1400" kern="1200" dirty="0" smtClean="0"/>
+            <a:rPr lang="es-ES" sz="1400" kern="1200" dirty="0"/>
             <a:t> of </a:t>
           </a:r>
           <a:r>
-            <a:rPr lang="es-ES" sz="1400" kern="1200" dirty="0" err="1" smtClean="0"/>
+            <a:rPr lang="es-ES" sz="1400" kern="1200" dirty="0" err="1"/>
             <a:t>the</a:t>
           </a:r>
           <a:r>
-            <a:rPr lang="es-ES" sz="1400" kern="1200" dirty="0" smtClean="0"/>
+            <a:rPr lang="es-ES" sz="1400" kern="1200" dirty="0"/>
             <a:t> </a:t>
           </a:r>
           <a:r>
-            <a:rPr lang="en-GB" sz="1400" b="0" i="0" u="sng" kern="1200" dirty="0" smtClean="0">
+            <a:rPr lang="en-GB" sz="1400" b="0" i="0" u="sng" kern="1200" dirty="0">
               <a:highlight>
                 <a:srgbClr val="CC95ED"/>
               </a:highlight>
@@ -11078,19 +10773,19 @@
             <a:t>client</a:t>
           </a:r>
           <a:r>
-            <a:rPr lang="en-GB" sz="1400" b="0" i="0" kern="1200" dirty="0" smtClean="0"/>
+            <a:rPr lang="en-GB" sz="1400" b="0" i="0" kern="1200" dirty="0"/>
             <a:t> </a:t>
           </a:r>
           <a:r>
-            <a:rPr lang="es-ES" sz="1400" kern="1200" dirty="0" err="1" smtClean="0"/>
+            <a:rPr lang="es-ES" sz="1400" kern="1200" dirty="0" err="1"/>
             <a:t>code</a:t>
           </a:r>
           <a:r>
-            <a:rPr lang="es-ES" sz="1400" kern="1200" dirty="0" smtClean="0"/>
+            <a:rPr lang="es-ES" sz="1400" kern="1200" dirty="0"/>
             <a:t> </a:t>
           </a:r>
           <a:r>
-            <a:rPr lang="es-ES" sz="1400" kern="1200" dirty="0" smtClean="0">
+            <a:rPr lang="es-ES" sz="1400" kern="1200" dirty="0">
               <a:solidFill>
                 <a:schemeClr val="dk1"/>
               </a:solidFill>
@@ -11100,7 +10795,7 @@
             <a:t></a:t>
           </a:r>
           <a:r>
-            <a:rPr lang="es-ES" sz="1400" kern="1200" dirty="0" smtClean="0">
+            <a:rPr lang="es-ES" sz="1400" kern="1200" dirty="0">
               <a:solidFill>
                 <a:schemeClr val="dk1"/>
               </a:solidFill>
@@ -11110,7 +10805,7 @@
             <a:t> </a:t>
           </a:r>
           <a:r>
-            <a:rPr lang="es-ES" sz="1400" kern="1200" dirty="0" err="1" smtClean="0">
+            <a:rPr lang="es-ES" sz="1400" kern="1200" dirty="0" err="1">
               <a:solidFill>
                 <a:schemeClr val="dk1"/>
               </a:solidFill>
@@ -11120,7 +10815,7 @@
             <a:t>Layaouts</a:t>
           </a:r>
           <a:r>
-            <a:rPr lang="es-ES" sz="1400" kern="1200" dirty="0" smtClean="0">
+            <a:rPr lang="es-ES" sz="1400" kern="1200" dirty="0">
               <a:solidFill>
                 <a:schemeClr val="dk1"/>
               </a:solidFill>
@@ -11130,7 +10825,7 @@
             <a:t>, </a:t>
           </a:r>
           <a:r>
-            <a:rPr lang="es-ES" sz="1400" kern="1200" dirty="0" err="1" smtClean="0">
+            <a:rPr lang="es-ES" sz="1400" kern="1200" dirty="0" err="1">
               <a:solidFill>
                 <a:schemeClr val="dk1"/>
               </a:solidFill>
@@ -11140,7 +10835,7 @@
             <a:t>button’s</a:t>
           </a:r>
           <a:r>
-            <a:rPr lang="es-ES" sz="1400" kern="1200" dirty="0" smtClean="0">
+            <a:rPr lang="es-ES" sz="1400" kern="1200" dirty="0">
               <a:solidFill>
                 <a:schemeClr val="dk1"/>
               </a:solidFill>
@@ -11150,7 +10845,7 @@
             <a:t> </a:t>
           </a:r>
           <a:r>
-            <a:rPr lang="es-ES" sz="1400" kern="1200" dirty="0" err="1" smtClean="0">
+            <a:rPr lang="es-ES" sz="1400" kern="1200" dirty="0" err="1">
               <a:solidFill>
                 <a:schemeClr val="dk1"/>
               </a:solidFill>
@@ -11160,7 +10855,7 @@
             <a:t>functionalities</a:t>
           </a:r>
           <a:r>
-            <a:rPr lang="es-ES" sz="1400" kern="1200" dirty="0" smtClean="0">
+            <a:rPr lang="es-ES" sz="1400" kern="1200" dirty="0">
               <a:solidFill>
                 <a:schemeClr val="dk1"/>
               </a:solidFill>
@@ -11170,7 +10865,7 @@
             <a:t>, </a:t>
           </a:r>
           <a:r>
-            <a:rPr lang="es-ES" sz="1400" kern="1200" dirty="0" err="1" smtClean="0">
+            <a:rPr lang="es-ES" sz="1400" kern="1200" dirty="0" err="1">
               <a:solidFill>
                 <a:schemeClr val="dk1"/>
               </a:solidFill>
@@ -11180,7 +10875,7 @@
             <a:t>generalization</a:t>
           </a:r>
           <a:r>
-            <a:rPr lang="es-ES" sz="1400" kern="1200" dirty="0" smtClean="0">
+            <a:rPr lang="es-ES" sz="1400" kern="1200" dirty="0">
               <a:solidFill>
                 <a:schemeClr val="dk1"/>
               </a:solidFill>
@@ -11190,7 +10885,7 @@
             <a:t> of </a:t>
           </a:r>
           <a:r>
-            <a:rPr lang="es-ES" sz="1400" kern="1200" dirty="0" err="1" smtClean="0">
+            <a:rPr lang="es-ES" sz="1400" kern="1200" dirty="0" err="1">
               <a:solidFill>
                 <a:schemeClr val="dk1"/>
               </a:solidFill>
@@ -11200,7 +10895,7 @@
             <a:t>the</a:t>
           </a:r>
           <a:r>
-            <a:rPr lang="es-ES" sz="1400" kern="1200" dirty="0" smtClean="0">
+            <a:rPr lang="es-ES" sz="1400" kern="1200" dirty="0">
               <a:solidFill>
                 <a:schemeClr val="dk1"/>
               </a:solidFill>
@@ -11210,7 +10905,7 @@
             <a:t> </a:t>
           </a:r>
           <a:r>
-            <a:rPr lang="es-ES" sz="1400" kern="1200" dirty="0" err="1" smtClean="0">
+            <a:rPr lang="es-ES" sz="1400" kern="1200" dirty="0" err="1">
               <a:solidFill>
                 <a:schemeClr val="dk1"/>
               </a:solidFill>
@@ -11220,7 +10915,7 @@
             <a:t>code</a:t>
           </a:r>
           <a:r>
-            <a:rPr lang="es-ES" sz="1400" kern="1200" dirty="0" smtClean="0">
+            <a:rPr lang="es-ES" sz="1400" kern="1200" dirty="0">
               <a:solidFill>
                 <a:schemeClr val="dk1"/>
               </a:solidFill>
@@ -11324,7 +11019,7 @@
         </a:bodyPr>
         <a:lstStyle/>
         <a:p>
-          <a:pPr lvl="0" algn="l" defTabSz="622300">
+          <a:pPr marL="0" lvl="0" indent="0" algn="l" defTabSz="622300">
             <a:lnSpc>
               <a:spcPct val="90000"/>
             </a:lnSpc>
@@ -11334,9 +11029,10 @@
             <a:spcAft>
               <a:spcPct val="35000"/>
             </a:spcAft>
+            <a:buNone/>
           </a:pPr>
           <a:r>
-            <a:rPr lang="en-GB" sz="1400" b="0" i="0" u="sng" kern="1200" dirty="0" smtClean="0">
+            <a:rPr lang="en-GB" sz="1400" b="0" i="0" u="sng" kern="1200" dirty="0">
               <a:highlight>
                 <a:srgbClr val="CC95ED"/>
               </a:highlight>
@@ -11344,31 +11040,31 @@
             <a:t>Mapping</a:t>
           </a:r>
           <a:r>
-            <a:rPr lang="en-GB" sz="1400" b="0" i="0" kern="1200" dirty="0" smtClean="0"/>
+            <a:rPr lang="en-GB" sz="1400" b="0" i="0" kern="1200" dirty="0"/>
             <a:t> </a:t>
           </a:r>
           <a:r>
-            <a:rPr lang="es-ES" sz="1400" kern="1200" dirty="0" smtClean="0"/>
+            <a:rPr lang="es-ES" sz="1400" kern="1200" dirty="0"/>
             <a:t>of </a:t>
           </a:r>
           <a:r>
-            <a:rPr lang="es-ES" sz="1400" kern="1200" dirty="0" err="1" smtClean="0"/>
+            <a:rPr lang="es-ES" sz="1400" kern="1200" dirty="0" err="1"/>
             <a:t>Belen’s</a:t>
           </a:r>
           <a:r>
-            <a:rPr lang="es-ES" sz="1400" kern="1200" dirty="0" smtClean="0"/>
+            <a:rPr lang="es-ES" sz="1400" kern="1200" dirty="0"/>
             <a:t> </a:t>
           </a:r>
           <a:r>
-            <a:rPr lang="es-ES" sz="1400" kern="1200" dirty="0" err="1" smtClean="0"/>
+            <a:rPr lang="es-ES" sz="1400" kern="1200" dirty="0" err="1"/>
             <a:t>house</a:t>
           </a:r>
           <a:r>
-            <a:rPr lang="es-ES" sz="1400" kern="1200" dirty="0" smtClean="0"/>
+            <a:rPr lang="es-ES" sz="1400" kern="1200" dirty="0"/>
             <a:t> </a:t>
           </a:r>
           <a:r>
-            <a:rPr lang="es-ES" sz="1400" kern="1200" dirty="0" smtClean="0">
+            <a:rPr lang="es-ES" sz="1400" kern="1200" dirty="0">
               <a:solidFill>
                 <a:schemeClr val="dk1"/>
               </a:solidFill>
@@ -11378,7 +11074,7 @@
             <a:t></a:t>
           </a:r>
           <a:r>
-            <a:rPr lang="es-ES" sz="1400" kern="1200" dirty="0" smtClean="0">
+            <a:rPr lang="es-ES" sz="1400" kern="1200" dirty="0">
               <a:solidFill>
                 <a:schemeClr val="dk1"/>
               </a:solidFill>
@@ -11388,7 +11084,7 @@
             <a:t> </a:t>
           </a:r>
           <a:r>
-            <a:rPr lang="es-ES" sz="1400" kern="1200" dirty="0" err="1" smtClean="0">
+            <a:rPr lang="es-ES" sz="1400" kern="1200" dirty="0" err="1">
               <a:solidFill>
                 <a:schemeClr val="dk1"/>
               </a:solidFill>
@@ -11398,10 +11094,9 @@
             <a:t>Evaluation</a:t>
           </a:r>
           <a:r>
-            <a:rPr lang="es-ES" sz="1400" kern="1200" dirty="0" smtClean="0"/>
+            <a:rPr lang="es-ES" sz="1400" kern="1200" dirty="0"/>
             <a:t> </a:t>
           </a:r>
-          <a:endParaRPr lang="es-ES" sz="1400" kern="1200" dirty="0"/>
         </a:p>
       </dsp:txBody>
       <dsp:txXfrm>
@@ -27563,7 +27258,7 @@
           <p:cNvPr id="12" name="Imagen 11" descr="Imagen que contiene dibujo&#10;&#10;Descripción generada automáticamente">
             <a:extLst>
               <a:ext uri="{FF2B5EF4-FFF2-40B4-BE49-F238E27FC236}">
-                <a16:creationId xmlns:a16="http://schemas.microsoft.com/office/drawing/2014/main" xmlns="" id="{9AFF4060-1494-4884-9505-949950579B88}"/>
+                <a16:creationId xmlns:a16="http://schemas.microsoft.com/office/drawing/2014/main" id="{9AFF4060-1494-4884-9505-949950579B88}"/>
               </a:ext>
             </a:extLst>
           </p:cNvPr>
@@ -27593,7 +27288,7 @@
           <p:cNvPr id="13" name="Google Shape;71;p12">
             <a:extLst>
               <a:ext uri="{FF2B5EF4-FFF2-40B4-BE49-F238E27FC236}">
-                <a16:creationId xmlns:a16="http://schemas.microsoft.com/office/drawing/2014/main" xmlns="" id="{6823333A-071B-46C3-8D4F-7B3B51AD36EB}"/>
+                <a16:creationId xmlns:a16="http://schemas.microsoft.com/office/drawing/2014/main" id="{6823333A-071B-46C3-8D4F-7B3B51AD36EB}"/>
               </a:ext>
             </a:extLst>
           </p:cNvPr>
@@ -27886,7 +27581,7 @@
           <p:cNvPr id="2" name="CuadroTexto 1">
             <a:extLst>
               <a:ext uri="{FF2B5EF4-FFF2-40B4-BE49-F238E27FC236}">
-                <a16:creationId xmlns:a16="http://schemas.microsoft.com/office/drawing/2014/main" xmlns="" id="{DCE14179-D220-4B21-9ABC-06F09BAAF197}"/>
+                <a16:creationId xmlns:a16="http://schemas.microsoft.com/office/drawing/2014/main" id="{DCE14179-D220-4B21-9ABC-06F09BAAF197}"/>
               </a:ext>
             </a:extLst>
           </p:cNvPr>
@@ -27954,7 +27649,7 @@
           <p:cNvPr id="2" name="Marcador de número de diapositiva 1">
             <a:extLst>
               <a:ext uri="{FF2B5EF4-FFF2-40B4-BE49-F238E27FC236}">
-                <a16:creationId xmlns:a16="http://schemas.microsoft.com/office/drawing/2014/main" xmlns="" id="{AFA24FD6-8406-46AA-B1F0-6DB7D8E55D6E}"/>
+                <a16:creationId xmlns:a16="http://schemas.microsoft.com/office/drawing/2014/main" id="{AFA24FD6-8406-46AA-B1F0-6DB7D8E55D6E}"/>
               </a:ext>
             </a:extLst>
           </p:cNvPr>
@@ -27992,7 +27687,7 @@
           <p:cNvPr id="3" name="Grupo 2">
             <a:extLst>
               <a:ext uri="{FF2B5EF4-FFF2-40B4-BE49-F238E27FC236}">
-                <a16:creationId xmlns:a16="http://schemas.microsoft.com/office/drawing/2014/main" xmlns="" id="{C13362ED-474E-482F-9671-2363BAC1B14B}"/>
+                <a16:creationId xmlns:a16="http://schemas.microsoft.com/office/drawing/2014/main" id="{C13362ED-474E-482F-9671-2363BAC1B14B}"/>
               </a:ext>
             </a:extLst>
           </p:cNvPr>
@@ -28012,7 +27707,7 @@
             <p:cNvPr id="4" name="Imagen 3">
               <a:extLst>
                 <a:ext uri="{FF2B5EF4-FFF2-40B4-BE49-F238E27FC236}">
-                  <a16:creationId xmlns:a16="http://schemas.microsoft.com/office/drawing/2014/main" xmlns="" id="{45E0CC41-C0AE-4FB6-A3EB-CD7E95D3C56D}"/>
+                  <a16:creationId xmlns:a16="http://schemas.microsoft.com/office/drawing/2014/main" id="{45E0CC41-C0AE-4FB6-A3EB-CD7E95D3C56D}"/>
                 </a:ext>
               </a:extLst>
             </p:cNvPr>
@@ -28053,7 +27748,7 @@
             <p:cNvPr id="5" name="Conector recto de flecha 4">
               <a:extLst>
                 <a:ext uri="{FF2B5EF4-FFF2-40B4-BE49-F238E27FC236}">
-                  <a16:creationId xmlns:a16="http://schemas.microsoft.com/office/drawing/2014/main" xmlns="" id="{75962D13-2089-4D7F-8970-D05E7FDC30B0}"/>
+                  <a16:creationId xmlns:a16="http://schemas.microsoft.com/office/drawing/2014/main" id="{75962D13-2089-4D7F-8970-D05E7FDC30B0}"/>
                 </a:ext>
               </a:extLst>
             </p:cNvPr>
@@ -28095,7 +27790,7 @@
             <p:cNvPr id="6" name="Conector recto de flecha 5">
               <a:extLst>
                 <a:ext uri="{FF2B5EF4-FFF2-40B4-BE49-F238E27FC236}">
-                  <a16:creationId xmlns:a16="http://schemas.microsoft.com/office/drawing/2014/main" xmlns="" id="{030AA487-850C-4B84-A7BB-F12BF1221955}"/>
+                  <a16:creationId xmlns:a16="http://schemas.microsoft.com/office/drawing/2014/main" id="{030AA487-850C-4B84-A7BB-F12BF1221955}"/>
                 </a:ext>
               </a:extLst>
             </p:cNvPr>
@@ -28137,7 +27832,7 @@
             <p:cNvPr id="7" name="Conector recto de flecha 6">
               <a:extLst>
                 <a:ext uri="{FF2B5EF4-FFF2-40B4-BE49-F238E27FC236}">
-                  <a16:creationId xmlns:a16="http://schemas.microsoft.com/office/drawing/2014/main" xmlns="" id="{77E8562A-9490-4E3B-87C8-1D130C4D61DC}"/>
+                  <a16:creationId xmlns:a16="http://schemas.microsoft.com/office/drawing/2014/main" id="{77E8562A-9490-4E3B-87C8-1D130C4D61DC}"/>
                 </a:ext>
               </a:extLst>
             </p:cNvPr>
@@ -28180,7 +27875,7 @@
           <p:cNvPr id="8" name="Grupo 7">
             <a:extLst>
               <a:ext uri="{FF2B5EF4-FFF2-40B4-BE49-F238E27FC236}">
-                <a16:creationId xmlns:a16="http://schemas.microsoft.com/office/drawing/2014/main" xmlns="" id="{052608CE-2D8C-4C69-A065-A705DC843045}"/>
+                <a16:creationId xmlns:a16="http://schemas.microsoft.com/office/drawing/2014/main" id="{052608CE-2D8C-4C69-A065-A705DC843045}"/>
               </a:ext>
             </a:extLst>
           </p:cNvPr>
@@ -28200,7 +27895,7 @@
             <p:cNvPr id="9" name="Imagen 8">
               <a:extLst>
                 <a:ext uri="{FF2B5EF4-FFF2-40B4-BE49-F238E27FC236}">
-                  <a16:creationId xmlns:a16="http://schemas.microsoft.com/office/drawing/2014/main" xmlns="" id="{5116E174-145D-46CD-834E-DD2B3F58B525}"/>
+                  <a16:creationId xmlns:a16="http://schemas.microsoft.com/office/drawing/2014/main" id="{5116E174-145D-46CD-834E-DD2B3F58B525}"/>
                 </a:ext>
               </a:extLst>
             </p:cNvPr>
@@ -28241,7 +27936,7 @@
             <p:cNvPr id="10" name="Conector recto de flecha 9">
               <a:extLst>
                 <a:ext uri="{FF2B5EF4-FFF2-40B4-BE49-F238E27FC236}">
-                  <a16:creationId xmlns:a16="http://schemas.microsoft.com/office/drawing/2014/main" xmlns="" id="{00B95CA0-A87C-4753-9999-8CA3178B1E9B}"/>
+                  <a16:creationId xmlns:a16="http://schemas.microsoft.com/office/drawing/2014/main" id="{00B95CA0-A87C-4753-9999-8CA3178B1E9B}"/>
                 </a:ext>
               </a:extLst>
             </p:cNvPr>
@@ -28283,7 +27978,7 @@
             <p:cNvPr id="11" name="Conector recto de flecha 10">
               <a:extLst>
                 <a:ext uri="{FF2B5EF4-FFF2-40B4-BE49-F238E27FC236}">
-                  <a16:creationId xmlns:a16="http://schemas.microsoft.com/office/drawing/2014/main" xmlns="" id="{5FDFB1C7-7A2F-4EC9-BAAB-D908627A3D7E}"/>
+                  <a16:creationId xmlns:a16="http://schemas.microsoft.com/office/drawing/2014/main" id="{5FDFB1C7-7A2F-4EC9-BAAB-D908627A3D7E}"/>
                 </a:ext>
               </a:extLst>
             </p:cNvPr>
@@ -28326,7 +28021,7 @@
           <p:cNvPr id="12" name="Google Shape;323;p30">
             <a:extLst>
               <a:ext uri="{FF2B5EF4-FFF2-40B4-BE49-F238E27FC236}">
-                <a16:creationId xmlns:a16="http://schemas.microsoft.com/office/drawing/2014/main" xmlns="" id="{73C91F9B-5FDB-4CCC-860A-A6D180BD7F54}"/>
+                <a16:creationId xmlns:a16="http://schemas.microsoft.com/office/drawing/2014/main" id="{73C91F9B-5FDB-4CCC-860A-A6D180BD7F54}"/>
               </a:ext>
             </a:extLst>
           </p:cNvPr>
@@ -28766,7 +28461,7 @@
           <p:cNvPr id="2" name="Marcador de número de diapositiva 1">
             <a:extLst>
               <a:ext uri="{FF2B5EF4-FFF2-40B4-BE49-F238E27FC236}">
-                <a16:creationId xmlns:a16="http://schemas.microsoft.com/office/drawing/2014/main" xmlns="" id="{AFA24FD6-8406-46AA-B1F0-6DB7D8E55D6E}"/>
+                <a16:creationId xmlns:a16="http://schemas.microsoft.com/office/drawing/2014/main" id="{AFA24FD6-8406-46AA-B1F0-6DB7D8E55D6E}"/>
               </a:ext>
             </a:extLst>
           </p:cNvPr>
@@ -28804,7 +28499,7 @@
           <p:cNvPr id="3" name="Grupo 2">
             <a:extLst>
               <a:ext uri="{FF2B5EF4-FFF2-40B4-BE49-F238E27FC236}">
-                <a16:creationId xmlns:a16="http://schemas.microsoft.com/office/drawing/2014/main" xmlns="" id="{C13362ED-474E-482F-9671-2363BAC1B14B}"/>
+                <a16:creationId xmlns:a16="http://schemas.microsoft.com/office/drawing/2014/main" id="{C13362ED-474E-482F-9671-2363BAC1B14B}"/>
               </a:ext>
             </a:extLst>
           </p:cNvPr>
@@ -28824,7 +28519,7 @@
             <p:cNvPr id="4" name="Imagen 3">
               <a:extLst>
                 <a:ext uri="{FF2B5EF4-FFF2-40B4-BE49-F238E27FC236}">
-                  <a16:creationId xmlns:a16="http://schemas.microsoft.com/office/drawing/2014/main" xmlns="" id="{45E0CC41-C0AE-4FB6-A3EB-CD7E95D3C56D}"/>
+                  <a16:creationId xmlns:a16="http://schemas.microsoft.com/office/drawing/2014/main" id="{45E0CC41-C0AE-4FB6-A3EB-CD7E95D3C56D}"/>
                 </a:ext>
               </a:extLst>
             </p:cNvPr>
@@ -28865,7 +28560,7 @@
             <p:cNvPr id="5" name="Conector recto de flecha 4">
               <a:extLst>
                 <a:ext uri="{FF2B5EF4-FFF2-40B4-BE49-F238E27FC236}">
-                  <a16:creationId xmlns:a16="http://schemas.microsoft.com/office/drawing/2014/main" xmlns="" id="{75962D13-2089-4D7F-8970-D05E7FDC30B0}"/>
+                  <a16:creationId xmlns:a16="http://schemas.microsoft.com/office/drawing/2014/main" id="{75962D13-2089-4D7F-8970-D05E7FDC30B0}"/>
                 </a:ext>
               </a:extLst>
             </p:cNvPr>
@@ -28907,7 +28602,7 @@
             <p:cNvPr id="6" name="Conector recto de flecha 5">
               <a:extLst>
                 <a:ext uri="{FF2B5EF4-FFF2-40B4-BE49-F238E27FC236}">
-                  <a16:creationId xmlns:a16="http://schemas.microsoft.com/office/drawing/2014/main" xmlns="" id="{030AA487-850C-4B84-A7BB-F12BF1221955}"/>
+                  <a16:creationId xmlns:a16="http://schemas.microsoft.com/office/drawing/2014/main" id="{030AA487-850C-4B84-A7BB-F12BF1221955}"/>
                 </a:ext>
               </a:extLst>
             </p:cNvPr>
@@ -28949,7 +28644,7 @@
             <p:cNvPr id="7" name="Conector recto de flecha 6">
               <a:extLst>
                 <a:ext uri="{FF2B5EF4-FFF2-40B4-BE49-F238E27FC236}">
-                  <a16:creationId xmlns:a16="http://schemas.microsoft.com/office/drawing/2014/main" xmlns="" id="{77E8562A-9490-4E3B-87C8-1D130C4D61DC}"/>
+                  <a16:creationId xmlns:a16="http://schemas.microsoft.com/office/drawing/2014/main" id="{77E8562A-9490-4E3B-87C8-1D130C4D61DC}"/>
                 </a:ext>
               </a:extLst>
             </p:cNvPr>
@@ -28992,7 +28687,7 @@
           <p:cNvPr id="8" name="Grupo 7">
             <a:extLst>
               <a:ext uri="{FF2B5EF4-FFF2-40B4-BE49-F238E27FC236}">
-                <a16:creationId xmlns:a16="http://schemas.microsoft.com/office/drawing/2014/main" xmlns="" id="{052608CE-2D8C-4C69-A065-A705DC843045}"/>
+                <a16:creationId xmlns:a16="http://schemas.microsoft.com/office/drawing/2014/main" id="{052608CE-2D8C-4C69-A065-A705DC843045}"/>
               </a:ext>
             </a:extLst>
           </p:cNvPr>
@@ -29012,7 +28707,7 @@
             <p:cNvPr id="9" name="Imagen 8">
               <a:extLst>
                 <a:ext uri="{FF2B5EF4-FFF2-40B4-BE49-F238E27FC236}">
-                  <a16:creationId xmlns:a16="http://schemas.microsoft.com/office/drawing/2014/main" xmlns="" id="{5116E174-145D-46CD-834E-DD2B3F58B525}"/>
+                  <a16:creationId xmlns:a16="http://schemas.microsoft.com/office/drawing/2014/main" id="{5116E174-145D-46CD-834E-DD2B3F58B525}"/>
                 </a:ext>
               </a:extLst>
             </p:cNvPr>
@@ -29053,7 +28748,7 @@
             <p:cNvPr id="10" name="Conector recto de flecha 9">
               <a:extLst>
                 <a:ext uri="{FF2B5EF4-FFF2-40B4-BE49-F238E27FC236}">
-                  <a16:creationId xmlns:a16="http://schemas.microsoft.com/office/drawing/2014/main" xmlns="" id="{00B95CA0-A87C-4753-9999-8CA3178B1E9B}"/>
+                  <a16:creationId xmlns:a16="http://schemas.microsoft.com/office/drawing/2014/main" id="{00B95CA0-A87C-4753-9999-8CA3178B1E9B}"/>
                 </a:ext>
               </a:extLst>
             </p:cNvPr>
@@ -29095,7 +28790,7 @@
             <p:cNvPr id="11" name="Conector recto de flecha 10">
               <a:extLst>
                 <a:ext uri="{FF2B5EF4-FFF2-40B4-BE49-F238E27FC236}">
-                  <a16:creationId xmlns:a16="http://schemas.microsoft.com/office/drawing/2014/main" xmlns="" id="{5FDFB1C7-7A2F-4EC9-BAAB-D908627A3D7E}"/>
+                  <a16:creationId xmlns:a16="http://schemas.microsoft.com/office/drawing/2014/main" id="{5FDFB1C7-7A2F-4EC9-BAAB-D908627A3D7E}"/>
                 </a:ext>
               </a:extLst>
             </p:cNvPr>
@@ -29138,7 +28833,7 @@
           <p:cNvPr id="12" name="Google Shape;323;p30">
             <a:extLst>
               <a:ext uri="{FF2B5EF4-FFF2-40B4-BE49-F238E27FC236}">
-                <a16:creationId xmlns:a16="http://schemas.microsoft.com/office/drawing/2014/main" xmlns="" id="{73C91F9B-5FDB-4CCC-860A-A6D180BD7F54}"/>
+                <a16:creationId xmlns:a16="http://schemas.microsoft.com/office/drawing/2014/main" id="{73C91F9B-5FDB-4CCC-860A-A6D180BD7F54}"/>
               </a:ext>
             </a:extLst>
           </p:cNvPr>
@@ -29446,7 +29141,7 @@
           <p:cNvPr id="2" name="Marcador de número de diapositiva 1">
             <a:extLst>
               <a:ext uri="{FF2B5EF4-FFF2-40B4-BE49-F238E27FC236}">
-                <a16:creationId xmlns:a16="http://schemas.microsoft.com/office/drawing/2014/main" xmlns="" id="{AFA24FD6-8406-46AA-B1F0-6DB7D8E55D6E}"/>
+                <a16:creationId xmlns:a16="http://schemas.microsoft.com/office/drawing/2014/main" id="{AFA24FD6-8406-46AA-B1F0-6DB7D8E55D6E}"/>
               </a:ext>
             </a:extLst>
           </p:cNvPr>
@@ -29484,7 +29179,7 @@
           <p:cNvPr id="3" name="Grupo 2">
             <a:extLst>
               <a:ext uri="{FF2B5EF4-FFF2-40B4-BE49-F238E27FC236}">
-                <a16:creationId xmlns:a16="http://schemas.microsoft.com/office/drawing/2014/main" xmlns="" id="{C13362ED-474E-482F-9671-2363BAC1B14B}"/>
+                <a16:creationId xmlns:a16="http://schemas.microsoft.com/office/drawing/2014/main" id="{C13362ED-474E-482F-9671-2363BAC1B14B}"/>
               </a:ext>
             </a:extLst>
           </p:cNvPr>
@@ -29504,7 +29199,7 @@
             <p:cNvPr id="4" name="Imagen 3">
               <a:extLst>
                 <a:ext uri="{FF2B5EF4-FFF2-40B4-BE49-F238E27FC236}">
-                  <a16:creationId xmlns:a16="http://schemas.microsoft.com/office/drawing/2014/main" xmlns="" id="{45E0CC41-C0AE-4FB6-A3EB-CD7E95D3C56D}"/>
+                  <a16:creationId xmlns:a16="http://schemas.microsoft.com/office/drawing/2014/main" id="{45E0CC41-C0AE-4FB6-A3EB-CD7E95D3C56D}"/>
                 </a:ext>
               </a:extLst>
             </p:cNvPr>
@@ -29545,7 +29240,7 @@
             <p:cNvPr id="5" name="Conector recto de flecha 4">
               <a:extLst>
                 <a:ext uri="{FF2B5EF4-FFF2-40B4-BE49-F238E27FC236}">
-                  <a16:creationId xmlns:a16="http://schemas.microsoft.com/office/drawing/2014/main" xmlns="" id="{75962D13-2089-4D7F-8970-D05E7FDC30B0}"/>
+                  <a16:creationId xmlns:a16="http://schemas.microsoft.com/office/drawing/2014/main" id="{75962D13-2089-4D7F-8970-D05E7FDC30B0}"/>
                 </a:ext>
               </a:extLst>
             </p:cNvPr>
@@ -29587,7 +29282,7 @@
             <p:cNvPr id="6" name="Conector recto de flecha 5">
               <a:extLst>
                 <a:ext uri="{FF2B5EF4-FFF2-40B4-BE49-F238E27FC236}">
-                  <a16:creationId xmlns:a16="http://schemas.microsoft.com/office/drawing/2014/main" xmlns="" id="{030AA487-850C-4B84-A7BB-F12BF1221955}"/>
+                  <a16:creationId xmlns:a16="http://schemas.microsoft.com/office/drawing/2014/main" id="{030AA487-850C-4B84-A7BB-F12BF1221955}"/>
                 </a:ext>
               </a:extLst>
             </p:cNvPr>
@@ -29629,7 +29324,7 @@
             <p:cNvPr id="7" name="Conector recto de flecha 6">
               <a:extLst>
                 <a:ext uri="{FF2B5EF4-FFF2-40B4-BE49-F238E27FC236}">
-                  <a16:creationId xmlns:a16="http://schemas.microsoft.com/office/drawing/2014/main" xmlns="" id="{77E8562A-9490-4E3B-87C8-1D130C4D61DC}"/>
+                  <a16:creationId xmlns:a16="http://schemas.microsoft.com/office/drawing/2014/main" id="{77E8562A-9490-4E3B-87C8-1D130C4D61DC}"/>
                 </a:ext>
               </a:extLst>
             </p:cNvPr>
@@ -29672,7 +29367,7 @@
           <p:cNvPr id="8" name="Grupo 7">
             <a:extLst>
               <a:ext uri="{FF2B5EF4-FFF2-40B4-BE49-F238E27FC236}">
-                <a16:creationId xmlns:a16="http://schemas.microsoft.com/office/drawing/2014/main" xmlns="" id="{052608CE-2D8C-4C69-A065-A705DC843045}"/>
+                <a16:creationId xmlns:a16="http://schemas.microsoft.com/office/drawing/2014/main" id="{052608CE-2D8C-4C69-A065-A705DC843045}"/>
               </a:ext>
             </a:extLst>
           </p:cNvPr>
@@ -29692,7 +29387,7 @@
             <p:cNvPr id="9" name="Imagen 8">
               <a:extLst>
                 <a:ext uri="{FF2B5EF4-FFF2-40B4-BE49-F238E27FC236}">
-                  <a16:creationId xmlns:a16="http://schemas.microsoft.com/office/drawing/2014/main" xmlns="" id="{5116E174-145D-46CD-834E-DD2B3F58B525}"/>
+                  <a16:creationId xmlns:a16="http://schemas.microsoft.com/office/drawing/2014/main" id="{5116E174-145D-46CD-834E-DD2B3F58B525}"/>
                 </a:ext>
               </a:extLst>
             </p:cNvPr>
@@ -29733,7 +29428,7 @@
             <p:cNvPr id="10" name="Conector recto de flecha 9">
               <a:extLst>
                 <a:ext uri="{FF2B5EF4-FFF2-40B4-BE49-F238E27FC236}">
-                  <a16:creationId xmlns:a16="http://schemas.microsoft.com/office/drawing/2014/main" xmlns="" id="{00B95CA0-A87C-4753-9999-8CA3178B1E9B}"/>
+                  <a16:creationId xmlns:a16="http://schemas.microsoft.com/office/drawing/2014/main" id="{00B95CA0-A87C-4753-9999-8CA3178B1E9B}"/>
                 </a:ext>
               </a:extLst>
             </p:cNvPr>
@@ -29775,7 +29470,7 @@
             <p:cNvPr id="11" name="Conector recto de flecha 10">
               <a:extLst>
                 <a:ext uri="{FF2B5EF4-FFF2-40B4-BE49-F238E27FC236}">
-                  <a16:creationId xmlns:a16="http://schemas.microsoft.com/office/drawing/2014/main" xmlns="" id="{5FDFB1C7-7A2F-4EC9-BAAB-D908627A3D7E}"/>
+                  <a16:creationId xmlns:a16="http://schemas.microsoft.com/office/drawing/2014/main" id="{5FDFB1C7-7A2F-4EC9-BAAB-D908627A3D7E}"/>
                 </a:ext>
               </a:extLst>
             </p:cNvPr>
@@ -29818,7 +29513,7 @@
           <p:cNvPr id="12" name="Google Shape;323;p30">
             <a:extLst>
               <a:ext uri="{FF2B5EF4-FFF2-40B4-BE49-F238E27FC236}">
-                <a16:creationId xmlns:a16="http://schemas.microsoft.com/office/drawing/2014/main" xmlns="" id="{73C91F9B-5FDB-4CCC-860A-A6D180BD7F54}"/>
+                <a16:creationId xmlns:a16="http://schemas.microsoft.com/office/drawing/2014/main" id="{73C91F9B-5FDB-4CCC-860A-A6D180BD7F54}"/>
               </a:ext>
             </a:extLst>
           </p:cNvPr>
@@ -30206,7 +29901,7 @@
           <p:cNvPr id="2" name="Título 1">
             <a:extLst>
               <a:ext uri="{FF2B5EF4-FFF2-40B4-BE49-F238E27FC236}">
-                <a16:creationId xmlns:a16="http://schemas.microsoft.com/office/drawing/2014/main" xmlns="" id="{A2002B61-CFC2-44B1-9ADC-BED176A48C8A}"/>
+                <a16:creationId xmlns:a16="http://schemas.microsoft.com/office/drawing/2014/main" id="{A2002B61-CFC2-44B1-9ADC-BED176A48C8A}"/>
               </a:ext>
             </a:extLst>
           </p:cNvPr>
@@ -30234,7 +29929,7 @@
           <p:cNvPr id="3" name="Marcador de número de diapositiva 2">
             <a:extLst>
               <a:ext uri="{FF2B5EF4-FFF2-40B4-BE49-F238E27FC236}">
-                <a16:creationId xmlns:a16="http://schemas.microsoft.com/office/drawing/2014/main" xmlns="" id="{7596C399-3BD4-4B67-B510-3174663382D8}"/>
+                <a16:creationId xmlns:a16="http://schemas.microsoft.com/office/drawing/2014/main" id="{7596C399-3BD4-4B67-B510-3174663382D8}"/>
               </a:ext>
             </a:extLst>
           </p:cNvPr>
@@ -30272,7 +29967,7 @@
           <p:cNvPr id="4" name="Imagen 3">
             <a:extLst>
               <a:ext uri="{FF2B5EF4-FFF2-40B4-BE49-F238E27FC236}">
-                <a16:creationId xmlns:a16="http://schemas.microsoft.com/office/drawing/2014/main" xmlns="" id="{49330158-41E4-40EE-BDE2-E16B4AA2004E}"/>
+                <a16:creationId xmlns:a16="http://schemas.microsoft.com/office/drawing/2014/main" id="{49330158-41E4-40EE-BDE2-E16B4AA2004E}"/>
               </a:ext>
             </a:extLst>
           </p:cNvPr>
@@ -30309,7 +30004,7 @@
           <p:cNvPr id="5" name="Diagrama 4">
             <a:extLst>
               <a:ext uri="{FF2B5EF4-FFF2-40B4-BE49-F238E27FC236}">
-                <a16:creationId xmlns:a16="http://schemas.microsoft.com/office/drawing/2014/main" xmlns="" id="{E1D279FF-3548-49A6-B1C6-623FFBB4FF1B}"/>
+                <a16:creationId xmlns:a16="http://schemas.microsoft.com/office/drawing/2014/main" id="{E1D279FF-3548-49A6-B1C6-623FFBB4FF1B}"/>
               </a:ext>
             </a:extLst>
           </p:cNvPr>
@@ -30331,7 +30026,7 @@
           <p:cNvPr id="6" name="Google Shape;112;p15">
             <a:extLst>
               <a:ext uri="{FF2B5EF4-FFF2-40B4-BE49-F238E27FC236}">
-                <a16:creationId xmlns:a16="http://schemas.microsoft.com/office/drawing/2014/main" xmlns="" id="{BBBC5EFC-9DA0-44A8-8AB0-804F507D8078}"/>
+                <a16:creationId xmlns:a16="http://schemas.microsoft.com/office/drawing/2014/main" id="{BBBC5EFC-9DA0-44A8-8AB0-804F507D8078}"/>
               </a:ext>
             </a:extLst>
           </p:cNvPr>
@@ -30990,7 +30685,7 @@
           <p:cNvPr id="12" name="CuadroTexto 5">
             <a:extLst>
               <a:ext uri="{FF2B5EF4-FFF2-40B4-BE49-F238E27FC236}">
-                <a16:creationId xmlns:a16="http://schemas.microsoft.com/office/drawing/2014/main" xmlns="" id="{7A05EF92-AEC3-4F9D-955D-AA9888E3E5D5}"/>
+                <a16:creationId xmlns:a16="http://schemas.microsoft.com/office/drawing/2014/main" id="{7A05EF92-AEC3-4F9D-955D-AA9888E3E5D5}"/>
               </a:ext>
             </a:extLst>
           </p:cNvPr>
@@ -31059,7 +30754,7 @@
           <p:cNvPr id="13" name="CuadroTexto 5">
             <a:extLst>
               <a:ext uri="{FF2B5EF4-FFF2-40B4-BE49-F238E27FC236}">
-                <a16:creationId xmlns:a16="http://schemas.microsoft.com/office/drawing/2014/main" xmlns="" id="{7A05EF92-AEC3-4F9D-955D-AA9888E3E5D5}"/>
+                <a16:creationId xmlns:a16="http://schemas.microsoft.com/office/drawing/2014/main" id="{7A05EF92-AEC3-4F9D-955D-AA9888E3E5D5}"/>
               </a:ext>
             </a:extLst>
           </p:cNvPr>
@@ -35578,7 +35273,7 @@
           <p:cNvPr id="27" name="Google Shape;112;p15">
             <a:extLst>
               <a:ext uri="{FF2B5EF4-FFF2-40B4-BE49-F238E27FC236}">
-                <a16:creationId xmlns:a16="http://schemas.microsoft.com/office/drawing/2014/main" xmlns="" id="{819AEBCD-F5CC-411C-9BF5-54B940F4E4AD}"/>
+                <a16:creationId xmlns:a16="http://schemas.microsoft.com/office/drawing/2014/main" id="{819AEBCD-F5CC-411C-9BF5-54B940F4E4AD}"/>
               </a:ext>
             </a:extLst>
           </p:cNvPr>
@@ -37203,7 +36898,7 @@
           <p:cNvPr id="18" name="CuadroTexto 5">
             <a:extLst>
               <a:ext uri="{FF2B5EF4-FFF2-40B4-BE49-F238E27FC236}">
-                <a16:creationId xmlns:a16="http://schemas.microsoft.com/office/drawing/2014/main" xmlns="" id="{7A05EF92-AEC3-4F9D-955D-AA9888E3E5D5}"/>
+                <a16:creationId xmlns:a16="http://schemas.microsoft.com/office/drawing/2014/main" id="{7A05EF92-AEC3-4F9D-955D-AA9888E3E5D5}"/>
               </a:ext>
             </a:extLst>
           </p:cNvPr>
@@ -37274,7 +36969,7 @@
           <p:cNvPr id="22" name="CuadroTexto 5">
             <a:extLst>
               <a:ext uri="{FF2B5EF4-FFF2-40B4-BE49-F238E27FC236}">
-                <a16:creationId xmlns:a16="http://schemas.microsoft.com/office/drawing/2014/main" xmlns="" id="{7A05EF92-AEC3-4F9D-955D-AA9888E3E5D5}"/>
+                <a16:creationId xmlns:a16="http://schemas.microsoft.com/office/drawing/2014/main" id="{7A05EF92-AEC3-4F9D-955D-AA9888E3E5D5}"/>
               </a:ext>
             </a:extLst>
           </p:cNvPr>
@@ -37391,7 +37086,7 @@
           <p:cNvPr id="23" name="CuadroTexto 5">
             <a:extLst>
               <a:ext uri="{FF2B5EF4-FFF2-40B4-BE49-F238E27FC236}">
-                <a16:creationId xmlns:a16="http://schemas.microsoft.com/office/drawing/2014/main" xmlns="" id="{7A05EF92-AEC3-4F9D-955D-AA9888E3E5D5}"/>
+                <a16:creationId xmlns:a16="http://schemas.microsoft.com/office/drawing/2014/main" id="{7A05EF92-AEC3-4F9D-955D-AA9888E3E5D5}"/>
               </a:ext>
             </a:extLst>
           </p:cNvPr>
@@ -37505,7 +37200,7 @@
           <p:cNvPr id="16" name="Google Shape;112;p15">
             <a:extLst>
               <a:ext uri="{FF2B5EF4-FFF2-40B4-BE49-F238E27FC236}">
-                <a16:creationId xmlns:a16="http://schemas.microsoft.com/office/drawing/2014/main" xmlns="" id="{022E271D-0F8E-4B18-91F0-AA2D456C8189}"/>
+                <a16:creationId xmlns:a16="http://schemas.microsoft.com/office/drawing/2014/main" id="{022E271D-0F8E-4B18-91F0-AA2D456C8189}"/>
               </a:ext>
             </a:extLst>
           </p:cNvPr>
@@ -38401,7 +38096,7 @@
           <p:cNvPr id="13" name="CuadroTexto 5">
             <a:extLst>
               <a:ext uri="{FF2B5EF4-FFF2-40B4-BE49-F238E27FC236}">
-                <a16:creationId xmlns:a16="http://schemas.microsoft.com/office/drawing/2014/main" xmlns="" id="{7A05EF92-AEC3-4F9D-955D-AA9888E3E5D5}"/>
+                <a16:creationId xmlns:a16="http://schemas.microsoft.com/office/drawing/2014/main" id="{7A05EF92-AEC3-4F9D-955D-AA9888E3E5D5}"/>
               </a:ext>
             </a:extLst>
           </p:cNvPr>
@@ -38462,7 +38157,7 @@
           <p:cNvPr id="14" name="CuadroTexto 5">
             <a:extLst>
               <a:ext uri="{FF2B5EF4-FFF2-40B4-BE49-F238E27FC236}">
-                <a16:creationId xmlns:a16="http://schemas.microsoft.com/office/drawing/2014/main" xmlns="" id="{7A05EF92-AEC3-4F9D-955D-AA9888E3E5D5}"/>
+                <a16:creationId xmlns:a16="http://schemas.microsoft.com/office/drawing/2014/main" id="{7A05EF92-AEC3-4F9D-955D-AA9888E3E5D5}"/>
               </a:ext>
             </a:extLst>
           </p:cNvPr>
@@ -38579,7 +38274,7 @@
           <p:cNvPr id="15" name="CuadroTexto 5">
             <a:extLst>
               <a:ext uri="{FF2B5EF4-FFF2-40B4-BE49-F238E27FC236}">
-                <a16:creationId xmlns:a16="http://schemas.microsoft.com/office/drawing/2014/main" xmlns="" id="{7A05EF92-AEC3-4F9D-955D-AA9888E3E5D5}"/>
+                <a16:creationId xmlns:a16="http://schemas.microsoft.com/office/drawing/2014/main" id="{7A05EF92-AEC3-4F9D-955D-AA9888E3E5D5}"/>
               </a:ext>
             </a:extLst>
           </p:cNvPr>
@@ -38673,7 +38368,7 @@
           <p:cNvPr id="16" name="Google Shape;112;p15">
             <a:extLst>
               <a:ext uri="{FF2B5EF4-FFF2-40B4-BE49-F238E27FC236}">
-                <a16:creationId xmlns:a16="http://schemas.microsoft.com/office/drawing/2014/main" xmlns="" id="{20858392-D1AC-4E4B-82E8-E36AEF39A8B8}"/>
+                <a16:creationId xmlns:a16="http://schemas.microsoft.com/office/drawing/2014/main" id="{20858392-D1AC-4E4B-82E8-E36AEF39A8B8}"/>
               </a:ext>
             </a:extLst>
           </p:cNvPr>
@@ -38895,7 +38590,7 @@
           <p:cNvPr id="6" name="CuadroTexto 5">
             <a:extLst>
               <a:ext uri="{FF2B5EF4-FFF2-40B4-BE49-F238E27FC236}">
-                <a16:creationId xmlns:a16="http://schemas.microsoft.com/office/drawing/2014/main" xmlns="" id="{7A05EF92-AEC3-4F9D-955D-AA9888E3E5D5}"/>
+                <a16:creationId xmlns:a16="http://schemas.microsoft.com/office/drawing/2014/main" id="{7A05EF92-AEC3-4F9D-955D-AA9888E3E5D5}"/>
               </a:ext>
             </a:extLst>
           </p:cNvPr>
@@ -38966,7 +38661,7 @@
           <p:cNvPr id="12" name="CuadroTexto 11">
             <a:extLst>
               <a:ext uri="{FF2B5EF4-FFF2-40B4-BE49-F238E27FC236}">
-                <a16:creationId xmlns:a16="http://schemas.microsoft.com/office/drawing/2014/main" xmlns="" id="{20840E76-3DE8-432F-A63B-48B5CBAD5272}"/>
+                <a16:creationId xmlns:a16="http://schemas.microsoft.com/office/drawing/2014/main" id="{20840E76-3DE8-432F-A63B-48B5CBAD5272}"/>
               </a:ext>
             </a:extLst>
           </p:cNvPr>
@@ -39061,7 +38756,7 @@
           <p:cNvPr id="13" name="CuadroTexto 12">
             <a:extLst>
               <a:ext uri="{FF2B5EF4-FFF2-40B4-BE49-F238E27FC236}">
-                <a16:creationId xmlns:a16="http://schemas.microsoft.com/office/drawing/2014/main" xmlns="" id="{5C1C18EB-EEEC-454C-844E-36BA14889482}"/>
+                <a16:creationId xmlns:a16="http://schemas.microsoft.com/office/drawing/2014/main" id="{5C1C18EB-EEEC-454C-844E-36BA14889482}"/>
               </a:ext>
             </a:extLst>
           </p:cNvPr>
@@ -39351,7 +39046,7 @@
           <p:cNvPr id="2" name="Título 1">
             <a:extLst>
               <a:ext uri="{FF2B5EF4-FFF2-40B4-BE49-F238E27FC236}">
-                <a16:creationId xmlns:a16="http://schemas.microsoft.com/office/drawing/2014/main" xmlns="" id="{133E19B1-FFB9-41F4-8288-92E8EFB14293}"/>
+                <a16:creationId xmlns:a16="http://schemas.microsoft.com/office/drawing/2014/main" id="{133E19B1-FFB9-41F4-8288-92E8EFB14293}"/>
               </a:ext>
             </a:extLst>
           </p:cNvPr>
@@ -39379,7 +39074,7 @@
           <p:cNvPr id="4" name="Marcador de número de diapositiva 3">
             <a:extLst>
               <a:ext uri="{FF2B5EF4-FFF2-40B4-BE49-F238E27FC236}">
-                <a16:creationId xmlns:a16="http://schemas.microsoft.com/office/drawing/2014/main" xmlns="" id="{131A4E16-D80F-497A-98EA-D0A605CB27CC}"/>
+                <a16:creationId xmlns:a16="http://schemas.microsoft.com/office/drawing/2014/main" id="{131A4E16-D80F-497A-98EA-D0A605CB27CC}"/>
               </a:ext>
             </a:extLst>
           </p:cNvPr>
@@ -39417,7 +39112,7 @@
           <p:cNvPr id="7" name="Diagrama 6">
             <a:extLst>
               <a:ext uri="{FF2B5EF4-FFF2-40B4-BE49-F238E27FC236}">
-                <a16:creationId xmlns:a16="http://schemas.microsoft.com/office/drawing/2014/main" xmlns="" id="{01DEEBBA-377C-4A04-BF38-2977C8C09A6D}"/>
+                <a16:creationId xmlns:a16="http://schemas.microsoft.com/office/drawing/2014/main" id="{01DEEBBA-377C-4A04-BF38-2977C8C09A6D}"/>
               </a:ext>
             </a:extLst>
           </p:cNvPr>
@@ -39439,7 +39134,7 @@
           <p:cNvPr id="8" name="CuadroTexto 7">
             <a:extLst>
               <a:ext uri="{FF2B5EF4-FFF2-40B4-BE49-F238E27FC236}">
-                <a16:creationId xmlns:a16="http://schemas.microsoft.com/office/drawing/2014/main" xmlns="" id="{6521D497-F4D4-4D6E-800F-683C9B806989}"/>
+                <a16:creationId xmlns:a16="http://schemas.microsoft.com/office/drawing/2014/main" id="{6521D497-F4D4-4D6E-800F-683C9B806989}"/>
               </a:ext>
             </a:extLst>
           </p:cNvPr>
@@ -39516,7 +39211,7 @@
           <p:cNvPr id="9" name="CuadroTexto 8">
             <a:extLst>
               <a:ext uri="{FF2B5EF4-FFF2-40B4-BE49-F238E27FC236}">
-                <a16:creationId xmlns:a16="http://schemas.microsoft.com/office/drawing/2014/main" xmlns="" id="{3F1CD0E6-9318-4C76-BE4E-ACAEE91DC8A5}"/>
+                <a16:creationId xmlns:a16="http://schemas.microsoft.com/office/drawing/2014/main" id="{3F1CD0E6-9318-4C76-BE4E-ACAEE91DC8A5}"/>
               </a:ext>
             </a:extLst>
           </p:cNvPr>
@@ -39575,7 +39270,7 @@
           <p:cNvPr id="10" name="Google Shape;112;p15">
             <a:extLst>
               <a:ext uri="{FF2B5EF4-FFF2-40B4-BE49-F238E27FC236}">
-                <a16:creationId xmlns:a16="http://schemas.microsoft.com/office/drawing/2014/main" xmlns="" id="{32FCFC43-5C04-4C69-A771-00C6AE7AC472}"/>
+                <a16:creationId xmlns:a16="http://schemas.microsoft.com/office/drawing/2014/main" id="{32FCFC43-5C04-4C69-A771-00C6AE7AC472}"/>
               </a:ext>
             </a:extLst>
           </p:cNvPr>
@@ -39788,7 +39483,7 @@
           <p:cNvPr id="2" name="Título 1">
             <a:extLst>
               <a:ext uri="{FF2B5EF4-FFF2-40B4-BE49-F238E27FC236}">
-                <a16:creationId xmlns:a16="http://schemas.microsoft.com/office/drawing/2014/main" xmlns="" id="{22120D53-D3EB-4EA0-8C12-6A42097435D0}"/>
+                <a16:creationId xmlns:a16="http://schemas.microsoft.com/office/drawing/2014/main" id="{22120D53-D3EB-4EA0-8C12-6A42097435D0}"/>
               </a:ext>
             </a:extLst>
           </p:cNvPr>
@@ -39816,7 +39511,7 @@
           <p:cNvPr id="4" name="Marcador de número de diapositiva 3">
             <a:extLst>
               <a:ext uri="{FF2B5EF4-FFF2-40B4-BE49-F238E27FC236}">
-                <a16:creationId xmlns:a16="http://schemas.microsoft.com/office/drawing/2014/main" xmlns="" id="{247DACE4-E052-4F15-BB54-A0E70A9CC0FA}"/>
+                <a16:creationId xmlns:a16="http://schemas.microsoft.com/office/drawing/2014/main" id="{247DACE4-E052-4F15-BB54-A0E70A9CC0FA}"/>
               </a:ext>
             </a:extLst>
           </p:cNvPr>
@@ -39854,7 +39549,7 @@
           <p:cNvPr id="5" name="Imagen 4">
             <a:extLst>
               <a:ext uri="{FF2B5EF4-FFF2-40B4-BE49-F238E27FC236}">
-                <a16:creationId xmlns:a16="http://schemas.microsoft.com/office/drawing/2014/main" xmlns="" id="{B3980D6E-B426-4A47-B974-5B0D5B84411A}"/>
+                <a16:creationId xmlns:a16="http://schemas.microsoft.com/office/drawing/2014/main" id="{B3980D6E-B426-4A47-B974-5B0D5B84411A}"/>
               </a:ext>
             </a:extLst>
           </p:cNvPr>
@@ -39896,7 +39591,7 @@
           <p:cNvPr id="7" name="CuadroTexto 6">
             <a:extLst>
               <a:ext uri="{FF2B5EF4-FFF2-40B4-BE49-F238E27FC236}">
-                <a16:creationId xmlns:a16="http://schemas.microsoft.com/office/drawing/2014/main" xmlns="" id="{37CCFB8F-CFE9-491A-9715-61EAC838F363}"/>
+                <a16:creationId xmlns:a16="http://schemas.microsoft.com/office/drawing/2014/main" id="{37CCFB8F-CFE9-491A-9715-61EAC838F363}"/>
               </a:ext>
             </a:extLst>
           </p:cNvPr>
@@ -40050,7 +39745,7 @@
           <p:cNvPr id="10" name="CuadroTexto 9">
             <a:extLst>
               <a:ext uri="{FF2B5EF4-FFF2-40B4-BE49-F238E27FC236}">
-                <a16:creationId xmlns:a16="http://schemas.microsoft.com/office/drawing/2014/main" xmlns="" id="{1137B7F1-8E15-41AE-8A1D-60BBCEDF7BE0}"/>
+                <a16:creationId xmlns:a16="http://schemas.microsoft.com/office/drawing/2014/main" id="{1137B7F1-8E15-41AE-8A1D-60BBCEDF7BE0}"/>
               </a:ext>
             </a:extLst>
           </p:cNvPr>
@@ -40088,7 +39783,7 @@
           <p:cNvPr id="8" name="Google Shape;112;p15">
             <a:extLst>
               <a:ext uri="{FF2B5EF4-FFF2-40B4-BE49-F238E27FC236}">
-                <a16:creationId xmlns:a16="http://schemas.microsoft.com/office/drawing/2014/main" xmlns="" id="{31B16089-5143-4851-9A63-FAF082B20268}"/>
+                <a16:creationId xmlns:a16="http://schemas.microsoft.com/office/drawing/2014/main" id="{31B16089-5143-4851-9A63-FAF082B20268}"/>
               </a:ext>
             </a:extLst>
           </p:cNvPr>
@@ -40450,7 +40145,7 @@
           <p:cNvPr id="8" name="Google Shape;112;p15">
             <a:extLst>
               <a:ext uri="{FF2B5EF4-FFF2-40B4-BE49-F238E27FC236}">
-                <a16:creationId xmlns:a16="http://schemas.microsoft.com/office/drawing/2014/main" xmlns="" id="{604371DA-FED7-4159-AB63-E18474060AB1}"/>
+                <a16:creationId xmlns:a16="http://schemas.microsoft.com/office/drawing/2014/main" id="{604371DA-FED7-4159-AB63-E18474060AB1}"/>
               </a:ext>
             </a:extLst>
           </p:cNvPr>
@@ -40541,7 +40236,7 @@
           <p:cNvPr id="2" name="Título 1">
             <a:extLst>
               <a:ext uri="{FF2B5EF4-FFF2-40B4-BE49-F238E27FC236}">
-                <a16:creationId xmlns:a16="http://schemas.microsoft.com/office/drawing/2014/main" xmlns="" id="{22120D53-D3EB-4EA0-8C12-6A42097435D0}"/>
+                <a16:creationId xmlns:a16="http://schemas.microsoft.com/office/drawing/2014/main" id="{22120D53-D3EB-4EA0-8C12-6A42097435D0}"/>
               </a:ext>
             </a:extLst>
           </p:cNvPr>
@@ -40569,7 +40264,7 @@
           <p:cNvPr id="4" name="Marcador de número de diapositiva 3">
             <a:extLst>
               <a:ext uri="{FF2B5EF4-FFF2-40B4-BE49-F238E27FC236}">
-                <a16:creationId xmlns:a16="http://schemas.microsoft.com/office/drawing/2014/main" xmlns="" id="{247DACE4-E052-4F15-BB54-A0E70A9CC0FA}"/>
+                <a16:creationId xmlns:a16="http://schemas.microsoft.com/office/drawing/2014/main" id="{247DACE4-E052-4F15-BB54-A0E70A9CC0FA}"/>
               </a:ext>
             </a:extLst>
           </p:cNvPr>
@@ -40607,7 +40302,7 @@
           <p:cNvPr id="7" name="CuadroTexto 6">
             <a:extLst>
               <a:ext uri="{FF2B5EF4-FFF2-40B4-BE49-F238E27FC236}">
-                <a16:creationId xmlns:a16="http://schemas.microsoft.com/office/drawing/2014/main" xmlns="" id="{37CCFB8F-CFE9-491A-9715-61EAC838F363}"/>
+                <a16:creationId xmlns:a16="http://schemas.microsoft.com/office/drawing/2014/main" id="{37CCFB8F-CFE9-491A-9715-61EAC838F363}"/>
               </a:ext>
             </a:extLst>
           </p:cNvPr>
@@ -40701,7 +40396,7 @@
           <p:cNvPr id="10" name="CuadroTexto 9">
             <a:extLst>
               <a:ext uri="{FF2B5EF4-FFF2-40B4-BE49-F238E27FC236}">
-                <a16:creationId xmlns:a16="http://schemas.microsoft.com/office/drawing/2014/main" xmlns="" id="{1137B7F1-8E15-41AE-8A1D-60BBCEDF7BE0}"/>
+                <a16:creationId xmlns:a16="http://schemas.microsoft.com/office/drawing/2014/main" id="{1137B7F1-8E15-41AE-8A1D-60BBCEDF7BE0}"/>
               </a:ext>
             </a:extLst>
           </p:cNvPr>
@@ -40739,7 +40434,7 @@
           <p:cNvPr id="8" name="Imagen 7">
             <a:extLst>
               <a:ext uri="{FF2B5EF4-FFF2-40B4-BE49-F238E27FC236}">
-                <a16:creationId xmlns:a16="http://schemas.microsoft.com/office/drawing/2014/main" xmlns="" id="{4DFE78E1-644F-49E6-862A-1EEA3CD07242}"/>
+                <a16:creationId xmlns:a16="http://schemas.microsoft.com/office/drawing/2014/main" id="{4DFE78E1-644F-49E6-862A-1EEA3CD07242}"/>
               </a:ext>
             </a:extLst>
           </p:cNvPr>
@@ -40778,7 +40473,7 @@
           <p:cNvPr id="9" name="Google Shape;112;p15">
             <a:extLst>
               <a:ext uri="{FF2B5EF4-FFF2-40B4-BE49-F238E27FC236}">
-                <a16:creationId xmlns:a16="http://schemas.microsoft.com/office/drawing/2014/main" xmlns="" id="{9008DA4A-1FBE-4461-9CAF-30A471522324}"/>
+                <a16:creationId xmlns:a16="http://schemas.microsoft.com/office/drawing/2014/main" id="{9008DA4A-1FBE-4461-9CAF-30A471522324}"/>
               </a:ext>
             </a:extLst>
           </p:cNvPr>
@@ -40955,7 +40650,7 @@
           <p:cNvPr id="2" name="Título 1">
             <a:extLst>
               <a:ext uri="{FF2B5EF4-FFF2-40B4-BE49-F238E27FC236}">
-                <a16:creationId xmlns:a16="http://schemas.microsoft.com/office/drawing/2014/main" xmlns="" id="{22120D53-D3EB-4EA0-8C12-6A42097435D0}"/>
+                <a16:creationId xmlns:a16="http://schemas.microsoft.com/office/drawing/2014/main" id="{22120D53-D3EB-4EA0-8C12-6A42097435D0}"/>
               </a:ext>
             </a:extLst>
           </p:cNvPr>
@@ -40983,7 +40678,7 @@
           <p:cNvPr id="4" name="Marcador de número de diapositiva 3">
             <a:extLst>
               <a:ext uri="{FF2B5EF4-FFF2-40B4-BE49-F238E27FC236}">
-                <a16:creationId xmlns:a16="http://schemas.microsoft.com/office/drawing/2014/main" xmlns="" id="{247DACE4-E052-4F15-BB54-A0E70A9CC0FA}"/>
+                <a16:creationId xmlns:a16="http://schemas.microsoft.com/office/drawing/2014/main" id="{247DACE4-E052-4F15-BB54-A0E70A9CC0FA}"/>
               </a:ext>
             </a:extLst>
           </p:cNvPr>
@@ -41021,7 +40716,7 @@
           <p:cNvPr id="7" name="CuadroTexto 6">
             <a:extLst>
               <a:ext uri="{FF2B5EF4-FFF2-40B4-BE49-F238E27FC236}">
-                <a16:creationId xmlns:a16="http://schemas.microsoft.com/office/drawing/2014/main" xmlns="" id="{37CCFB8F-CFE9-491A-9715-61EAC838F363}"/>
+                <a16:creationId xmlns:a16="http://schemas.microsoft.com/office/drawing/2014/main" id="{37CCFB8F-CFE9-491A-9715-61EAC838F363}"/>
               </a:ext>
             </a:extLst>
           </p:cNvPr>
@@ -41128,7 +40823,7 @@
           <p:cNvPr id="9" name="Google Shape;112;p15">
             <a:extLst>
               <a:ext uri="{FF2B5EF4-FFF2-40B4-BE49-F238E27FC236}">
-                <a16:creationId xmlns:a16="http://schemas.microsoft.com/office/drawing/2014/main" xmlns="" id="{9008DA4A-1FBE-4461-9CAF-30A471522324}"/>
+                <a16:creationId xmlns:a16="http://schemas.microsoft.com/office/drawing/2014/main" id="{9008DA4A-1FBE-4461-9CAF-30A471522324}"/>
               </a:ext>
             </a:extLst>
           </p:cNvPr>
@@ -41350,7 +41045,7 @@
           <p:cNvPr id="6" name="CuadroTexto 5">
             <a:extLst>
               <a:ext uri="{FF2B5EF4-FFF2-40B4-BE49-F238E27FC236}">
-                <a16:creationId xmlns:a16="http://schemas.microsoft.com/office/drawing/2014/main" xmlns="" id="{7A05EF92-AEC3-4F9D-955D-AA9888E3E5D5}"/>
+                <a16:creationId xmlns:a16="http://schemas.microsoft.com/office/drawing/2014/main" id="{7A05EF92-AEC3-4F9D-955D-AA9888E3E5D5}"/>
               </a:ext>
             </a:extLst>
           </p:cNvPr>
@@ -41423,7 +41118,7 @@
           <p:cNvPr id="12" name="CuadroTexto 11">
             <a:extLst>
               <a:ext uri="{FF2B5EF4-FFF2-40B4-BE49-F238E27FC236}">
-                <a16:creationId xmlns:a16="http://schemas.microsoft.com/office/drawing/2014/main" xmlns="" id="{20840E76-3DE8-432F-A63B-48B5CBAD5272}"/>
+                <a16:creationId xmlns:a16="http://schemas.microsoft.com/office/drawing/2014/main" id="{20840E76-3DE8-432F-A63B-48B5CBAD5272}"/>
               </a:ext>
             </a:extLst>
           </p:cNvPr>
@@ -41472,7 +41167,7 @@
           <p:cNvPr id="8" name="CuadroTexto 7">
             <a:extLst>
               <a:ext uri="{FF2B5EF4-FFF2-40B4-BE49-F238E27FC236}">
-                <a16:creationId xmlns:a16="http://schemas.microsoft.com/office/drawing/2014/main" xmlns="" id="{643B5E99-CA82-4A49-8578-3A4F5C53D4EC}"/>
+                <a16:creationId xmlns:a16="http://schemas.microsoft.com/office/drawing/2014/main" id="{643B5E99-CA82-4A49-8578-3A4F5C53D4EC}"/>
               </a:ext>
             </a:extLst>
           </p:cNvPr>
@@ -41738,7 +41433,7 @@
           <p:cNvPr id="2" name="Título 1">
             <a:extLst>
               <a:ext uri="{FF2B5EF4-FFF2-40B4-BE49-F238E27FC236}">
-                <a16:creationId xmlns:a16="http://schemas.microsoft.com/office/drawing/2014/main" xmlns="" id="{22120D53-D3EB-4EA0-8C12-6A42097435D0}"/>
+                <a16:creationId xmlns:a16="http://schemas.microsoft.com/office/drawing/2014/main" id="{22120D53-D3EB-4EA0-8C12-6A42097435D0}"/>
               </a:ext>
             </a:extLst>
           </p:cNvPr>
@@ -41766,7 +41461,7 @@
           <p:cNvPr id="4" name="Marcador de número de diapositiva 3">
             <a:extLst>
               <a:ext uri="{FF2B5EF4-FFF2-40B4-BE49-F238E27FC236}">
-                <a16:creationId xmlns:a16="http://schemas.microsoft.com/office/drawing/2014/main" xmlns="" id="{247DACE4-E052-4F15-BB54-A0E70A9CC0FA}"/>
+                <a16:creationId xmlns:a16="http://schemas.microsoft.com/office/drawing/2014/main" id="{247DACE4-E052-4F15-BB54-A0E70A9CC0FA}"/>
               </a:ext>
             </a:extLst>
           </p:cNvPr>
@@ -41804,7 +41499,7 @@
           <p:cNvPr id="7" name="CuadroTexto 6">
             <a:extLst>
               <a:ext uri="{FF2B5EF4-FFF2-40B4-BE49-F238E27FC236}">
-                <a16:creationId xmlns:a16="http://schemas.microsoft.com/office/drawing/2014/main" xmlns="" id="{37CCFB8F-CFE9-491A-9715-61EAC838F363}"/>
+                <a16:creationId xmlns:a16="http://schemas.microsoft.com/office/drawing/2014/main" id="{37CCFB8F-CFE9-491A-9715-61EAC838F363}"/>
               </a:ext>
             </a:extLst>
           </p:cNvPr>
@@ -41889,7 +41584,7 @@
           <p:cNvPr id="9" name="Google Shape;112;p15">
             <a:extLst>
               <a:ext uri="{FF2B5EF4-FFF2-40B4-BE49-F238E27FC236}">
-                <a16:creationId xmlns:a16="http://schemas.microsoft.com/office/drawing/2014/main" xmlns="" id="{9008DA4A-1FBE-4461-9CAF-30A471522324}"/>
+                <a16:creationId xmlns:a16="http://schemas.microsoft.com/office/drawing/2014/main" id="{9008DA4A-1FBE-4461-9CAF-30A471522324}"/>
               </a:ext>
             </a:extLst>
           </p:cNvPr>
@@ -42145,7 +41840,7 @@
           <p:cNvPr id="2" name="Título 1">
             <a:extLst>
               <a:ext uri="{FF2B5EF4-FFF2-40B4-BE49-F238E27FC236}">
-                <a16:creationId xmlns:a16="http://schemas.microsoft.com/office/drawing/2014/main" xmlns="" id="{22120D53-D3EB-4EA0-8C12-6A42097435D0}"/>
+                <a16:creationId xmlns:a16="http://schemas.microsoft.com/office/drawing/2014/main" id="{22120D53-D3EB-4EA0-8C12-6A42097435D0}"/>
               </a:ext>
             </a:extLst>
           </p:cNvPr>
@@ -42173,7 +41868,7 @@
           <p:cNvPr id="4" name="Marcador de número de diapositiva 3">
             <a:extLst>
               <a:ext uri="{FF2B5EF4-FFF2-40B4-BE49-F238E27FC236}">
-                <a16:creationId xmlns:a16="http://schemas.microsoft.com/office/drawing/2014/main" xmlns="" id="{247DACE4-E052-4F15-BB54-A0E70A9CC0FA}"/>
+                <a16:creationId xmlns:a16="http://schemas.microsoft.com/office/drawing/2014/main" id="{247DACE4-E052-4F15-BB54-A0E70A9CC0FA}"/>
               </a:ext>
             </a:extLst>
           </p:cNvPr>
@@ -42211,7 +41906,7 @@
           <p:cNvPr id="3" name="Diagrama 2">
             <a:extLst>
               <a:ext uri="{FF2B5EF4-FFF2-40B4-BE49-F238E27FC236}">
-                <a16:creationId xmlns:a16="http://schemas.microsoft.com/office/drawing/2014/main" xmlns="" id="{10DBFD7C-0ED0-4BCD-ABC0-ED108C096DD8}"/>
+                <a16:creationId xmlns:a16="http://schemas.microsoft.com/office/drawing/2014/main" id="{10DBFD7C-0ED0-4BCD-ABC0-ED108C096DD8}"/>
               </a:ext>
             </a:extLst>
           </p:cNvPr>
@@ -42233,7 +41928,7 @@
           <p:cNvPr id="9" name="Google Shape;112;p15">
             <a:extLst>
               <a:ext uri="{FF2B5EF4-FFF2-40B4-BE49-F238E27FC236}">
-                <a16:creationId xmlns:a16="http://schemas.microsoft.com/office/drawing/2014/main" xmlns="" id="{9008DA4A-1FBE-4461-9CAF-30A471522324}"/>
+                <a16:creationId xmlns:a16="http://schemas.microsoft.com/office/drawing/2014/main" id="{9008DA4A-1FBE-4461-9CAF-30A471522324}"/>
               </a:ext>
             </a:extLst>
           </p:cNvPr>
@@ -42881,7 +42576,7 @@
           <p:cNvPr id="2" name="Título 1">
             <a:extLst>
               <a:ext uri="{FF2B5EF4-FFF2-40B4-BE49-F238E27FC236}">
-                <a16:creationId xmlns:a16="http://schemas.microsoft.com/office/drawing/2014/main" xmlns="" id="{22120D53-D3EB-4EA0-8C12-6A42097435D0}"/>
+                <a16:creationId xmlns:a16="http://schemas.microsoft.com/office/drawing/2014/main" id="{22120D53-D3EB-4EA0-8C12-6A42097435D0}"/>
               </a:ext>
             </a:extLst>
           </p:cNvPr>
@@ -42909,7 +42604,7 @@
           <p:cNvPr id="4" name="Marcador de número de diapositiva 3">
             <a:extLst>
               <a:ext uri="{FF2B5EF4-FFF2-40B4-BE49-F238E27FC236}">
-                <a16:creationId xmlns:a16="http://schemas.microsoft.com/office/drawing/2014/main" xmlns="" id="{247DACE4-E052-4F15-BB54-A0E70A9CC0FA}"/>
+                <a16:creationId xmlns:a16="http://schemas.microsoft.com/office/drawing/2014/main" id="{247DACE4-E052-4F15-BB54-A0E70A9CC0FA}"/>
               </a:ext>
             </a:extLst>
           </p:cNvPr>
@@ -42947,7 +42642,7 @@
           <p:cNvPr id="9" name="Google Shape;112;p15">
             <a:extLst>
               <a:ext uri="{FF2B5EF4-FFF2-40B4-BE49-F238E27FC236}">
-                <a16:creationId xmlns:a16="http://schemas.microsoft.com/office/drawing/2014/main" xmlns="" id="{9008DA4A-1FBE-4461-9CAF-30A471522324}"/>
+                <a16:creationId xmlns:a16="http://schemas.microsoft.com/office/drawing/2014/main" id="{9008DA4A-1FBE-4461-9CAF-30A471522324}"/>
               </a:ext>
             </a:extLst>
           </p:cNvPr>
@@ -43008,7 +42703,7 @@
           <p:cNvPr id="6" name="Diagrama 2">
             <a:extLst>
               <a:ext uri="{FF2B5EF4-FFF2-40B4-BE49-F238E27FC236}">
-                <a16:creationId xmlns:a16="http://schemas.microsoft.com/office/drawing/2014/main" xmlns="" id="{10DBFD7C-0ED0-4BCD-ABC0-ED108C096DD8}"/>
+                <a16:creationId xmlns:a16="http://schemas.microsoft.com/office/drawing/2014/main" id="{10DBFD7C-0ED0-4BCD-ABC0-ED108C096DD8}"/>
               </a:ext>
             </a:extLst>
           </p:cNvPr>
@@ -43676,7 +43371,7 @@
           <p:cNvPr id="3" name="Imagen 2" descr="Imagen que contiene dibujo&#10;&#10;Descripción generada automáticamente">
             <a:extLst>
               <a:ext uri="{FF2B5EF4-FFF2-40B4-BE49-F238E27FC236}">
-                <a16:creationId xmlns:a16="http://schemas.microsoft.com/office/drawing/2014/main" xmlns="" id="{5AD2632B-30DA-40CE-9C9C-3826BD3C3180}"/>
+                <a16:creationId xmlns:a16="http://schemas.microsoft.com/office/drawing/2014/main" id="{5AD2632B-30DA-40CE-9C9C-3826BD3C3180}"/>
               </a:ext>
             </a:extLst>
           </p:cNvPr>
@@ -43706,7 +43401,7 @@
           <p:cNvPr id="21" name="Google Shape;85;p13">
             <a:extLst>
               <a:ext uri="{FF2B5EF4-FFF2-40B4-BE49-F238E27FC236}">
-                <a16:creationId xmlns:a16="http://schemas.microsoft.com/office/drawing/2014/main" xmlns="" id="{9951FC2E-B18F-44A0-AF54-765653F167B4}"/>
+                <a16:creationId xmlns:a16="http://schemas.microsoft.com/office/drawing/2014/main" id="{9951FC2E-B18F-44A0-AF54-765653F167B4}"/>
               </a:ext>
             </a:extLst>
           </p:cNvPr>
@@ -43755,7 +43450,7 @@
           <p:cNvPr id="22" name="Google Shape;94;p13">
             <a:extLst>
               <a:ext uri="{FF2B5EF4-FFF2-40B4-BE49-F238E27FC236}">
-                <a16:creationId xmlns:a16="http://schemas.microsoft.com/office/drawing/2014/main" xmlns="" id="{2C810E6E-2008-4E05-BC4C-C00F6BAFC117}"/>
+                <a16:creationId xmlns:a16="http://schemas.microsoft.com/office/drawing/2014/main" id="{2C810E6E-2008-4E05-BC4C-C00F6BAFC117}"/>
               </a:ext>
             </a:extLst>
           </p:cNvPr>
@@ -43801,7 +43496,7 @@
                 <a:hlinkClick r:id="rId4">
                   <a:extLst>
                     <a:ext uri="{A12FA001-AC4F-418D-AE19-62706E023703}">
-                      <ahyp:hlinkClr xmlns:ahyp="http://schemas.microsoft.com/office/drawing/2018/hyperlinkcolor" xmlns="" val="tx"/>
+                      <ahyp:hlinkClr xmlns:ahyp="http://schemas.microsoft.com/office/drawing/2018/hyperlinkcolor" val="tx"/>
                     </a:ext>
                   </a:extLst>
                 </a:hlinkClick>
@@ -43872,7 +43567,7 @@
                 <a:hlinkClick r:id="rId5">
                   <a:extLst>
                     <a:ext uri="{A12FA001-AC4F-418D-AE19-62706E023703}">
-                      <ahyp:hlinkClr xmlns:ahyp="http://schemas.microsoft.com/office/drawing/2018/hyperlinkcolor" xmlns="" val="tx"/>
+                      <ahyp:hlinkClr xmlns:ahyp="http://schemas.microsoft.com/office/drawing/2018/hyperlinkcolor" val="tx"/>
                     </a:ext>
                   </a:extLst>
                 </a:hlinkClick>
@@ -44110,7 +43805,7 @@
           <p:cNvPr id="6" name="CuadroTexto 5">
             <a:extLst>
               <a:ext uri="{FF2B5EF4-FFF2-40B4-BE49-F238E27FC236}">
-                <a16:creationId xmlns:a16="http://schemas.microsoft.com/office/drawing/2014/main" xmlns="" id="{7A05EF92-AEC3-4F9D-955D-AA9888E3E5D5}"/>
+                <a16:creationId xmlns:a16="http://schemas.microsoft.com/office/drawing/2014/main" id="{7A05EF92-AEC3-4F9D-955D-AA9888E3E5D5}"/>
               </a:ext>
             </a:extLst>
           </p:cNvPr>
@@ -44171,7 +43866,7 @@
           <p:cNvPr id="12" name="CuadroTexto 11">
             <a:extLst>
               <a:ext uri="{FF2B5EF4-FFF2-40B4-BE49-F238E27FC236}">
-                <a16:creationId xmlns:a16="http://schemas.microsoft.com/office/drawing/2014/main" xmlns="" id="{20840E76-3DE8-432F-A63B-48B5CBAD5272}"/>
+                <a16:creationId xmlns:a16="http://schemas.microsoft.com/office/drawing/2014/main" id="{20840E76-3DE8-432F-A63B-48B5CBAD5272}"/>
               </a:ext>
             </a:extLst>
           </p:cNvPr>
@@ -44242,7 +43937,7 @@
           <p:cNvPr id="8" name="CuadroTexto 5">
             <a:extLst>
               <a:ext uri="{FF2B5EF4-FFF2-40B4-BE49-F238E27FC236}">
-                <a16:creationId xmlns:a16="http://schemas.microsoft.com/office/drawing/2014/main" xmlns="" id="{7A05EF92-AEC3-4F9D-955D-AA9888E3E5D5}"/>
+                <a16:creationId xmlns:a16="http://schemas.microsoft.com/office/drawing/2014/main" id="{7A05EF92-AEC3-4F9D-955D-AA9888E3E5D5}"/>
               </a:ext>
             </a:extLst>
           </p:cNvPr>
@@ -44333,7 +44028,7 @@
           <p:cNvPr id="11" name="CuadroTexto 11">
             <a:extLst>
               <a:ext uri="{FF2B5EF4-FFF2-40B4-BE49-F238E27FC236}">
-                <a16:creationId xmlns:a16="http://schemas.microsoft.com/office/drawing/2014/main" xmlns="" id="{20840E76-3DE8-432F-A63B-48B5CBAD5272}"/>
+                <a16:creationId xmlns:a16="http://schemas.microsoft.com/office/drawing/2014/main" id="{20840E76-3DE8-432F-A63B-48B5CBAD5272}"/>
               </a:ext>
             </a:extLst>
           </p:cNvPr>
@@ -44404,7 +44099,7 @@
           <p:cNvPr id="13" name="CuadroTexto 11">
             <a:extLst>
               <a:ext uri="{FF2B5EF4-FFF2-40B4-BE49-F238E27FC236}">
-                <a16:creationId xmlns:a16="http://schemas.microsoft.com/office/drawing/2014/main" xmlns="" id="{20840E76-3DE8-432F-A63B-48B5CBAD5272}"/>
+                <a16:creationId xmlns:a16="http://schemas.microsoft.com/office/drawing/2014/main" id="{20840E76-3DE8-432F-A63B-48B5CBAD5272}"/>
               </a:ext>
             </a:extLst>
           </p:cNvPr>
@@ -44680,7 +44375,7 @@
           <p:cNvPr id="18" name="CuadroTexto 11">
             <a:extLst>
               <a:ext uri="{FF2B5EF4-FFF2-40B4-BE49-F238E27FC236}">
-                <a16:creationId xmlns:a16="http://schemas.microsoft.com/office/drawing/2014/main" xmlns="" id="{20840E76-3DE8-432F-A63B-48B5CBAD5272}"/>
+                <a16:creationId xmlns:a16="http://schemas.microsoft.com/office/drawing/2014/main" id="{20840E76-3DE8-432F-A63B-48B5CBAD5272}"/>
               </a:ext>
             </a:extLst>
           </p:cNvPr>
@@ -45956,7 +45651,7 @@
           <p:cNvPr id="9" name="CuadroTexto 5">
             <a:extLst>
               <a:ext uri="{FF2B5EF4-FFF2-40B4-BE49-F238E27FC236}">
-                <a16:creationId xmlns:a16="http://schemas.microsoft.com/office/drawing/2014/main" xmlns="" id="{7A05EF92-AEC3-4F9D-955D-AA9888E3E5D5}"/>
+                <a16:creationId xmlns:a16="http://schemas.microsoft.com/office/drawing/2014/main" id="{7A05EF92-AEC3-4F9D-955D-AA9888E3E5D5}"/>
               </a:ext>
             </a:extLst>
           </p:cNvPr>
@@ -46022,7 +45717,7 @@
           <p:cNvPr id="10" name="CuadroTexto 5">
             <a:extLst>
               <a:ext uri="{FF2B5EF4-FFF2-40B4-BE49-F238E27FC236}">
-                <a16:creationId xmlns:a16="http://schemas.microsoft.com/office/drawing/2014/main" xmlns="" id="{7A05EF92-AEC3-4F9D-955D-AA9888E3E5D5}"/>
+                <a16:creationId xmlns:a16="http://schemas.microsoft.com/office/drawing/2014/main" id="{7A05EF92-AEC3-4F9D-955D-AA9888E3E5D5}"/>
               </a:ext>
             </a:extLst>
           </p:cNvPr>
@@ -46202,7 +45897,7 @@
           <p:cNvPr id="6" name="CuadroTexto 5">
             <a:extLst>
               <a:ext uri="{FF2B5EF4-FFF2-40B4-BE49-F238E27FC236}">
-                <a16:creationId xmlns:a16="http://schemas.microsoft.com/office/drawing/2014/main" xmlns="" id="{7A05EF92-AEC3-4F9D-955D-AA9888E3E5D5}"/>
+                <a16:creationId xmlns:a16="http://schemas.microsoft.com/office/drawing/2014/main" id="{7A05EF92-AEC3-4F9D-955D-AA9888E3E5D5}"/>
               </a:ext>
             </a:extLst>
           </p:cNvPr>
@@ -46248,7 +45943,7 @@
           <p:cNvPr id="7" name="CuadroTexto 5">
             <a:extLst>
               <a:ext uri="{FF2B5EF4-FFF2-40B4-BE49-F238E27FC236}">
-                <a16:creationId xmlns:a16="http://schemas.microsoft.com/office/drawing/2014/main" xmlns="" id="{7A05EF92-AEC3-4F9D-955D-AA9888E3E5D5}"/>
+                <a16:creationId xmlns:a16="http://schemas.microsoft.com/office/drawing/2014/main" id="{7A05EF92-AEC3-4F9D-955D-AA9888E3E5D5}"/>
               </a:ext>
             </a:extLst>
           </p:cNvPr>
@@ -46324,7 +46019,7 @@
           <p:cNvPr id="8" name="Google Shape;112;p15">
             <a:extLst>
               <a:ext uri="{FF2B5EF4-FFF2-40B4-BE49-F238E27FC236}">
-                <a16:creationId xmlns:a16="http://schemas.microsoft.com/office/drawing/2014/main" xmlns="" id="{06A01938-A855-492F-AC33-4AC9D0D96A9E}"/>
+                <a16:creationId xmlns:a16="http://schemas.microsoft.com/office/drawing/2014/main" id="{06A01938-A855-492F-AC33-4AC9D0D96A9E}"/>
               </a:ext>
             </a:extLst>
           </p:cNvPr>
@@ -46546,7 +46241,7 @@
           <p:cNvPr id="2" name="Diagrama 1">
             <a:extLst>
               <a:ext uri="{FF2B5EF4-FFF2-40B4-BE49-F238E27FC236}">
-                <a16:creationId xmlns:a16="http://schemas.microsoft.com/office/drawing/2014/main" xmlns="" id="{33E693B4-1F63-40D9-BBBC-98ACFCF27D34}"/>
+                <a16:creationId xmlns:a16="http://schemas.microsoft.com/office/drawing/2014/main" id="{33E693B4-1F63-40D9-BBBC-98ACFCF27D34}"/>
               </a:ext>
             </a:extLst>
           </p:cNvPr>
@@ -46568,7 +46263,7 @@
           <p:cNvPr id="5" name="CuadroTexto 4">
             <a:extLst>
               <a:ext uri="{FF2B5EF4-FFF2-40B4-BE49-F238E27FC236}">
-                <a16:creationId xmlns:a16="http://schemas.microsoft.com/office/drawing/2014/main" xmlns="" id="{678509BF-CA60-4C24-8011-9F1891FB8464}"/>
+                <a16:creationId xmlns:a16="http://schemas.microsoft.com/office/drawing/2014/main" id="{678509BF-CA60-4C24-8011-9F1891FB8464}"/>
               </a:ext>
             </a:extLst>
           </p:cNvPr>
@@ -47579,7 +47274,7 @@
           <p:cNvPr id="2" name="Título 1">
             <a:extLst>
               <a:ext uri="{FF2B5EF4-FFF2-40B4-BE49-F238E27FC236}">
-                <a16:creationId xmlns:a16="http://schemas.microsoft.com/office/drawing/2014/main" xmlns="" id="{75681E77-92C5-4AD9-AD48-31DC62B85AB2}"/>
+                <a16:creationId xmlns:a16="http://schemas.microsoft.com/office/drawing/2014/main" id="{75681E77-92C5-4AD9-AD48-31DC62B85AB2}"/>
               </a:ext>
             </a:extLst>
           </p:cNvPr>
@@ -47607,7 +47302,7 @@
           <p:cNvPr id="5" name="Marcador de número de diapositiva 4">
             <a:extLst>
               <a:ext uri="{FF2B5EF4-FFF2-40B4-BE49-F238E27FC236}">
-                <a16:creationId xmlns:a16="http://schemas.microsoft.com/office/drawing/2014/main" xmlns="" id="{941208BD-DF9B-4E66-9368-74C9E20E2CF1}"/>
+                <a16:creationId xmlns:a16="http://schemas.microsoft.com/office/drawing/2014/main" id="{941208BD-DF9B-4E66-9368-74C9E20E2CF1}"/>
               </a:ext>
             </a:extLst>
           </p:cNvPr>
@@ -47645,7 +47340,7 @@
           <p:cNvPr id="10" name="Grupo 9">
             <a:extLst>
               <a:ext uri="{FF2B5EF4-FFF2-40B4-BE49-F238E27FC236}">
-                <a16:creationId xmlns:a16="http://schemas.microsoft.com/office/drawing/2014/main" xmlns="" id="{95E60C3B-FF23-426C-90DC-60791A37057A}"/>
+                <a16:creationId xmlns:a16="http://schemas.microsoft.com/office/drawing/2014/main" id="{95E60C3B-FF23-426C-90DC-60791A37057A}"/>
               </a:ext>
             </a:extLst>
           </p:cNvPr>
@@ -47665,7 +47360,7 @@
             <p:cNvPr id="11" name="Imagen 10">
               <a:extLst>
                 <a:ext uri="{FF2B5EF4-FFF2-40B4-BE49-F238E27FC236}">
-                  <a16:creationId xmlns:a16="http://schemas.microsoft.com/office/drawing/2014/main" xmlns="" id="{55BD3E3A-863D-4C12-B906-2A711BBC812A}"/>
+                  <a16:creationId xmlns:a16="http://schemas.microsoft.com/office/drawing/2014/main" id="{55BD3E3A-863D-4C12-B906-2A711BBC812A}"/>
                 </a:ext>
               </a:extLst>
             </p:cNvPr>
@@ -47706,7 +47401,7 @@
             <p:cNvPr id="12" name="Conector recto de flecha 11">
               <a:extLst>
                 <a:ext uri="{FF2B5EF4-FFF2-40B4-BE49-F238E27FC236}">
-                  <a16:creationId xmlns:a16="http://schemas.microsoft.com/office/drawing/2014/main" xmlns="" id="{A3487EDA-1A56-494E-B6DF-07D963B5143A}"/>
+                  <a16:creationId xmlns:a16="http://schemas.microsoft.com/office/drawing/2014/main" id="{A3487EDA-1A56-494E-B6DF-07D963B5143A}"/>
                 </a:ext>
               </a:extLst>
             </p:cNvPr>
@@ -47748,7 +47443,7 @@
             <p:cNvPr id="13" name="Conector recto de flecha 12">
               <a:extLst>
                 <a:ext uri="{FF2B5EF4-FFF2-40B4-BE49-F238E27FC236}">
-                  <a16:creationId xmlns:a16="http://schemas.microsoft.com/office/drawing/2014/main" xmlns="" id="{51B2F211-CE33-405A-B46F-F7664BC2C50C}"/>
+                  <a16:creationId xmlns:a16="http://schemas.microsoft.com/office/drawing/2014/main" id="{51B2F211-CE33-405A-B46F-F7664BC2C50C}"/>
                 </a:ext>
               </a:extLst>
             </p:cNvPr>
@@ -47790,7 +47485,7 @@
             <p:cNvPr id="14" name="Conector recto de flecha 13">
               <a:extLst>
                 <a:ext uri="{FF2B5EF4-FFF2-40B4-BE49-F238E27FC236}">
-                  <a16:creationId xmlns:a16="http://schemas.microsoft.com/office/drawing/2014/main" xmlns="" id="{8FC73BD1-BE9D-4CA7-94BB-6B1C0C2F4147}"/>
+                  <a16:creationId xmlns:a16="http://schemas.microsoft.com/office/drawing/2014/main" id="{8FC73BD1-BE9D-4CA7-94BB-6B1C0C2F4147}"/>
                 </a:ext>
               </a:extLst>
             </p:cNvPr>
@@ -47833,7 +47528,7 @@
           <p:cNvPr id="15" name="Grupo 14">
             <a:extLst>
               <a:ext uri="{FF2B5EF4-FFF2-40B4-BE49-F238E27FC236}">
-                <a16:creationId xmlns:a16="http://schemas.microsoft.com/office/drawing/2014/main" xmlns="" id="{D818BFED-2153-4FA8-8059-75A5A38D8D76}"/>
+                <a16:creationId xmlns:a16="http://schemas.microsoft.com/office/drawing/2014/main" id="{D818BFED-2153-4FA8-8059-75A5A38D8D76}"/>
               </a:ext>
             </a:extLst>
           </p:cNvPr>
@@ -47853,7 +47548,7 @@
             <p:cNvPr id="16" name="Imagen 15">
               <a:extLst>
                 <a:ext uri="{FF2B5EF4-FFF2-40B4-BE49-F238E27FC236}">
-                  <a16:creationId xmlns:a16="http://schemas.microsoft.com/office/drawing/2014/main" xmlns="" id="{90DAA2F8-8C45-4C18-959B-BFB152D14237}"/>
+                  <a16:creationId xmlns:a16="http://schemas.microsoft.com/office/drawing/2014/main" id="{90DAA2F8-8C45-4C18-959B-BFB152D14237}"/>
                 </a:ext>
               </a:extLst>
             </p:cNvPr>
@@ -47894,7 +47589,7 @@
             <p:cNvPr id="17" name="Conector recto de flecha 16">
               <a:extLst>
                 <a:ext uri="{FF2B5EF4-FFF2-40B4-BE49-F238E27FC236}">
-                  <a16:creationId xmlns:a16="http://schemas.microsoft.com/office/drawing/2014/main" xmlns="" id="{5C43D222-31D6-40C2-90C8-78598DB9DFF6}"/>
+                  <a16:creationId xmlns:a16="http://schemas.microsoft.com/office/drawing/2014/main" id="{5C43D222-31D6-40C2-90C8-78598DB9DFF6}"/>
                 </a:ext>
               </a:extLst>
             </p:cNvPr>
@@ -47936,7 +47631,7 @@
             <p:cNvPr id="18" name="Conector recto de flecha 17">
               <a:extLst>
                 <a:ext uri="{FF2B5EF4-FFF2-40B4-BE49-F238E27FC236}">
-                  <a16:creationId xmlns:a16="http://schemas.microsoft.com/office/drawing/2014/main" xmlns="" id="{2C585DD7-7002-40E5-B98F-8DBF32118D86}"/>
+                  <a16:creationId xmlns:a16="http://schemas.microsoft.com/office/drawing/2014/main" id="{2C585DD7-7002-40E5-B98F-8DBF32118D86}"/>
                 </a:ext>
               </a:extLst>
             </p:cNvPr>
@@ -47979,7 +47674,7 @@
           <p:cNvPr id="19" name="Google Shape;93;p13">
             <a:extLst>
               <a:ext uri="{FF2B5EF4-FFF2-40B4-BE49-F238E27FC236}">
-                <a16:creationId xmlns:a16="http://schemas.microsoft.com/office/drawing/2014/main" xmlns="" id="{DCAAB932-0E5B-4579-A70F-D346E6CB873F}"/>
+                <a16:creationId xmlns:a16="http://schemas.microsoft.com/office/drawing/2014/main" id="{DCAAB932-0E5B-4579-A70F-D346E6CB873F}"/>
               </a:ext>
             </a:extLst>
           </p:cNvPr>
@@ -48096,7 +47791,7 @@
           <p:cNvPr id="20" name="Google Shape;112;p15">
             <a:extLst>
               <a:ext uri="{FF2B5EF4-FFF2-40B4-BE49-F238E27FC236}">
-                <a16:creationId xmlns:a16="http://schemas.microsoft.com/office/drawing/2014/main" xmlns="" id="{186EC496-CAE5-420D-9365-6EE262114F8E}"/>
+                <a16:creationId xmlns:a16="http://schemas.microsoft.com/office/drawing/2014/main" id="{186EC496-CAE5-420D-9365-6EE262114F8E}"/>
               </a:ext>
             </a:extLst>
           </p:cNvPr>
@@ -48187,7 +47882,7 @@
           <p:cNvPr id="2" name="Marcador de número de diapositiva 1">
             <a:extLst>
               <a:ext uri="{FF2B5EF4-FFF2-40B4-BE49-F238E27FC236}">
-                <a16:creationId xmlns:a16="http://schemas.microsoft.com/office/drawing/2014/main" xmlns="" id="{AFA24FD6-8406-46AA-B1F0-6DB7D8E55D6E}"/>
+                <a16:creationId xmlns:a16="http://schemas.microsoft.com/office/drawing/2014/main" id="{AFA24FD6-8406-46AA-B1F0-6DB7D8E55D6E}"/>
               </a:ext>
             </a:extLst>
           </p:cNvPr>
@@ -48225,7 +47920,7 @@
           <p:cNvPr id="3" name="Grupo 2">
             <a:extLst>
               <a:ext uri="{FF2B5EF4-FFF2-40B4-BE49-F238E27FC236}">
-                <a16:creationId xmlns:a16="http://schemas.microsoft.com/office/drawing/2014/main" xmlns="" id="{C13362ED-474E-482F-9671-2363BAC1B14B}"/>
+                <a16:creationId xmlns:a16="http://schemas.microsoft.com/office/drawing/2014/main" id="{C13362ED-474E-482F-9671-2363BAC1B14B}"/>
               </a:ext>
             </a:extLst>
           </p:cNvPr>
@@ -48245,7 +47940,7 @@
             <p:cNvPr id="4" name="Imagen 3">
               <a:extLst>
                 <a:ext uri="{FF2B5EF4-FFF2-40B4-BE49-F238E27FC236}">
-                  <a16:creationId xmlns:a16="http://schemas.microsoft.com/office/drawing/2014/main" xmlns="" id="{45E0CC41-C0AE-4FB6-A3EB-CD7E95D3C56D}"/>
+                  <a16:creationId xmlns:a16="http://schemas.microsoft.com/office/drawing/2014/main" id="{45E0CC41-C0AE-4FB6-A3EB-CD7E95D3C56D}"/>
                 </a:ext>
               </a:extLst>
             </p:cNvPr>
@@ -48286,7 +47981,7 @@
             <p:cNvPr id="5" name="Conector recto de flecha 4">
               <a:extLst>
                 <a:ext uri="{FF2B5EF4-FFF2-40B4-BE49-F238E27FC236}">
-                  <a16:creationId xmlns:a16="http://schemas.microsoft.com/office/drawing/2014/main" xmlns="" id="{75962D13-2089-4D7F-8970-D05E7FDC30B0}"/>
+                  <a16:creationId xmlns:a16="http://schemas.microsoft.com/office/drawing/2014/main" id="{75962D13-2089-4D7F-8970-D05E7FDC30B0}"/>
                 </a:ext>
               </a:extLst>
             </p:cNvPr>
@@ -48328,7 +48023,7 @@
             <p:cNvPr id="6" name="Conector recto de flecha 5">
               <a:extLst>
                 <a:ext uri="{FF2B5EF4-FFF2-40B4-BE49-F238E27FC236}">
-                  <a16:creationId xmlns:a16="http://schemas.microsoft.com/office/drawing/2014/main" xmlns="" id="{030AA487-850C-4B84-A7BB-F12BF1221955}"/>
+                  <a16:creationId xmlns:a16="http://schemas.microsoft.com/office/drawing/2014/main" id="{030AA487-850C-4B84-A7BB-F12BF1221955}"/>
                 </a:ext>
               </a:extLst>
             </p:cNvPr>
@@ -48370,7 +48065,7 @@
             <p:cNvPr id="7" name="Conector recto de flecha 6">
               <a:extLst>
                 <a:ext uri="{FF2B5EF4-FFF2-40B4-BE49-F238E27FC236}">
-                  <a16:creationId xmlns:a16="http://schemas.microsoft.com/office/drawing/2014/main" xmlns="" id="{77E8562A-9490-4E3B-87C8-1D130C4D61DC}"/>
+                  <a16:creationId xmlns:a16="http://schemas.microsoft.com/office/drawing/2014/main" id="{77E8562A-9490-4E3B-87C8-1D130C4D61DC}"/>
                 </a:ext>
               </a:extLst>
             </p:cNvPr>
@@ -48413,7 +48108,7 @@
           <p:cNvPr id="8" name="Grupo 7">
             <a:extLst>
               <a:ext uri="{FF2B5EF4-FFF2-40B4-BE49-F238E27FC236}">
-                <a16:creationId xmlns:a16="http://schemas.microsoft.com/office/drawing/2014/main" xmlns="" id="{052608CE-2D8C-4C69-A065-A705DC843045}"/>
+                <a16:creationId xmlns:a16="http://schemas.microsoft.com/office/drawing/2014/main" id="{052608CE-2D8C-4C69-A065-A705DC843045}"/>
               </a:ext>
             </a:extLst>
           </p:cNvPr>
@@ -48433,7 +48128,7 @@
             <p:cNvPr id="9" name="Imagen 8">
               <a:extLst>
                 <a:ext uri="{FF2B5EF4-FFF2-40B4-BE49-F238E27FC236}">
-                  <a16:creationId xmlns:a16="http://schemas.microsoft.com/office/drawing/2014/main" xmlns="" id="{5116E174-145D-46CD-834E-DD2B3F58B525}"/>
+                  <a16:creationId xmlns:a16="http://schemas.microsoft.com/office/drawing/2014/main" id="{5116E174-145D-46CD-834E-DD2B3F58B525}"/>
                 </a:ext>
               </a:extLst>
             </p:cNvPr>
@@ -48474,7 +48169,7 @@
             <p:cNvPr id="10" name="Conector recto de flecha 9">
               <a:extLst>
                 <a:ext uri="{FF2B5EF4-FFF2-40B4-BE49-F238E27FC236}">
-                  <a16:creationId xmlns:a16="http://schemas.microsoft.com/office/drawing/2014/main" xmlns="" id="{00B95CA0-A87C-4753-9999-8CA3178B1E9B}"/>
+                  <a16:creationId xmlns:a16="http://schemas.microsoft.com/office/drawing/2014/main" id="{00B95CA0-A87C-4753-9999-8CA3178B1E9B}"/>
                 </a:ext>
               </a:extLst>
             </p:cNvPr>
@@ -48516,7 +48211,7 @@
             <p:cNvPr id="11" name="Conector recto de flecha 10">
               <a:extLst>
                 <a:ext uri="{FF2B5EF4-FFF2-40B4-BE49-F238E27FC236}">
-                  <a16:creationId xmlns:a16="http://schemas.microsoft.com/office/drawing/2014/main" xmlns="" id="{5FDFB1C7-7A2F-4EC9-BAAB-D908627A3D7E}"/>
+                  <a16:creationId xmlns:a16="http://schemas.microsoft.com/office/drawing/2014/main" id="{5FDFB1C7-7A2F-4EC9-BAAB-D908627A3D7E}"/>
                 </a:ext>
               </a:extLst>
             </p:cNvPr>
@@ -48559,7 +48254,7 @@
           <p:cNvPr id="12" name="Google Shape;323;p30">
             <a:extLst>
               <a:ext uri="{FF2B5EF4-FFF2-40B4-BE49-F238E27FC236}">
-                <a16:creationId xmlns:a16="http://schemas.microsoft.com/office/drawing/2014/main" xmlns="" id="{73C91F9B-5FDB-4CCC-860A-A6D180BD7F54}"/>
+                <a16:creationId xmlns:a16="http://schemas.microsoft.com/office/drawing/2014/main" id="{73C91F9B-5FDB-4CCC-860A-A6D180BD7F54}"/>
               </a:ext>
             </a:extLst>
           </p:cNvPr>

</xml_diff>